<commit_message>
inserted benchmark results for coffe arabica
</commit_message>
<xml_diff>
--- a/Presentation/gi_presentation.pptx
+++ b/Presentation/gi_presentation.pptx
@@ -207,7 +207,7 @@
           <a:p>
             <a:fld id="{24031642-1FF4-6441-BCAF-6D8858459232}" type="datetimeFigureOut">
               <a:rPr lang="en-US" smtClean="0"/>
-              <a:t>4/11/19</a:t>
+              <a:t>4/13/19</a:t>
             </a:fld>
             <a:endParaRPr lang="en-US"/>
           </a:p>
@@ -2377,7 +2377,7 @@
           <a:p>
             <a:fld id="{BA17F56F-1B67-4B63-8A5F-6AF1457D6EED}" type="datetimeFigureOut">
               <a:rPr lang="en-GB" smtClean="0"/>
-              <a:t>11/04/2019</a:t>
+              <a:t>13/04/2019</a:t>
             </a:fld>
             <a:endParaRPr lang="en-GB"/>
           </a:p>
@@ -2813,7 +2813,7 @@
           <a:p>
             <a:fld id="{BA17F56F-1B67-4B63-8A5F-6AF1457D6EED}" type="datetimeFigureOut">
               <a:rPr lang="en-GB" smtClean="0"/>
-              <a:t>11/04/2019</a:t>
+              <a:t>13/04/2019</a:t>
             </a:fld>
             <a:endParaRPr lang="en-GB"/>
           </a:p>
@@ -3063,7 +3063,7 @@
           <a:p>
             <a:fld id="{BA17F56F-1B67-4B63-8A5F-6AF1457D6EED}" type="datetimeFigureOut">
               <a:rPr lang="en-GB" smtClean="0"/>
-              <a:t>11/04/2019</a:t>
+              <a:t>13/04/2019</a:t>
             </a:fld>
             <a:endParaRPr lang="en-GB"/>
           </a:p>
@@ -3371,7 +3371,7 @@
           <a:p>
             <a:fld id="{BA17F56F-1B67-4B63-8A5F-6AF1457D6EED}" type="datetimeFigureOut">
               <a:rPr lang="en-GB" smtClean="0"/>
-              <a:t>11/04/2019</a:t>
+              <a:t>13/04/2019</a:t>
             </a:fld>
             <a:endParaRPr lang="en-GB"/>
           </a:p>
@@ -3689,7 +3689,7 @@
           <a:p>
             <a:fld id="{BA17F56F-1B67-4B63-8A5F-6AF1457D6EED}" type="datetimeFigureOut">
               <a:rPr lang="en-GB" smtClean="0"/>
-              <a:t>11/04/2019</a:t>
+              <a:t>13/04/2019</a:t>
             </a:fld>
             <a:endParaRPr lang="en-GB"/>
           </a:p>
@@ -3991,7 +3991,7 @@
           <a:p>
             <a:fld id="{BA17F56F-1B67-4B63-8A5F-6AF1457D6EED}" type="datetimeFigureOut">
               <a:rPr lang="en-GB" smtClean="0"/>
-              <a:t>11/04/2019</a:t>
+              <a:t>13/04/2019</a:t>
             </a:fld>
             <a:endParaRPr lang="en-GB"/>
           </a:p>
@@ -4358,7 +4358,7 @@
           <a:p>
             <a:fld id="{BA17F56F-1B67-4B63-8A5F-6AF1457D6EED}" type="datetimeFigureOut">
               <a:rPr lang="en-GB" smtClean="0"/>
-              <a:t>11/04/2019</a:t>
+              <a:t>13/04/2019</a:t>
             </a:fld>
             <a:endParaRPr lang="en-GB"/>
           </a:p>
@@ -4532,7 +4532,7 @@
           <a:p>
             <a:fld id="{BA17F56F-1B67-4B63-8A5F-6AF1457D6EED}" type="datetimeFigureOut">
               <a:rPr lang="en-GB" smtClean="0"/>
-              <a:t>11/04/2019</a:t>
+              <a:t>13/04/2019</a:t>
             </a:fld>
             <a:endParaRPr lang="en-GB"/>
           </a:p>
@@ -4712,7 +4712,7 @@
           <a:p>
             <a:fld id="{BA17F56F-1B67-4B63-8A5F-6AF1457D6EED}" type="datetimeFigureOut">
               <a:rPr lang="en-GB" smtClean="0"/>
-              <a:t>11/04/2019</a:t>
+              <a:t>13/04/2019</a:t>
             </a:fld>
             <a:endParaRPr lang="en-GB"/>
           </a:p>
@@ -4882,7 +4882,7 @@
           <a:p>
             <a:fld id="{BA17F56F-1B67-4B63-8A5F-6AF1457D6EED}" type="datetimeFigureOut">
               <a:rPr lang="en-GB" smtClean="0"/>
-              <a:t>11/04/2019</a:t>
+              <a:t>13/04/2019</a:t>
             </a:fld>
             <a:endParaRPr lang="en-GB"/>
           </a:p>
@@ -5132,7 +5132,7 @@
           <a:p>
             <a:fld id="{BA17F56F-1B67-4B63-8A5F-6AF1457D6EED}" type="datetimeFigureOut">
               <a:rPr lang="en-GB" smtClean="0"/>
-              <a:t>11/04/2019</a:t>
+              <a:t>13/04/2019</a:t>
             </a:fld>
             <a:endParaRPr lang="en-GB"/>
           </a:p>
@@ -5368,7 +5368,7 @@
           <a:p>
             <a:fld id="{BA17F56F-1B67-4B63-8A5F-6AF1457D6EED}" type="datetimeFigureOut">
               <a:rPr lang="en-GB" smtClean="0"/>
-              <a:t>11/04/2019</a:t>
+              <a:t>13/04/2019</a:t>
             </a:fld>
             <a:endParaRPr lang="en-GB"/>
           </a:p>
@@ -5750,7 +5750,7 @@
           <a:p>
             <a:fld id="{BA17F56F-1B67-4B63-8A5F-6AF1457D6EED}" type="datetimeFigureOut">
               <a:rPr lang="en-GB" smtClean="0"/>
-              <a:t>11/04/2019</a:t>
+              <a:t>13/04/2019</a:t>
             </a:fld>
             <a:endParaRPr lang="en-GB"/>
           </a:p>
@@ -5868,7 +5868,7 @@
           <a:p>
             <a:fld id="{BA17F56F-1B67-4B63-8A5F-6AF1457D6EED}" type="datetimeFigureOut">
               <a:rPr lang="en-GB" smtClean="0"/>
-              <a:t>11/04/2019</a:t>
+              <a:t>13/04/2019</a:t>
             </a:fld>
             <a:endParaRPr lang="en-GB"/>
           </a:p>
@@ -5963,7 +5963,7 @@
           <a:p>
             <a:fld id="{BA17F56F-1B67-4B63-8A5F-6AF1457D6EED}" type="datetimeFigureOut">
               <a:rPr lang="en-GB" smtClean="0"/>
-              <a:t>11/04/2019</a:t>
+              <a:t>13/04/2019</a:t>
             </a:fld>
             <a:endParaRPr lang="en-GB"/>
           </a:p>
@@ -6218,7 +6218,7 @@
           <a:p>
             <a:fld id="{BA17F56F-1B67-4B63-8A5F-6AF1457D6EED}" type="datetimeFigureOut">
               <a:rPr lang="en-GB" smtClean="0"/>
-              <a:t>11/04/2019</a:t>
+              <a:t>13/04/2019</a:t>
             </a:fld>
             <a:endParaRPr lang="en-GB"/>
           </a:p>
@@ -6501,7 +6501,7 @@
           <a:p>
             <a:fld id="{BA17F56F-1B67-4B63-8A5F-6AF1457D6EED}" type="datetimeFigureOut">
               <a:rPr lang="en-GB" smtClean="0"/>
-              <a:t>11/04/2019</a:t>
+              <a:t>13/04/2019</a:t>
             </a:fld>
             <a:endParaRPr lang="en-GB"/>
           </a:p>
@@ -6907,7 +6907,7 @@
           <a:p>
             <a:fld id="{BA17F56F-1B67-4B63-8A5F-6AF1457D6EED}" type="datetimeFigureOut">
               <a:rPr lang="en-GB" smtClean="0"/>
-              <a:t>11/04/2019</a:t>
+              <a:t>13/04/2019</a:t>
             </a:fld>
             <a:endParaRPr lang="en-GB"/>
           </a:p>
@@ -15142,29 +15142,108 @@
           </p:style>
         </p:cxnSp>
       </p:grpSp>
+      <p:sp>
+        <p:nvSpPr>
+          <p:cNvPr id="3" name="TextBox 2">
+            <a:extLst>
+              <a:ext uri="{FF2B5EF4-FFF2-40B4-BE49-F238E27FC236}">
+                <a16:creationId xmlns:a16="http://schemas.microsoft.com/office/drawing/2014/main" id="{4CDB8421-EDCA-A745-937E-8BBD40A7DB50}"/>
+              </a:ext>
+            </a:extLst>
+          </p:cNvPr>
+          <p:cNvSpPr txBox="1"/>
+          <p:nvPr/>
+        </p:nvSpPr>
+        <p:spPr>
+          <a:xfrm>
+            <a:off x="684212" y="5525781"/>
+            <a:ext cx="7630615" cy="369332"/>
+          </a:xfrm>
+          <a:prstGeom prst="rect">
+            <a:avLst/>
+          </a:prstGeom>
+          <a:noFill/>
+        </p:spPr>
+        <p:txBody>
+          <a:bodyPr wrap="none" rtlCol="0">
+            <a:spAutoFit/>
+          </a:bodyPr>
+          <a:lstStyle/>
+          <a:p>
+            <a:r>
+              <a:rPr lang="en-US" dirty="0" err="1"/>
+              <a:t>Za</a:t>
+            </a:r>
+            <a:r>
+              <a:rPr lang="en-US" dirty="0"/>
+              <a:t> </a:t>
+            </a:r>
+            <a:r>
+              <a:rPr lang="en-US" dirty="0" err="1"/>
+              <a:t>pokazni</a:t>
+            </a:r>
+            <a:r>
+              <a:rPr lang="en-US" dirty="0"/>
+              <a:t> primer </a:t>
+            </a:r>
+            <a:r>
+              <a:rPr lang="en-US" dirty="0" err="1"/>
+              <a:t>je</a:t>
+            </a:r>
+            <a:r>
+              <a:rPr lang="en-US" dirty="0"/>
+              <a:t> </a:t>
+            </a:r>
+            <a:r>
+              <a:rPr lang="en-US" dirty="0" err="1"/>
+              <a:t>uzet</a:t>
+            </a:r>
+            <a:r>
+              <a:rPr lang="en-US" dirty="0"/>
+              <a:t> </a:t>
+            </a:r>
+            <a:r>
+              <a:rPr lang="en-US" dirty="0" err="1"/>
+              <a:t>genom</a:t>
+            </a:r>
+            <a:r>
+              <a:rPr lang="en-US" dirty="0"/>
+              <a:t> </a:t>
+            </a:r>
+            <a:r>
+              <a:rPr lang="en-GB" dirty="0" err="1"/>
+              <a:t>Coffea</a:t>
+            </a:r>
+            <a:r>
+              <a:rPr lang="en-GB" dirty="0"/>
+              <a:t> arabica, Chromosome 1c</a:t>
+            </a:r>
+            <a:endParaRPr lang="sr-Latn-RS" dirty="0"/>
+          </a:p>
+        </p:txBody>
+      </p:sp>
       <p:graphicFrame>
         <p:nvGraphicFramePr>
-          <p:cNvPr id="5" name="Content Placeholder 4">
+          <p:cNvPr id="16" name="Content Placeholder 4">
             <a:extLst>
               <a:ext uri="{FF2B5EF4-FFF2-40B4-BE49-F238E27FC236}">
-                <a16:creationId xmlns:a16="http://schemas.microsoft.com/office/drawing/2014/main" id="{F33929C6-19C5-AC46-8BAA-A7F789E7631F}"/>
+                <a16:creationId xmlns:a16="http://schemas.microsoft.com/office/drawing/2014/main" id="{4F08D1D3-18E0-134D-BCE3-32CB83DAC303}"/>
               </a:ext>
             </a:extLst>
           </p:cNvPr>
           <p:cNvGraphicFramePr>
-            <a:graphicFrameLocks noGrp="1"/>
+            <a:graphicFrameLocks/>
           </p:cNvGraphicFramePr>
           <p:nvPr>
-            <p:ph idx="1"/>
             <p:extLst>
               <p:ext uri="{D42A27DB-BD31-4B8C-83A1-F6EECF244321}">
-                <p14:modId xmlns:p14="http://schemas.microsoft.com/office/powerpoint/2010/main" val="469827614"/>
+                <p14:modId xmlns:p14="http://schemas.microsoft.com/office/powerpoint/2010/main" val="1583995578"/>
               </p:ext>
             </p:extLst>
           </p:nvPr>
         </p:nvGraphicFramePr>
         <p:xfrm>
-          <a:off x="684212" y="2439455"/>
+          <a:off x="684212" y="2477555"/>
           <a:ext cx="8534400" cy="2123440"/>
         </p:xfrm>
         <a:graphic>
@@ -15203,7 +15282,7 @@
                   </a:extLst>
                 </a:gridCol>
               </a:tblGrid>
-              <a:tr h="370840">
+              <a:tr h="0">
                 <a:tc>
                   <a:txBody>
                     <a:bodyPr/>
@@ -15325,7 +15404,10 @@
                     <a:bodyPr/>
                     <a:lstStyle/>
                     <a:p>
-                      <a:endParaRPr lang="en-US" dirty="0"/>
+                      <a:r>
+                        <a:rPr lang="en-US" dirty="0"/>
+                        <a:t>9 GB</a:t>
+                      </a:r>
                     </a:p>
                   </a:txBody>
                   <a:tcPr/>
@@ -15335,7 +15417,10 @@
                     <a:bodyPr/>
                     <a:lstStyle/>
                     <a:p>
-                      <a:endParaRPr lang="en-US" dirty="0"/>
+                      <a:r>
+                        <a:rPr lang="en-US" dirty="0"/>
+                        <a:t>11 min</a:t>
+                      </a:r>
                     </a:p>
                   </a:txBody>
                   <a:tcPr/>
@@ -15345,7 +15430,10 @@
                     <a:bodyPr/>
                     <a:lstStyle/>
                     <a:p>
-                      <a:endParaRPr lang="en-US" dirty="0"/>
+                      <a:r>
+                        <a:rPr lang="en-US" dirty="0"/>
+                        <a:t>0.16 sec</a:t>
+                      </a:r>
                     </a:p>
                   </a:txBody>
                   <a:tcPr/>
@@ -15375,7 +15463,10 @@
                     <a:bodyPr/>
                     <a:lstStyle/>
                     <a:p>
-                      <a:endParaRPr lang="en-US"/>
+                      <a:r>
+                        <a:rPr lang="en-US" dirty="0"/>
+                        <a:t>2.1 GB</a:t>
+                      </a:r>
                     </a:p>
                   </a:txBody>
                   <a:tcPr/>
@@ -15385,7 +15476,10 @@
                     <a:bodyPr/>
                     <a:lstStyle/>
                     <a:p>
-                      <a:endParaRPr lang="en-US"/>
+                      <a:r>
+                        <a:rPr lang="en-US" dirty="0"/>
+                        <a:t>8 min</a:t>
+                      </a:r>
                     </a:p>
                   </a:txBody>
                   <a:tcPr/>
@@ -15395,7 +15489,10 @@
                     <a:bodyPr/>
                     <a:lstStyle/>
                     <a:p>
-                      <a:endParaRPr lang="en-US"/>
+                      <a:r>
+                        <a:rPr lang="en-US" dirty="0"/>
+                        <a:t>1 min 40 sec</a:t>
+                      </a:r>
                     </a:p>
                   </a:txBody>
                   <a:tcPr/>
@@ -15425,7 +15522,10 @@
                     <a:bodyPr/>
                     <a:lstStyle/>
                     <a:p>
-                      <a:endParaRPr lang="en-US"/>
+                      <a:r>
+                        <a:rPr lang="en-US" dirty="0"/>
+                        <a:t>42.1 GB</a:t>
+                      </a:r>
                     </a:p>
                   </a:txBody>
                   <a:tcPr/>
@@ -15435,7 +15535,18 @@
                     <a:bodyPr/>
                     <a:lstStyle/>
                     <a:p>
-                      <a:endParaRPr lang="en-US"/>
+                      <a:r>
+                        <a:rPr lang="en-US" dirty="0"/>
+                        <a:t>1 </a:t>
+                      </a:r>
+                      <a:r>
+                        <a:rPr lang="en-US" dirty="0" err="1"/>
+                        <a:t>hr</a:t>
+                      </a:r>
+                      <a:r>
+                        <a:rPr lang="en-US" dirty="0"/>
+                        <a:t> 36 min</a:t>
+                      </a:r>
                     </a:p>
                   </a:txBody>
                   <a:tcPr/>
@@ -15445,7 +15556,10 @@
                     <a:bodyPr/>
                     <a:lstStyle/>
                     <a:p>
-                      <a:endParaRPr lang="en-US" dirty="0"/>
+                      <a:r>
+                        <a:rPr lang="en-US" dirty="0"/>
+                        <a:t>1.7 sec</a:t>
+                      </a:r>
                     </a:p>
                   </a:txBody>
                   <a:tcPr/>
@@ -15475,7 +15589,10 @@
                     <a:bodyPr/>
                     <a:lstStyle/>
                     <a:p>
-                      <a:endParaRPr lang="en-US"/>
+                      <a:r>
+                        <a:rPr lang="en-US" dirty="0"/>
+                        <a:t>39.9 GB</a:t>
+                      </a:r>
                     </a:p>
                   </a:txBody>
                   <a:tcPr/>
@@ -15485,7 +15602,10 @@
                     <a:bodyPr/>
                     <a:lstStyle/>
                     <a:p>
-                      <a:endParaRPr lang="en-US"/>
+                      <a:r>
+                        <a:rPr lang="en-US" dirty="0"/>
+                        <a:t>58 min</a:t>
+                      </a:r>
                     </a:p>
                   </a:txBody>
                   <a:tcPr/>
@@ -15495,7 +15615,10 @@
                     <a:bodyPr/>
                     <a:lstStyle/>
                     <a:p>
-                      <a:endParaRPr lang="en-US" dirty="0"/>
+                      <a:r>
+                        <a:rPr lang="en-US" dirty="0"/>
+                        <a:t>0.4 sec</a:t>
+                      </a:r>
                     </a:p>
                   </a:txBody>
                   <a:tcPr/>

</xml_diff>

<commit_message>
made slides for all genomes
</commit_message>
<xml_diff>
--- a/Presentation/gi_presentation.pptx
+++ b/Presentation/gi_presentation.pptx
@@ -5,7 +5,7 @@
     <p:sldMasterId id="2147483660" r:id="rId1"/>
   </p:sldMasterIdLst>
   <p:notesMasterIdLst>
-    <p:notesMasterId r:id="rId13"/>
+    <p:notesMasterId r:id="rId15"/>
   </p:notesMasterIdLst>
   <p:sldIdLst>
     <p:sldId id="256" r:id="rId2"/>
@@ -17,8 +17,10 @@
     <p:sldId id="264" r:id="rId8"/>
     <p:sldId id="258" r:id="rId9"/>
     <p:sldId id="266" r:id="rId10"/>
-    <p:sldId id="263" r:id="rId11"/>
-    <p:sldId id="265" r:id="rId12"/>
+    <p:sldId id="270" r:id="rId11"/>
+    <p:sldId id="269" r:id="rId12"/>
+    <p:sldId id="263" r:id="rId13"/>
+    <p:sldId id="265" r:id="rId14"/>
   </p:sldIdLst>
   <p:sldSz cx="12192000" cy="6858000"/>
   <p:notesSz cx="6858000" cy="9144000"/>
@@ -2167,7 +2169,7 @@
           <a:p>
             <a:fld id="{DBECFB56-5338-9E45-BBC8-5B80A293CA20}" type="slidenum">
               <a:rPr lang="en-US" smtClean="0"/>
-              <a:t>11</a:t>
+              <a:t>13</a:t>
             </a:fld>
             <a:endParaRPr lang="en-US"/>
           </a:p>
@@ -8093,39 +8095,942 @@
           </a:p>
         </p:txBody>
       </p:sp>
-      <p:sp>
-        <p:nvSpPr>
-          <p:cNvPr id="2" name="Title 1">
+      <p:grpSp>
+        <p:nvGrpSpPr>
+          <p:cNvPr id="10" name="Group 9">
             <a:extLst>
               <a:ext uri="{FF2B5EF4-FFF2-40B4-BE49-F238E27FC236}">
-                <a16:creationId xmlns:a16="http://schemas.microsoft.com/office/drawing/2014/main" id="{A2AE66D6-9DA2-4151-8548-6CACA7CD1179}"/>
+                <a16:creationId xmlns:a16="http://schemas.microsoft.com/office/drawing/2014/main" id="{A80A6E81-6B71-43DF-877B-E964A9A4CB68}"/>
+              </a:ext>
+              <a:ext uri="{C183D7F6-B498-43B3-948B-1728B52AA6E4}">
+                <adec:decorative xmlns:adec="http://schemas.microsoft.com/office/drawing/2017/decorative" val="1"/>
               </a:ext>
             </a:extLst>
           </p:cNvPr>
-          <p:cNvSpPr>
-            <a:spLocks noGrp="1"/>
+          <p:cNvGrpSpPr>
+            <a:grpSpLocks noGrp="1" noUngrp="1" noRot="1" noChangeAspect="1" noMove="1" noResize="1"/>
+          </p:cNvGrpSpPr>
+          <p:nvPr>
+            <p:extLst>
+              <p:ext uri="{386F3935-93C4-4BCD-93E2-E3B085C9AB24}">
+                <p16:designElem xmlns:p16="http://schemas.microsoft.com/office/powerpoint/2015/main" val="1"/>
+              </p:ext>
+            </p:extLst>
+          </p:nvPr>
+        </p:nvGrpSpPr>
+        <p:grpSpPr>
+          <a:xfrm>
+            <a:off x="9206969" y="2963333"/>
+            <a:ext cx="2981858" cy="3208867"/>
+            <a:chOff x="9206969" y="2963333"/>
+            <a:chExt cx="2981858" cy="3208867"/>
+          </a:xfrm>
+        </p:grpSpPr>
+        <p:cxnSp>
+          <p:nvCxnSpPr>
+            <p:cNvPr id="11" name="Straight Connector 10">
+              <a:extLst>
+                <a:ext uri="{FF2B5EF4-FFF2-40B4-BE49-F238E27FC236}">
+                  <a16:creationId xmlns:a16="http://schemas.microsoft.com/office/drawing/2014/main" id="{4E35C3AD-357F-4004-A3F3-2D4EAF34A63D}"/>
+                </a:ext>
+                <a:ext uri="{C183D7F6-B498-43B3-948B-1728B52AA6E4}">
+                  <adec:decorative xmlns:adec="http://schemas.microsoft.com/office/drawing/2017/decorative" val="1"/>
+                </a:ext>
+              </a:extLst>
+            </p:cNvPr>
+            <p:cNvCxnSpPr/>
+            <p:nvPr>
+              <p:extLst>
+                <p:ext uri="{386F3935-93C4-4BCD-93E2-E3B085C9AB24}">
+                  <p16:designElem xmlns:p16="http://schemas.microsoft.com/office/powerpoint/2015/main" val="1"/>
+                </p:ext>
+              </p:extLst>
+            </p:nvPr>
+          </p:nvCxnSpPr>
+          <p:spPr>
+            <a:xfrm flipH="1">
+              <a:off x="11276012" y="2963333"/>
+              <a:ext cx="912814" cy="912812"/>
+            </a:xfrm>
+            <a:prstGeom prst="line">
+              <a:avLst/>
+            </a:prstGeom>
+            <a:ln w="9525">
+              <a:solidFill>
+                <a:schemeClr val="tx2">
+                  <a:lumMod val="75000"/>
+                  <a:alpha val="80000"/>
+                </a:schemeClr>
+              </a:solidFill>
+            </a:ln>
+          </p:spPr>
+          <p:style>
+            <a:lnRef idx="2">
+              <a:schemeClr val="accent1"/>
+            </a:lnRef>
+            <a:fillRef idx="0">
+              <a:schemeClr val="accent1"/>
+            </a:fillRef>
+            <a:effectRef idx="1">
+              <a:schemeClr val="accent1"/>
+            </a:effectRef>
+            <a:fontRef idx="minor">
+              <a:schemeClr val="tx1"/>
+            </a:fontRef>
+          </p:style>
+        </p:cxnSp>
+        <p:cxnSp>
+          <p:nvCxnSpPr>
+            <p:cNvPr id="12" name="Straight Connector 11">
+              <a:extLst>
+                <a:ext uri="{FF2B5EF4-FFF2-40B4-BE49-F238E27FC236}">
+                  <a16:creationId xmlns:a16="http://schemas.microsoft.com/office/drawing/2014/main" id="{337B6032-0A70-4F26-A9A3-B4D60DF11818}"/>
+                </a:ext>
+                <a:ext uri="{C183D7F6-B498-43B3-948B-1728B52AA6E4}">
+                  <adec:decorative xmlns:adec="http://schemas.microsoft.com/office/drawing/2017/decorative" val="1"/>
+                </a:ext>
+              </a:extLst>
+            </p:cNvPr>
+            <p:cNvCxnSpPr/>
+            <p:nvPr>
+              <p:extLst>
+                <p:ext uri="{386F3935-93C4-4BCD-93E2-E3B085C9AB24}">
+                  <p16:designElem xmlns:p16="http://schemas.microsoft.com/office/powerpoint/2015/main" val="1"/>
+                </p:ext>
+              </p:extLst>
+            </p:nvPr>
+          </p:nvCxnSpPr>
+          <p:spPr>
+            <a:xfrm flipH="1">
+              <a:off x="9206969" y="3190344"/>
+              <a:ext cx="2981857" cy="2981856"/>
+            </a:xfrm>
+            <a:prstGeom prst="line">
+              <a:avLst/>
+            </a:prstGeom>
+            <a:ln w="9525">
+              <a:solidFill>
+                <a:schemeClr val="tx2">
+                  <a:lumMod val="75000"/>
+                  <a:alpha val="80000"/>
+                </a:schemeClr>
+              </a:solidFill>
+            </a:ln>
+          </p:spPr>
+          <p:style>
+            <a:lnRef idx="2">
+              <a:schemeClr val="accent1"/>
+            </a:lnRef>
+            <a:fillRef idx="0">
+              <a:schemeClr val="accent1"/>
+            </a:fillRef>
+            <a:effectRef idx="1">
+              <a:schemeClr val="accent1"/>
+            </a:effectRef>
+            <a:fontRef idx="minor">
+              <a:schemeClr val="tx1"/>
+            </a:fontRef>
+          </p:style>
+        </p:cxnSp>
+        <p:cxnSp>
+          <p:nvCxnSpPr>
+            <p:cNvPr id="13" name="Straight Connector 12">
+              <a:extLst>
+                <a:ext uri="{FF2B5EF4-FFF2-40B4-BE49-F238E27FC236}">
+                  <a16:creationId xmlns:a16="http://schemas.microsoft.com/office/drawing/2014/main" id="{DE192CE3-3DD1-448F-93BE-42983DA0D5A9}"/>
+                </a:ext>
+                <a:ext uri="{C183D7F6-B498-43B3-948B-1728B52AA6E4}">
+                  <adec:decorative xmlns:adec="http://schemas.microsoft.com/office/drawing/2017/decorative" val="1"/>
+                </a:ext>
+              </a:extLst>
+            </p:cNvPr>
+            <p:cNvCxnSpPr/>
+            <p:nvPr>
+              <p:extLst>
+                <p:ext uri="{386F3935-93C4-4BCD-93E2-E3B085C9AB24}">
+                  <p16:designElem xmlns:p16="http://schemas.microsoft.com/office/powerpoint/2015/main" val="1"/>
+                </p:ext>
+              </p:extLst>
+            </p:nvPr>
+          </p:nvCxnSpPr>
+          <p:spPr>
+            <a:xfrm flipH="1">
+              <a:off x="10292292" y="3285067"/>
+              <a:ext cx="1896534" cy="1896533"/>
+            </a:xfrm>
+            <a:prstGeom prst="line">
+              <a:avLst/>
+            </a:prstGeom>
+            <a:ln w="9525">
+              <a:solidFill>
+                <a:schemeClr val="tx2">
+                  <a:lumMod val="75000"/>
+                  <a:alpha val="80000"/>
+                </a:schemeClr>
+              </a:solidFill>
+            </a:ln>
+          </p:spPr>
+          <p:style>
+            <a:lnRef idx="2">
+              <a:schemeClr val="accent1"/>
+            </a:lnRef>
+            <a:fillRef idx="0">
+              <a:schemeClr val="accent1"/>
+            </a:fillRef>
+            <a:effectRef idx="1">
+              <a:schemeClr val="accent1"/>
+            </a:effectRef>
+            <a:fontRef idx="minor">
+              <a:schemeClr val="tx1"/>
+            </a:fontRef>
+          </p:style>
+        </p:cxnSp>
+        <p:cxnSp>
+          <p:nvCxnSpPr>
+            <p:cNvPr id="14" name="Straight Connector 13">
+              <a:extLst>
+                <a:ext uri="{FF2B5EF4-FFF2-40B4-BE49-F238E27FC236}">
+                  <a16:creationId xmlns:a16="http://schemas.microsoft.com/office/drawing/2014/main" id="{E6D3DA09-5C72-4562-BEDE-1937DF87E81D}"/>
+                </a:ext>
+                <a:ext uri="{C183D7F6-B498-43B3-948B-1728B52AA6E4}">
+                  <adec:decorative xmlns:adec="http://schemas.microsoft.com/office/drawing/2017/decorative" val="1"/>
+                </a:ext>
+              </a:extLst>
+            </p:cNvPr>
+            <p:cNvCxnSpPr/>
+            <p:nvPr>
+              <p:extLst>
+                <p:ext uri="{386F3935-93C4-4BCD-93E2-E3B085C9AB24}">
+                  <p16:designElem xmlns:p16="http://schemas.microsoft.com/office/powerpoint/2015/main" val="1"/>
+                </p:ext>
+              </p:extLst>
+            </p:nvPr>
+          </p:nvCxnSpPr>
+          <p:spPr>
+            <a:xfrm flipH="1">
+              <a:off x="10443103" y="3131080"/>
+              <a:ext cx="1745722" cy="1745720"/>
+            </a:xfrm>
+            <a:prstGeom prst="line">
+              <a:avLst/>
+            </a:prstGeom>
+            <a:ln w="28575">
+              <a:solidFill>
+                <a:schemeClr val="tx2">
+                  <a:lumMod val="75000"/>
+                  <a:alpha val="80000"/>
+                </a:schemeClr>
+              </a:solidFill>
+            </a:ln>
+          </p:spPr>
+          <p:style>
+            <a:lnRef idx="2">
+              <a:schemeClr val="accent1"/>
+            </a:lnRef>
+            <a:fillRef idx="0">
+              <a:schemeClr val="accent1"/>
+            </a:fillRef>
+            <a:effectRef idx="1">
+              <a:schemeClr val="accent1"/>
+            </a:effectRef>
+            <a:fontRef idx="minor">
+              <a:schemeClr val="tx1"/>
+            </a:fontRef>
+          </p:style>
+        </p:cxnSp>
+        <p:cxnSp>
+          <p:nvCxnSpPr>
+            <p:cNvPr id="15" name="Straight Connector 14">
+              <a:extLst>
+                <a:ext uri="{FF2B5EF4-FFF2-40B4-BE49-F238E27FC236}">
+                  <a16:creationId xmlns:a16="http://schemas.microsoft.com/office/drawing/2014/main" id="{D6ACA7CA-2A20-49D7-9053-E076463D79A3}"/>
+                </a:ext>
+                <a:ext uri="{C183D7F6-B498-43B3-948B-1728B52AA6E4}">
+                  <adec:decorative xmlns:adec="http://schemas.microsoft.com/office/drawing/2017/decorative" val="1"/>
+                </a:ext>
+              </a:extLst>
+            </p:cNvPr>
+            <p:cNvCxnSpPr/>
+            <p:nvPr>
+              <p:extLst>
+                <p:ext uri="{386F3935-93C4-4BCD-93E2-E3B085C9AB24}">
+                  <p16:designElem xmlns:p16="http://schemas.microsoft.com/office/powerpoint/2015/main" val="1"/>
+                </p:ext>
+              </p:extLst>
+            </p:nvPr>
+          </p:nvCxnSpPr>
+          <p:spPr>
+            <a:xfrm flipH="1">
+              <a:off x="10918826" y="3683001"/>
+              <a:ext cx="1270001" cy="1269999"/>
+            </a:xfrm>
+            <a:prstGeom prst="line">
+              <a:avLst/>
+            </a:prstGeom>
+            <a:ln w="28575">
+              <a:solidFill>
+                <a:schemeClr val="tx2">
+                  <a:lumMod val="75000"/>
+                  <a:alpha val="80000"/>
+                </a:schemeClr>
+              </a:solidFill>
+            </a:ln>
+          </p:spPr>
+          <p:style>
+            <a:lnRef idx="2">
+              <a:schemeClr val="accent1"/>
+            </a:lnRef>
+            <a:fillRef idx="0">
+              <a:schemeClr val="accent1"/>
+            </a:fillRef>
+            <a:effectRef idx="1">
+              <a:schemeClr val="accent1"/>
+            </a:effectRef>
+            <a:fontRef idx="minor">
+              <a:schemeClr val="tx1"/>
+            </a:fontRef>
+          </p:style>
+        </p:cxnSp>
+      </p:grpSp>
+      <p:graphicFrame>
+        <p:nvGraphicFramePr>
+          <p:cNvPr id="16" name="Content Placeholder 4">
+            <a:extLst>
+              <a:ext uri="{FF2B5EF4-FFF2-40B4-BE49-F238E27FC236}">
+                <a16:creationId xmlns:a16="http://schemas.microsoft.com/office/drawing/2014/main" id="{4F08D1D3-18E0-134D-BCE3-32CB83DAC303}"/>
+              </a:ext>
+            </a:extLst>
+          </p:cNvPr>
+          <p:cNvGraphicFramePr>
+            <a:graphicFrameLocks/>
+          </p:cNvGraphicFramePr>
+          <p:nvPr>
+            <p:extLst>
+              <p:ext uri="{D42A27DB-BD31-4B8C-83A1-F6EECF244321}">
+                <p14:modId xmlns:p14="http://schemas.microsoft.com/office/powerpoint/2010/main" val="2390759124"/>
+              </p:ext>
+            </p:extLst>
+          </p:nvPr>
+        </p:nvGraphicFramePr>
+        <p:xfrm>
+          <a:off x="684212" y="2621281"/>
+          <a:ext cx="8534400" cy="2123440"/>
+        </p:xfrm>
+        <a:graphic>
+          <a:graphicData uri="http://schemas.openxmlformats.org/drawingml/2006/table">
+            <a:tbl>
+              <a:tblPr firstRow="1" firstCol="1" bandRow="1">
+                <a:tableStyleId>{8EC20E35-A176-4012-BC5E-935CFFF8708E}</a:tableStyleId>
+              </a:tblPr>
+              <a:tblGrid>
+                <a:gridCol w="2133600">
+                  <a:extLst>
+                    <a:ext uri="{9D8B030D-6E8A-4147-A177-3AD203B41FA5}">
+                      <a16:colId xmlns:a16="http://schemas.microsoft.com/office/drawing/2014/main" val="2357841546"/>
+                    </a:ext>
+                  </a:extLst>
+                </a:gridCol>
+                <a:gridCol w="2133600">
+                  <a:extLst>
+                    <a:ext uri="{9D8B030D-6E8A-4147-A177-3AD203B41FA5}">
+                      <a16:colId xmlns:a16="http://schemas.microsoft.com/office/drawing/2014/main" val="2214284885"/>
+                    </a:ext>
+                  </a:extLst>
+                </a:gridCol>
+                <a:gridCol w="2133600">
+                  <a:extLst>
+                    <a:ext uri="{9D8B030D-6E8A-4147-A177-3AD203B41FA5}">
+                      <a16:colId xmlns:a16="http://schemas.microsoft.com/office/drawing/2014/main" val="2702606531"/>
+                    </a:ext>
+                  </a:extLst>
+                </a:gridCol>
+                <a:gridCol w="2133600">
+                  <a:extLst>
+                    <a:ext uri="{9D8B030D-6E8A-4147-A177-3AD203B41FA5}">
+                      <a16:colId xmlns:a16="http://schemas.microsoft.com/office/drawing/2014/main" val="2041868178"/>
+                    </a:ext>
+                  </a:extLst>
+                </a:gridCol>
+              </a:tblGrid>
+              <a:tr h="0">
+                <a:tc>
+                  <a:txBody>
+                    <a:bodyPr/>
+                    <a:lstStyle/>
+                    <a:p>
+                      <a:r>
+                        <a:rPr lang="en-US" dirty="0" err="1"/>
+                        <a:t>Naziv</a:t>
+                      </a:r>
+                      <a:r>
+                        <a:rPr lang="en-US" dirty="0"/>
+                        <a:t> </a:t>
+                      </a:r>
+                      <a:r>
+                        <a:rPr lang="en-US" dirty="0" err="1"/>
+                        <a:t>algoritma</a:t>
+                      </a:r>
+                      <a:endParaRPr lang="en-US" dirty="0"/>
+                    </a:p>
+                  </a:txBody>
+                  <a:tcPr/>
+                </a:tc>
+                <a:tc>
+                  <a:txBody>
+                    <a:bodyPr/>
+                    <a:lstStyle/>
+                    <a:p>
+                      <a:r>
+                        <a:rPr lang="en-US" dirty="0" err="1"/>
+                        <a:t>Iskorišćenje</a:t>
+                      </a:r>
+                      <a:r>
+                        <a:rPr lang="en-US" dirty="0"/>
+                        <a:t> </a:t>
+                      </a:r>
+                      <a:r>
+                        <a:rPr lang="en-US" dirty="0" err="1"/>
+                        <a:t>memorije</a:t>
+                      </a:r>
+                      <a:endParaRPr lang="en-US" dirty="0"/>
+                    </a:p>
+                  </a:txBody>
+                  <a:tcPr/>
+                </a:tc>
+                <a:tc>
+                  <a:txBody>
+                    <a:bodyPr/>
+                    <a:lstStyle/>
+                    <a:p>
+                      <a:r>
+                        <a:rPr lang="en-US" dirty="0" err="1"/>
+                        <a:t>Vreme</a:t>
+                      </a:r>
+                      <a:r>
+                        <a:rPr lang="en-US" dirty="0"/>
+                        <a:t> </a:t>
+                      </a:r>
+                      <a:r>
+                        <a:rPr lang="en-US" dirty="0" err="1"/>
+                        <a:t>inicijalizacije</a:t>
+                      </a:r>
+                      <a:endParaRPr lang="en-US" dirty="0"/>
+                    </a:p>
+                  </a:txBody>
+                  <a:tcPr/>
+                </a:tc>
+                <a:tc>
+                  <a:txBody>
+                    <a:bodyPr/>
+                    <a:lstStyle/>
+                    <a:p>
+                      <a:r>
+                        <a:rPr lang="en-US" dirty="0" err="1"/>
+                        <a:t>Ukupno</a:t>
+                      </a:r>
+                      <a:r>
+                        <a:rPr lang="en-US" dirty="0"/>
+                        <a:t> </a:t>
+                      </a:r>
+                      <a:r>
+                        <a:rPr lang="en-US" dirty="0" err="1"/>
+                        <a:t>vreme</a:t>
+                      </a:r>
+                      <a:r>
+                        <a:rPr lang="en-US" dirty="0"/>
+                        <a:t> </a:t>
+                      </a:r>
+                      <a:r>
+                        <a:rPr lang="en-US" dirty="0" err="1"/>
+                        <a:t>pretrage</a:t>
+                      </a:r>
+                      <a:endParaRPr lang="en-US" dirty="0"/>
+                    </a:p>
+                  </a:txBody>
+                  <a:tcPr/>
+                </a:tc>
+                <a:extLst>
+                  <a:ext uri="{0D108BD9-81ED-4DB2-BD59-A6C34878D82A}">
+                    <a16:rowId xmlns:a16="http://schemas.microsoft.com/office/drawing/2014/main" val="3986939029"/>
+                  </a:ext>
+                </a:extLst>
+              </a:tr>
+              <a:tr h="370840">
+                <a:tc>
+                  <a:txBody>
+                    <a:bodyPr/>
+                    <a:lstStyle/>
+                    <a:p>
+                      <a:r>
+                        <a:rPr lang="en-US" dirty="0"/>
+                        <a:t>Index Sorted</a:t>
+                      </a:r>
+                    </a:p>
+                  </a:txBody>
+                  <a:tcPr/>
+                </a:tc>
+                <a:tc>
+                  <a:txBody>
+                    <a:bodyPr/>
+                    <a:lstStyle/>
+                    <a:p>
+                      <a:r>
+                        <a:rPr lang="en-US" dirty="0"/>
+                        <a:t> GB</a:t>
+                      </a:r>
+                    </a:p>
+                  </a:txBody>
+                  <a:tcPr/>
+                </a:tc>
+                <a:tc>
+                  <a:txBody>
+                    <a:bodyPr/>
+                    <a:lstStyle/>
+                    <a:p>
+                      <a:r>
+                        <a:rPr lang="en-US" dirty="0"/>
+                        <a:t> min</a:t>
+                      </a:r>
+                    </a:p>
+                  </a:txBody>
+                  <a:tcPr/>
+                </a:tc>
+                <a:tc>
+                  <a:txBody>
+                    <a:bodyPr/>
+                    <a:lstStyle/>
+                    <a:p>
+                      <a:r>
+                        <a:rPr lang="en-US" dirty="0"/>
+                        <a:t> sec</a:t>
+                      </a:r>
+                    </a:p>
+                  </a:txBody>
+                  <a:tcPr/>
+                </a:tc>
+                <a:extLst>
+                  <a:ext uri="{0D108BD9-81ED-4DB2-BD59-A6C34878D82A}">
+                    <a16:rowId xmlns:a16="http://schemas.microsoft.com/office/drawing/2014/main" val="1053902984"/>
+                  </a:ext>
+                </a:extLst>
+              </a:tr>
+              <a:tr h="370840">
+                <a:tc>
+                  <a:txBody>
+                    <a:bodyPr/>
+                    <a:lstStyle/>
+                    <a:p>
+                      <a:r>
+                        <a:rPr lang="en-US" dirty="0"/>
+                        <a:t>Index Hash</a:t>
+                      </a:r>
+                    </a:p>
+                  </a:txBody>
+                  <a:tcPr/>
+                </a:tc>
+                <a:tc>
+                  <a:txBody>
+                    <a:bodyPr/>
+                    <a:lstStyle/>
+                    <a:p>
+                      <a:r>
+                        <a:rPr lang="en-US" dirty="0"/>
+                        <a:t>GB</a:t>
+                      </a:r>
+                    </a:p>
+                  </a:txBody>
+                  <a:tcPr/>
+                </a:tc>
+                <a:tc>
+                  <a:txBody>
+                    <a:bodyPr/>
+                    <a:lstStyle/>
+                    <a:p>
+                      <a:r>
+                        <a:rPr lang="en-US" dirty="0"/>
+                        <a:t> min</a:t>
+                      </a:r>
+                    </a:p>
+                  </a:txBody>
+                  <a:tcPr/>
+                </a:tc>
+                <a:tc>
+                  <a:txBody>
+                    <a:bodyPr/>
+                    <a:lstStyle/>
+                    <a:p>
+                      <a:r>
+                        <a:rPr lang="en-US" dirty="0"/>
+                        <a:t> sec</a:t>
+                      </a:r>
+                    </a:p>
+                  </a:txBody>
+                  <a:tcPr/>
+                </a:tc>
+                <a:extLst>
+                  <a:ext uri="{0D108BD9-81ED-4DB2-BD59-A6C34878D82A}">
+                    <a16:rowId xmlns:a16="http://schemas.microsoft.com/office/drawing/2014/main" val="1781080610"/>
+                  </a:ext>
+                </a:extLst>
+              </a:tr>
+              <a:tr h="370840">
+                <a:tc>
+                  <a:txBody>
+                    <a:bodyPr/>
+                    <a:lstStyle/>
+                    <a:p>
+                      <a:r>
+                        <a:rPr lang="en-US" dirty="0"/>
+                        <a:t>Suffix Array</a:t>
+                      </a:r>
+                    </a:p>
+                  </a:txBody>
+                  <a:tcPr/>
+                </a:tc>
+                <a:tc>
+                  <a:txBody>
+                    <a:bodyPr/>
+                    <a:lstStyle/>
+                    <a:p>
+                      <a:r>
+                        <a:rPr lang="en-US" dirty="0"/>
+                        <a:t>GB</a:t>
+                      </a:r>
+                    </a:p>
+                  </a:txBody>
+                  <a:tcPr/>
+                </a:tc>
+                <a:tc>
+                  <a:txBody>
+                    <a:bodyPr/>
+                    <a:lstStyle/>
+                    <a:p>
+                      <a:r>
+                        <a:rPr lang="en-US" dirty="0"/>
+                        <a:t>min</a:t>
+                      </a:r>
+                    </a:p>
+                  </a:txBody>
+                  <a:tcPr/>
+                </a:tc>
+                <a:tc>
+                  <a:txBody>
+                    <a:bodyPr/>
+                    <a:lstStyle/>
+                    <a:p>
+                      <a:r>
+                        <a:rPr lang="en-US" dirty="0"/>
+                        <a:t> sec</a:t>
+                      </a:r>
+                    </a:p>
+                  </a:txBody>
+                  <a:tcPr/>
+                </a:tc>
+                <a:extLst>
+                  <a:ext uri="{0D108BD9-81ED-4DB2-BD59-A6C34878D82A}">
+                    <a16:rowId xmlns:a16="http://schemas.microsoft.com/office/drawing/2014/main" val="872050463"/>
+                  </a:ext>
+                </a:extLst>
+              </a:tr>
+              <a:tr h="370840">
+                <a:tc>
+                  <a:txBody>
+                    <a:bodyPr/>
+                    <a:lstStyle/>
+                    <a:p>
+                      <a:r>
+                        <a:rPr lang="en-US" dirty="0"/>
+                        <a:t>Suffix Tree</a:t>
+                      </a:r>
+                    </a:p>
+                  </a:txBody>
+                  <a:tcPr/>
+                </a:tc>
+                <a:tc>
+                  <a:txBody>
+                    <a:bodyPr/>
+                    <a:lstStyle/>
+                    <a:p>
+                      <a:r>
+                        <a:rPr lang="en-US" dirty="0"/>
+                        <a:t>73.9 GB</a:t>
+                      </a:r>
+                    </a:p>
+                  </a:txBody>
+                  <a:tcPr/>
+                </a:tc>
+                <a:tc>
+                  <a:txBody>
+                    <a:bodyPr/>
+                    <a:lstStyle/>
+                    <a:p>
+                      <a:r>
+                        <a:rPr lang="en-US" dirty="0"/>
+                        <a:t> min</a:t>
+                      </a:r>
+                    </a:p>
+                  </a:txBody>
+                  <a:tcPr/>
+                </a:tc>
+                <a:tc>
+                  <a:txBody>
+                    <a:bodyPr/>
+                    <a:lstStyle/>
+                    <a:p>
+                      <a:r>
+                        <a:rPr lang="en-US" dirty="0"/>
+                        <a:t>sec</a:t>
+                      </a:r>
+                    </a:p>
+                  </a:txBody>
+                  <a:tcPr/>
+                </a:tc>
+                <a:extLst>
+                  <a:ext uri="{0D108BD9-81ED-4DB2-BD59-A6C34878D82A}">
+                    <a16:rowId xmlns:a16="http://schemas.microsoft.com/office/drawing/2014/main" val="4077551856"/>
+                  </a:ext>
+                </a:extLst>
+              </a:tr>
+            </a:tbl>
+          </a:graphicData>
+        </a:graphic>
+      </p:graphicFrame>
+      <p:sp>
+        <p:nvSpPr>
+          <p:cNvPr id="17" name="Title 1">
+            <a:extLst>
+              <a:ext uri="{FF2B5EF4-FFF2-40B4-BE49-F238E27FC236}">
+                <a16:creationId xmlns:a16="http://schemas.microsoft.com/office/drawing/2014/main" id="{7B286EFF-E4DF-8948-86DE-B72759BC62FC}"/>
+              </a:ext>
+            </a:extLst>
+          </p:cNvPr>
+          <p:cNvSpPr txBox="1">
+            <a:spLocks/>
           </p:cNvSpPr>
-          <p:nvPr>
-            <p:ph type="title"/>
-          </p:nvPr>
+          <p:nvPr/>
         </p:nvSpPr>
         <p:spPr>
           <a:xfrm>
             <a:off x="684212" y="485244"/>
             <a:ext cx="8534400" cy="1507067"/>
           </a:xfrm>
+          <a:prstGeom prst="rect">
+            <a:avLst/>
+          </a:prstGeom>
+          <a:effectLst/>
         </p:spPr>
         <p:txBody>
-          <a:bodyPr>
+          <a:bodyPr vert="horz" lIns="91440" tIns="45720" rIns="91440" bIns="45720" rtlCol="0" anchor="ctr">
             <a:normAutofit/>
           </a:bodyPr>
+          <a:lstStyle>
+            <a:lvl1pPr algn="l" defTabSz="457200" rtl="0" eaLnBrk="1" latinLnBrk="0" hangingPunct="1">
+              <a:spcBef>
+                <a:spcPct val="0"/>
+              </a:spcBef>
+              <a:buNone/>
+              <a:defRPr sz="3600" kern="1200" cap="all">
+                <a:ln w="3175" cmpd="sng">
+                  <a:noFill/>
+                </a:ln>
+                <a:solidFill>
+                  <a:schemeClr val="tx1"/>
+                </a:solidFill>
+                <a:effectLst/>
+                <a:latin typeface="+mj-lt"/>
+                <a:ea typeface="+mj-ea"/>
+                <a:cs typeface="+mj-cs"/>
+              </a:defRPr>
+            </a:lvl1pPr>
+            <a:lvl2pPr eaLnBrk="1" hangingPunct="1">
+              <a:defRPr>
+                <a:solidFill>
+                  <a:schemeClr val="tx2"/>
+                </a:solidFill>
+              </a:defRPr>
+            </a:lvl2pPr>
+            <a:lvl3pPr eaLnBrk="1" hangingPunct="1">
+              <a:defRPr>
+                <a:solidFill>
+                  <a:schemeClr val="tx2"/>
+                </a:solidFill>
+              </a:defRPr>
+            </a:lvl3pPr>
+            <a:lvl4pPr eaLnBrk="1" hangingPunct="1">
+              <a:defRPr>
+                <a:solidFill>
+                  <a:schemeClr val="tx2"/>
+                </a:solidFill>
+              </a:defRPr>
+            </a:lvl4pPr>
+            <a:lvl5pPr eaLnBrk="1" hangingPunct="1">
+              <a:defRPr>
+                <a:solidFill>
+                  <a:schemeClr val="tx2"/>
+                </a:solidFill>
+              </a:defRPr>
+            </a:lvl5pPr>
+            <a:lvl6pPr eaLnBrk="1" hangingPunct="1">
+              <a:defRPr>
+                <a:solidFill>
+                  <a:schemeClr val="tx2"/>
+                </a:solidFill>
+              </a:defRPr>
+            </a:lvl6pPr>
+            <a:lvl7pPr eaLnBrk="1" hangingPunct="1">
+              <a:defRPr>
+                <a:solidFill>
+                  <a:schemeClr val="tx2"/>
+                </a:solidFill>
+              </a:defRPr>
+            </a:lvl7pPr>
+            <a:lvl8pPr eaLnBrk="1" hangingPunct="1">
+              <a:defRPr>
+                <a:solidFill>
+                  <a:schemeClr val="tx2"/>
+                </a:solidFill>
+              </a:defRPr>
+            </a:lvl8pPr>
+            <a:lvl9pPr eaLnBrk="1" hangingPunct="1">
+              <a:defRPr>
+                <a:solidFill>
+                  <a:schemeClr val="tx2"/>
+                </a:solidFill>
+              </a:defRPr>
+            </a:lvl9pPr>
+          </a:lstStyle>
+          <a:p>
+            <a:r>
+              <a:rPr lang="en-GB" dirty="0" err="1"/>
+              <a:t>Nothobranchius</a:t>
+            </a:r>
+            <a:r>
+              <a:rPr lang="en-GB" dirty="0"/>
+              <a:t> </a:t>
+            </a:r>
+            <a:r>
+              <a:rPr lang="en-GB" dirty="0" err="1"/>
+              <a:t>furzeri</a:t>
+            </a:r>
+            <a:r>
+              <a:rPr lang="en-GB" dirty="0"/>
+              <a:t> strain GRZ chromosome</a:t>
+            </a:r>
+          </a:p>
+        </p:txBody>
+      </p:sp>
+    </p:spTree>
+    <p:extLst>
+      <p:ext uri="{BB962C8B-B14F-4D97-AF65-F5344CB8AC3E}">
+        <p14:creationId xmlns:p14="http://schemas.microsoft.com/office/powerpoint/2010/main" val="3588841081"/>
+      </p:ext>
+    </p:extLst>
+  </p:cSld>
+  <p:clrMapOvr>
+    <a:masterClrMapping/>
+  </p:clrMapOvr>
+</p:sld>
+</file>
+
+<file path=ppt/slides/slide11.xml><?xml version="1.0" encoding="utf-8"?>
+<p:sld xmlns:a="http://schemas.openxmlformats.org/drawingml/2006/main" xmlns:r="http://schemas.openxmlformats.org/officeDocument/2006/relationships" xmlns:p="http://schemas.openxmlformats.org/presentationml/2006/main">
+  <p:cSld>
+    <p:bg>
+      <p:bgPr>
+        <a:gradFill rotWithShape="1">
+          <a:gsLst>
+            <a:gs pos="10000">
+              <a:schemeClr val="bg1">
+                <a:tint val="97000"/>
+                <a:hueMod val="92000"/>
+                <a:satMod val="169000"/>
+                <a:lumMod val="164000"/>
+              </a:schemeClr>
+            </a:gs>
+            <a:gs pos="100000">
+              <a:schemeClr val="bg1">
+                <a:shade val="96000"/>
+                <a:satMod val="120000"/>
+                <a:lumMod val="90000"/>
+              </a:schemeClr>
+            </a:gs>
+          </a:gsLst>
+          <a:lin ang="6120000" scaled="1"/>
+        </a:gradFill>
+        <a:effectLst/>
+      </p:bgPr>
+    </p:bg>
+    <p:spTree>
+      <p:nvGrpSpPr>
+        <p:cNvPr id="1" name=""/>
+        <p:cNvGrpSpPr/>
+        <p:nvPr/>
+      </p:nvGrpSpPr>
+      <p:grpSpPr>
+        <a:xfrm>
+          <a:off x="0" y="0"/>
+          <a:ext cx="0" cy="0"/>
+          <a:chOff x="0" y="0"/>
+          <a:chExt cx="0" cy="0"/>
+        </a:xfrm>
+      </p:grpSpPr>
+      <p:sp useBgFill="1">
+        <p:nvSpPr>
+          <p:cNvPr id="8" name="Rectangle 7">
+            <a:extLst>
+              <a:ext uri="{FF2B5EF4-FFF2-40B4-BE49-F238E27FC236}">
+                <a16:creationId xmlns:a16="http://schemas.microsoft.com/office/drawing/2014/main" id="{CADF2543-1B6F-4FBC-A7AF-53A0430E05AB}"/>
+              </a:ext>
+              <a:ext uri="{C183D7F6-B498-43B3-948B-1728B52AA6E4}">
+                <adec:decorative xmlns:adec="http://schemas.microsoft.com/office/drawing/2017/decorative" val="1"/>
+              </a:ext>
+            </a:extLst>
+          </p:cNvPr>
+          <p:cNvSpPr>
+            <a:spLocks noGrp="1" noRot="1" noChangeAspect="1" noMove="1" noResize="1" noEditPoints="1" noAdjustHandles="1" noChangeArrowheads="1" noChangeShapeType="1" noTextEdit="1"/>
+          </p:cNvSpPr>
+          <p:nvPr>
+            <p:extLst>
+              <p:ext uri="{386F3935-93C4-4BCD-93E2-E3B085C9AB24}">
+                <p16:designElem xmlns:p16="http://schemas.microsoft.com/office/powerpoint/2015/main" val="1"/>
+              </p:ext>
+            </p:extLst>
+          </p:nvPr>
+        </p:nvSpPr>
+        <p:spPr>
+          <a:xfrm>
+            <a:off x="0" y="0"/>
+            <a:ext cx="12192000" cy="6858000"/>
+          </a:xfrm>
+          <a:prstGeom prst="rect">
+            <a:avLst/>
+          </a:prstGeom>
+          <a:ln>
+            <a:noFill/>
+          </a:ln>
+        </p:spPr>
+        <p:style>
+          <a:lnRef idx="2">
+            <a:schemeClr val="accent1">
+              <a:shade val="50000"/>
+            </a:schemeClr>
+          </a:lnRef>
+          <a:fillRef idx="1">
+            <a:schemeClr val="accent1"/>
+          </a:fillRef>
+          <a:effectRef idx="0">
+            <a:schemeClr val="accent1"/>
+          </a:effectRef>
+          <a:fontRef idx="minor">
+            <a:schemeClr val="lt1"/>
+          </a:fontRef>
+        </p:style>
+        <p:txBody>
+          <a:bodyPr rtlCol="0" anchor="ctr"/>
           <a:lstStyle/>
           <a:p>
-            <a:r>
-              <a:rPr lang="sr-Latn-RS" dirty="0"/>
-              <a:t>VIZUELIZACIJA REZULTATA</a:t>
-            </a:r>
-            <a:endParaRPr lang="en-GB" dirty="0"/>
+            <a:pPr algn="ctr"/>
+            <a:endParaRPr lang="en-US"/>
           </a:p>
         </p:txBody>
       </p:sp>
@@ -8426,6 +9331,977 @@
           </p:style>
         </p:cxnSp>
       </p:grpSp>
+      <p:graphicFrame>
+        <p:nvGraphicFramePr>
+          <p:cNvPr id="16" name="Content Placeholder 4">
+            <a:extLst>
+              <a:ext uri="{FF2B5EF4-FFF2-40B4-BE49-F238E27FC236}">
+                <a16:creationId xmlns:a16="http://schemas.microsoft.com/office/drawing/2014/main" id="{4F08D1D3-18E0-134D-BCE3-32CB83DAC303}"/>
+              </a:ext>
+            </a:extLst>
+          </p:cNvPr>
+          <p:cNvGraphicFramePr>
+            <a:graphicFrameLocks/>
+          </p:cNvGraphicFramePr>
+          <p:nvPr>
+            <p:extLst>
+              <p:ext uri="{D42A27DB-BD31-4B8C-83A1-F6EECF244321}">
+                <p14:modId xmlns:p14="http://schemas.microsoft.com/office/powerpoint/2010/main" val="2788451705"/>
+              </p:ext>
+            </p:extLst>
+          </p:nvPr>
+        </p:nvGraphicFramePr>
+        <p:xfrm>
+          <a:off x="684212" y="2621281"/>
+          <a:ext cx="8534400" cy="2123440"/>
+        </p:xfrm>
+        <a:graphic>
+          <a:graphicData uri="http://schemas.openxmlformats.org/drawingml/2006/table">
+            <a:tbl>
+              <a:tblPr firstRow="1" firstCol="1" bandRow="1">
+                <a:tableStyleId>{8EC20E35-A176-4012-BC5E-935CFFF8708E}</a:tableStyleId>
+              </a:tblPr>
+              <a:tblGrid>
+                <a:gridCol w="2133600">
+                  <a:extLst>
+                    <a:ext uri="{9D8B030D-6E8A-4147-A177-3AD203B41FA5}">
+                      <a16:colId xmlns:a16="http://schemas.microsoft.com/office/drawing/2014/main" val="2357841546"/>
+                    </a:ext>
+                  </a:extLst>
+                </a:gridCol>
+                <a:gridCol w="2133600">
+                  <a:extLst>
+                    <a:ext uri="{9D8B030D-6E8A-4147-A177-3AD203B41FA5}">
+                      <a16:colId xmlns:a16="http://schemas.microsoft.com/office/drawing/2014/main" val="2214284885"/>
+                    </a:ext>
+                  </a:extLst>
+                </a:gridCol>
+                <a:gridCol w="2133600">
+                  <a:extLst>
+                    <a:ext uri="{9D8B030D-6E8A-4147-A177-3AD203B41FA5}">
+                      <a16:colId xmlns:a16="http://schemas.microsoft.com/office/drawing/2014/main" val="2702606531"/>
+                    </a:ext>
+                  </a:extLst>
+                </a:gridCol>
+                <a:gridCol w="2133600">
+                  <a:extLst>
+                    <a:ext uri="{9D8B030D-6E8A-4147-A177-3AD203B41FA5}">
+                      <a16:colId xmlns:a16="http://schemas.microsoft.com/office/drawing/2014/main" val="2041868178"/>
+                    </a:ext>
+                  </a:extLst>
+                </a:gridCol>
+              </a:tblGrid>
+              <a:tr h="0">
+                <a:tc>
+                  <a:txBody>
+                    <a:bodyPr/>
+                    <a:lstStyle/>
+                    <a:p>
+                      <a:r>
+                        <a:rPr lang="en-US" dirty="0" err="1"/>
+                        <a:t>Naziv</a:t>
+                      </a:r>
+                      <a:r>
+                        <a:rPr lang="en-US" dirty="0"/>
+                        <a:t> </a:t>
+                      </a:r>
+                      <a:r>
+                        <a:rPr lang="en-US" dirty="0" err="1"/>
+                        <a:t>algoritma</a:t>
+                      </a:r>
+                      <a:endParaRPr lang="en-US" dirty="0"/>
+                    </a:p>
+                  </a:txBody>
+                  <a:tcPr/>
+                </a:tc>
+                <a:tc>
+                  <a:txBody>
+                    <a:bodyPr/>
+                    <a:lstStyle/>
+                    <a:p>
+                      <a:r>
+                        <a:rPr lang="en-US" dirty="0" err="1"/>
+                        <a:t>Iskorišćenje</a:t>
+                      </a:r>
+                      <a:r>
+                        <a:rPr lang="en-US" dirty="0"/>
+                        <a:t> </a:t>
+                      </a:r>
+                      <a:r>
+                        <a:rPr lang="en-US" dirty="0" err="1"/>
+                        <a:t>memorije</a:t>
+                      </a:r>
+                      <a:endParaRPr lang="en-US" dirty="0"/>
+                    </a:p>
+                  </a:txBody>
+                  <a:tcPr/>
+                </a:tc>
+                <a:tc>
+                  <a:txBody>
+                    <a:bodyPr/>
+                    <a:lstStyle/>
+                    <a:p>
+                      <a:r>
+                        <a:rPr lang="en-US" dirty="0" err="1"/>
+                        <a:t>Vreme</a:t>
+                      </a:r>
+                      <a:r>
+                        <a:rPr lang="en-US" dirty="0"/>
+                        <a:t> </a:t>
+                      </a:r>
+                      <a:r>
+                        <a:rPr lang="en-US" dirty="0" err="1"/>
+                        <a:t>inicijalizacije</a:t>
+                      </a:r>
+                      <a:endParaRPr lang="en-US" dirty="0"/>
+                    </a:p>
+                  </a:txBody>
+                  <a:tcPr/>
+                </a:tc>
+                <a:tc>
+                  <a:txBody>
+                    <a:bodyPr/>
+                    <a:lstStyle/>
+                    <a:p>
+                      <a:r>
+                        <a:rPr lang="en-US" dirty="0" err="1"/>
+                        <a:t>Ukupno</a:t>
+                      </a:r>
+                      <a:r>
+                        <a:rPr lang="en-US" dirty="0"/>
+                        <a:t> </a:t>
+                      </a:r>
+                      <a:r>
+                        <a:rPr lang="en-US" dirty="0" err="1"/>
+                        <a:t>vreme</a:t>
+                      </a:r>
+                      <a:r>
+                        <a:rPr lang="en-US" dirty="0"/>
+                        <a:t> </a:t>
+                      </a:r>
+                      <a:r>
+                        <a:rPr lang="en-US" dirty="0" err="1"/>
+                        <a:t>pretrage</a:t>
+                      </a:r>
+                      <a:endParaRPr lang="en-US" dirty="0"/>
+                    </a:p>
+                  </a:txBody>
+                  <a:tcPr/>
+                </a:tc>
+                <a:extLst>
+                  <a:ext uri="{0D108BD9-81ED-4DB2-BD59-A6C34878D82A}">
+                    <a16:rowId xmlns:a16="http://schemas.microsoft.com/office/drawing/2014/main" val="3986939029"/>
+                  </a:ext>
+                </a:extLst>
+              </a:tr>
+              <a:tr h="370840">
+                <a:tc>
+                  <a:txBody>
+                    <a:bodyPr/>
+                    <a:lstStyle/>
+                    <a:p>
+                      <a:r>
+                        <a:rPr lang="en-US" dirty="0"/>
+                        <a:t>Index Sorted</a:t>
+                      </a:r>
+                    </a:p>
+                  </a:txBody>
+                  <a:tcPr/>
+                </a:tc>
+                <a:tc>
+                  <a:txBody>
+                    <a:bodyPr/>
+                    <a:lstStyle/>
+                    <a:p>
+                      <a:r>
+                        <a:rPr lang="en-US" dirty="0"/>
+                        <a:t> GB</a:t>
+                      </a:r>
+                    </a:p>
+                  </a:txBody>
+                  <a:tcPr/>
+                </a:tc>
+                <a:tc>
+                  <a:txBody>
+                    <a:bodyPr/>
+                    <a:lstStyle/>
+                    <a:p>
+                      <a:r>
+                        <a:rPr lang="en-US" dirty="0"/>
+                        <a:t>min</a:t>
+                      </a:r>
+                    </a:p>
+                  </a:txBody>
+                  <a:tcPr/>
+                </a:tc>
+                <a:tc>
+                  <a:txBody>
+                    <a:bodyPr/>
+                    <a:lstStyle/>
+                    <a:p>
+                      <a:r>
+                        <a:rPr lang="en-US" dirty="0"/>
+                        <a:t>sec</a:t>
+                      </a:r>
+                    </a:p>
+                  </a:txBody>
+                  <a:tcPr/>
+                </a:tc>
+                <a:extLst>
+                  <a:ext uri="{0D108BD9-81ED-4DB2-BD59-A6C34878D82A}">
+                    <a16:rowId xmlns:a16="http://schemas.microsoft.com/office/drawing/2014/main" val="1053902984"/>
+                  </a:ext>
+                </a:extLst>
+              </a:tr>
+              <a:tr h="370840">
+                <a:tc>
+                  <a:txBody>
+                    <a:bodyPr/>
+                    <a:lstStyle/>
+                    <a:p>
+                      <a:r>
+                        <a:rPr lang="en-US" dirty="0"/>
+                        <a:t>Index Hash</a:t>
+                      </a:r>
+                    </a:p>
+                  </a:txBody>
+                  <a:tcPr/>
+                </a:tc>
+                <a:tc>
+                  <a:txBody>
+                    <a:bodyPr/>
+                    <a:lstStyle/>
+                    <a:p>
+                      <a:r>
+                        <a:rPr lang="en-US" dirty="0"/>
+                        <a:t>GB</a:t>
+                      </a:r>
+                    </a:p>
+                  </a:txBody>
+                  <a:tcPr/>
+                </a:tc>
+                <a:tc>
+                  <a:txBody>
+                    <a:bodyPr/>
+                    <a:lstStyle/>
+                    <a:p>
+                      <a:r>
+                        <a:rPr lang="en-US" dirty="0"/>
+                        <a:t>min</a:t>
+                      </a:r>
+                    </a:p>
+                  </a:txBody>
+                  <a:tcPr/>
+                </a:tc>
+                <a:tc>
+                  <a:txBody>
+                    <a:bodyPr/>
+                    <a:lstStyle/>
+                    <a:p>
+                      <a:r>
+                        <a:rPr lang="en-US" dirty="0"/>
+                        <a:t>sec</a:t>
+                      </a:r>
+                    </a:p>
+                  </a:txBody>
+                  <a:tcPr/>
+                </a:tc>
+                <a:extLst>
+                  <a:ext uri="{0D108BD9-81ED-4DB2-BD59-A6C34878D82A}">
+                    <a16:rowId xmlns:a16="http://schemas.microsoft.com/office/drawing/2014/main" val="1781080610"/>
+                  </a:ext>
+                </a:extLst>
+              </a:tr>
+              <a:tr h="370840">
+                <a:tc>
+                  <a:txBody>
+                    <a:bodyPr/>
+                    <a:lstStyle/>
+                    <a:p>
+                      <a:r>
+                        <a:rPr lang="en-US" dirty="0"/>
+                        <a:t>Suffix Array</a:t>
+                      </a:r>
+                    </a:p>
+                  </a:txBody>
+                  <a:tcPr/>
+                </a:tc>
+                <a:tc>
+                  <a:txBody>
+                    <a:bodyPr/>
+                    <a:lstStyle/>
+                    <a:p>
+                      <a:r>
+                        <a:rPr lang="en-US" dirty="0"/>
+                        <a:t>GB</a:t>
+                      </a:r>
+                    </a:p>
+                  </a:txBody>
+                  <a:tcPr/>
+                </a:tc>
+                <a:tc>
+                  <a:txBody>
+                    <a:bodyPr/>
+                    <a:lstStyle/>
+                    <a:p>
+                      <a:r>
+                        <a:rPr lang="en-US" dirty="0"/>
+                        <a:t>min</a:t>
+                      </a:r>
+                    </a:p>
+                  </a:txBody>
+                  <a:tcPr/>
+                </a:tc>
+                <a:tc>
+                  <a:txBody>
+                    <a:bodyPr/>
+                    <a:lstStyle/>
+                    <a:p>
+                      <a:r>
+                        <a:rPr lang="en-US" dirty="0"/>
+                        <a:t>sec</a:t>
+                      </a:r>
+                    </a:p>
+                  </a:txBody>
+                  <a:tcPr/>
+                </a:tc>
+                <a:extLst>
+                  <a:ext uri="{0D108BD9-81ED-4DB2-BD59-A6C34878D82A}">
+                    <a16:rowId xmlns:a16="http://schemas.microsoft.com/office/drawing/2014/main" val="872050463"/>
+                  </a:ext>
+                </a:extLst>
+              </a:tr>
+              <a:tr h="370840">
+                <a:tc>
+                  <a:txBody>
+                    <a:bodyPr/>
+                    <a:lstStyle/>
+                    <a:p>
+                      <a:r>
+                        <a:rPr lang="en-US" dirty="0"/>
+                        <a:t>Suffix Tree</a:t>
+                      </a:r>
+                    </a:p>
+                  </a:txBody>
+                  <a:tcPr/>
+                </a:tc>
+                <a:tc>
+                  <a:txBody>
+                    <a:bodyPr/>
+                    <a:lstStyle/>
+                    <a:p>
+                      <a:r>
+                        <a:rPr lang="en-US" dirty="0"/>
+                        <a:t>GB</a:t>
+                      </a:r>
+                    </a:p>
+                  </a:txBody>
+                  <a:tcPr/>
+                </a:tc>
+                <a:tc>
+                  <a:txBody>
+                    <a:bodyPr/>
+                    <a:lstStyle/>
+                    <a:p>
+                      <a:r>
+                        <a:rPr lang="en-US" dirty="0"/>
+                        <a:t>min</a:t>
+                      </a:r>
+                    </a:p>
+                  </a:txBody>
+                  <a:tcPr/>
+                </a:tc>
+                <a:tc>
+                  <a:txBody>
+                    <a:bodyPr/>
+                    <a:lstStyle/>
+                    <a:p>
+                      <a:r>
+                        <a:rPr lang="en-US" dirty="0"/>
+                        <a:t>sec</a:t>
+                      </a:r>
+                    </a:p>
+                  </a:txBody>
+                  <a:tcPr/>
+                </a:tc>
+                <a:extLst>
+                  <a:ext uri="{0D108BD9-81ED-4DB2-BD59-A6C34878D82A}">
+                    <a16:rowId xmlns:a16="http://schemas.microsoft.com/office/drawing/2014/main" val="4077551856"/>
+                  </a:ext>
+                </a:extLst>
+              </a:tr>
+            </a:tbl>
+          </a:graphicData>
+        </a:graphic>
+      </p:graphicFrame>
+      <p:sp>
+        <p:nvSpPr>
+          <p:cNvPr id="17" name="Title 1">
+            <a:extLst>
+              <a:ext uri="{FF2B5EF4-FFF2-40B4-BE49-F238E27FC236}">
+                <a16:creationId xmlns:a16="http://schemas.microsoft.com/office/drawing/2014/main" id="{7B286EFF-E4DF-8948-86DE-B72759BC62FC}"/>
+              </a:ext>
+            </a:extLst>
+          </p:cNvPr>
+          <p:cNvSpPr txBox="1">
+            <a:spLocks/>
+          </p:cNvSpPr>
+          <p:nvPr/>
+        </p:nvSpPr>
+        <p:spPr>
+          <a:xfrm>
+            <a:off x="684212" y="485244"/>
+            <a:ext cx="8534400" cy="1507067"/>
+          </a:xfrm>
+          <a:prstGeom prst="rect">
+            <a:avLst/>
+          </a:prstGeom>
+          <a:effectLst/>
+        </p:spPr>
+        <p:txBody>
+          <a:bodyPr vert="horz" lIns="91440" tIns="45720" rIns="91440" bIns="45720" rtlCol="0" anchor="ctr">
+            <a:normAutofit/>
+          </a:bodyPr>
+          <a:lstStyle>
+            <a:lvl1pPr algn="l" defTabSz="457200" rtl="0" eaLnBrk="1" latinLnBrk="0" hangingPunct="1">
+              <a:spcBef>
+                <a:spcPct val="0"/>
+              </a:spcBef>
+              <a:buNone/>
+              <a:defRPr sz="3600" kern="1200" cap="all">
+                <a:ln w="3175" cmpd="sng">
+                  <a:noFill/>
+                </a:ln>
+                <a:solidFill>
+                  <a:schemeClr val="tx1"/>
+                </a:solidFill>
+                <a:effectLst/>
+                <a:latin typeface="+mj-lt"/>
+                <a:ea typeface="+mj-ea"/>
+                <a:cs typeface="+mj-cs"/>
+              </a:defRPr>
+            </a:lvl1pPr>
+            <a:lvl2pPr eaLnBrk="1" hangingPunct="1">
+              <a:defRPr>
+                <a:solidFill>
+                  <a:schemeClr val="tx2"/>
+                </a:solidFill>
+              </a:defRPr>
+            </a:lvl2pPr>
+            <a:lvl3pPr eaLnBrk="1" hangingPunct="1">
+              <a:defRPr>
+                <a:solidFill>
+                  <a:schemeClr val="tx2"/>
+                </a:solidFill>
+              </a:defRPr>
+            </a:lvl3pPr>
+            <a:lvl4pPr eaLnBrk="1" hangingPunct="1">
+              <a:defRPr>
+                <a:solidFill>
+                  <a:schemeClr val="tx2"/>
+                </a:solidFill>
+              </a:defRPr>
+            </a:lvl4pPr>
+            <a:lvl5pPr eaLnBrk="1" hangingPunct="1">
+              <a:defRPr>
+                <a:solidFill>
+                  <a:schemeClr val="tx2"/>
+                </a:solidFill>
+              </a:defRPr>
+            </a:lvl5pPr>
+            <a:lvl6pPr eaLnBrk="1" hangingPunct="1">
+              <a:defRPr>
+                <a:solidFill>
+                  <a:schemeClr val="tx2"/>
+                </a:solidFill>
+              </a:defRPr>
+            </a:lvl6pPr>
+            <a:lvl7pPr eaLnBrk="1" hangingPunct="1">
+              <a:defRPr>
+                <a:solidFill>
+                  <a:schemeClr val="tx2"/>
+                </a:solidFill>
+              </a:defRPr>
+            </a:lvl7pPr>
+            <a:lvl8pPr eaLnBrk="1" hangingPunct="1">
+              <a:defRPr>
+                <a:solidFill>
+                  <a:schemeClr val="tx2"/>
+                </a:solidFill>
+              </a:defRPr>
+            </a:lvl8pPr>
+            <a:lvl9pPr eaLnBrk="1" hangingPunct="1">
+              <a:defRPr>
+                <a:solidFill>
+                  <a:schemeClr val="tx2"/>
+                </a:solidFill>
+              </a:defRPr>
+            </a:lvl9pPr>
+          </a:lstStyle>
+          <a:p>
+            <a:r>
+              <a:rPr lang="en-GB" dirty="0"/>
+              <a:t>Mus </a:t>
+            </a:r>
+            <a:r>
+              <a:rPr lang="en-GB" dirty="0" err="1"/>
+              <a:t>pahari</a:t>
+            </a:r>
+            <a:r>
+              <a:rPr lang="en-GB" dirty="0"/>
+              <a:t> chromosome X</a:t>
+            </a:r>
+          </a:p>
+        </p:txBody>
+      </p:sp>
+    </p:spTree>
+    <p:extLst>
+      <p:ext uri="{BB962C8B-B14F-4D97-AF65-F5344CB8AC3E}">
+        <p14:creationId xmlns:p14="http://schemas.microsoft.com/office/powerpoint/2010/main" val="2580952193"/>
+      </p:ext>
+    </p:extLst>
+  </p:cSld>
+  <p:clrMapOvr>
+    <a:masterClrMapping/>
+  </p:clrMapOvr>
+</p:sld>
+</file>
+
+<file path=ppt/slides/slide12.xml><?xml version="1.0" encoding="utf-8"?>
+<p:sld xmlns:a="http://schemas.openxmlformats.org/drawingml/2006/main" xmlns:r="http://schemas.openxmlformats.org/officeDocument/2006/relationships" xmlns:p="http://schemas.openxmlformats.org/presentationml/2006/main">
+  <p:cSld>
+    <p:bg>
+      <p:bgPr>
+        <a:gradFill rotWithShape="1">
+          <a:gsLst>
+            <a:gs pos="10000">
+              <a:schemeClr val="bg1">
+                <a:tint val="97000"/>
+                <a:hueMod val="92000"/>
+                <a:satMod val="169000"/>
+                <a:lumMod val="164000"/>
+              </a:schemeClr>
+            </a:gs>
+            <a:gs pos="100000">
+              <a:schemeClr val="bg1">
+                <a:shade val="96000"/>
+                <a:satMod val="120000"/>
+                <a:lumMod val="90000"/>
+              </a:schemeClr>
+            </a:gs>
+          </a:gsLst>
+          <a:lin ang="6120000" scaled="1"/>
+        </a:gradFill>
+        <a:effectLst/>
+      </p:bgPr>
+    </p:bg>
+    <p:spTree>
+      <p:nvGrpSpPr>
+        <p:cNvPr id="1" name=""/>
+        <p:cNvGrpSpPr/>
+        <p:nvPr/>
+      </p:nvGrpSpPr>
+      <p:grpSpPr>
+        <a:xfrm>
+          <a:off x="0" y="0"/>
+          <a:ext cx="0" cy="0"/>
+          <a:chOff x="0" y="0"/>
+          <a:chExt cx="0" cy="0"/>
+        </a:xfrm>
+      </p:grpSpPr>
+      <p:sp useBgFill="1">
+        <p:nvSpPr>
+          <p:cNvPr id="8" name="Rectangle 7">
+            <a:extLst>
+              <a:ext uri="{FF2B5EF4-FFF2-40B4-BE49-F238E27FC236}">
+                <a16:creationId xmlns:a16="http://schemas.microsoft.com/office/drawing/2014/main" id="{CADF2543-1B6F-4FBC-A7AF-53A0430E05AB}"/>
+              </a:ext>
+              <a:ext uri="{C183D7F6-B498-43B3-948B-1728B52AA6E4}">
+                <adec:decorative xmlns:adec="http://schemas.microsoft.com/office/drawing/2017/decorative" val="1"/>
+              </a:ext>
+            </a:extLst>
+          </p:cNvPr>
+          <p:cNvSpPr>
+            <a:spLocks noGrp="1" noRot="1" noChangeAspect="1" noMove="1" noResize="1" noEditPoints="1" noAdjustHandles="1" noChangeArrowheads="1" noChangeShapeType="1" noTextEdit="1"/>
+          </p:cNvSpPr>
+          <p:nvPr>
+            <p:extLst>
+              <p:ext uri="{386F3935-93C4-4BCD-93E2-E3B085C9AB24}">
+                <p16:designElem xmlns:p16="http://schemas.microsoft.com/office/powerpoint/2015/main" val="1"/>
+              </p:ext>
+            </p:extLst>
+          </p:nvPr>
+        </p:nvSpPr>
+        <p:spPr>
+          <a:xfrm>
+            <a:off x="0" y="0"/>
+            <a:ext cx="12192000" cy="6858000"/>
+          </a:xfrm>
+          <a:prstGeom prst="rect">
+            <a:avLst/>
+          </a:prstGeom>
+          <a:ln>
+            <a:noFill/>
+          </a:ln>
+        </p:spPr>
+        <p:style>
+          <a:lnRef idx="2">
+            <a:schemeClr val="accent1">
+              <a:shade val="50000"/>
+            </a:schemeClr>
+          </a:lnRef>
+          <a:fillRef idx="1">
+            <a:schemeClr val="accent1"/>
+          </a:fillRef>
+          <a:effectRef idx="0">
+            <a:schemeClr val="accent1"/>
+          </a:effectRef>
+          <a:fontRef idx="minor">
+            <a:schemeClr val="lt1"/>
+          </a:fontRef>
+        </p:style>
+        <p:txBody>
+          <a:bodyPr rtlCol="0" anchor="ctr"/>
+          <a:lstStyle/>
+          <a:p>
+            <a:pPr algn="ctr"/>
+            <a:endParaRPr lang="en-US"/>
+          </a:p>
+        </p:txBody>
+      </p:sp>
+      <p:sp>
+        <p:nvSpPr>
+          <p:cNvPr id="2" name="Title 1">
+            <a:extLst>
+              <a:ext uri="{FF2B5EF4-FFF2-40B4-BE49-F238E27FC236}">
+                <a16:creationId xmlns:a16="http://schemas.microsoft.com/office/drawing/2014/main" id="{A2AE66D6-9DA2-4151-8548-6CACA7CD1179}"/>
+              </a:ext>
+            </a:extLst>
+          </p:cNvPr>
+          <p:cNvSpPr>
+            <a:spLocks noGrp="1"/>
+          </p:cNvSpPr>
+          <p:nvPr>
+            <p:ph type="title"/>
+          </p:nvPr>
+        </p:nvSpPr>
+        <p:spPr>
+          <a:xfrm>
+            <a:off x="684212" y="485244"/>
+            <a:ext cx="8534400" cy="1507067"/>
+          </a:xfrm>
+        </p:spPr>
+        <p:txBody>
+          <a:bodyPr>
+            <a:normAutofit/>
+          </a:bodyPr>
+          <a:lstStyle/>
+          <a:p>
+            <a:r>
+              <a:rPr lang="sr-Latn-RS" dirty="0"/>
+              <a:t>VIZUELIZACIJA REZULTATA</a:t>
+            </a:r>
+            <a:endParaRPr lang="en-GB" dirty="0"/>
+          </a:p>
+        </p:txBody>
+      </p:sp>
+      <p:grpSp>
+        <p:nvGrpSpPr>
+          <p:cNvPr id="10" name="Group 9">
+            <a:extLst>
+              <a:ext uri="{FF2B5EF4-FFF2-40B4-BE49-F238E27FC236}">
+                <a16:creationId xmlns:a16="http://schemas.microsoft.com/office/drawing/2014/main" id="{A80A6E81-6B71-43DF-877B-E964A9A4CB68}"/>
+              </a:ext>
+              <a:ext uri="{C183D7F6-B498-43B3-948B-1728B52AA6E4}">
+                <adec:decorative xmlns:adec="http://schemas.microsoft.com/office/drawing/2017/decorative" val="1"/>
+              </a:ext>
+            </a:extLst>
+          </p:cNvPr>
+          <p:cNvGrpSpPr>
+            <a:grpSpLocks noGrp="1" noUngrp="1" noRot="1" noChangeAspect="1" noMove="1" noResize="1"/>
+          </p:cNvGrpSpPr>
+          <p:nvPr>
+            <p:extLst>
+              <p:ext uri="{386F3935-93C4-4BCD-93E2-E3B085C9AB24}">
+                <p16:designElem xmlns:p16="http://schemas.microsoft.com/office/powerpoint/2015/main" val="1"/>
+              </p:ext>
+            </p:extLst>
+          </p:nvPr>
+        </p:nvGrpSpPr>
+        <p:grpSpPr>
+          <a:xfrm>
+            <a:off x="9206969" y="2963333"/>
+            <a:ext cx="2981858" cy="3208867"/>
+            <a:chOff x="9206969" y="2963333"/>
+            <a:chExt cx="2981858" cy="3208867"/>
+          </a:xfrm>
+        </p:grpSpPr>
+        <p:cxnSp>
+          <p:nvCxnSpPr>
+            <p:cNvPr id="11" name="Straight Connector 10">
+              <a:extLst>
+                <a:ext uri="{FF2B5EF4-FFF2-40B4-BE49-F238E27FC236}">
+                  <a16:creationId xmlns:a16="http://schemas.microsoft.com/office/drawing/2014/main" id="{4E35C3AD-357F-4004-A3F3-2D4EAF34A63D}"/>
+                </a:ext>
+                <a:ext uri="{C183D7F6-B498-43B3-948B-1728B52AA6E4}">
+                  <adec:decorative xmlns:adec="http://schemas.microsoft.com/office/drawing/2017/decorative" val="1"/>
+                </a:ext>
+              </a:extLst>
+            </p:cNvPr>
+            <p:cNvCxnSpPr/>
+            <p:nvPr>
+              <p:extLst>
+                <p:ext uri="{386F3935-93C4-4BCD-93E2-E3B085C9AB24}">
+                  <p16:designElem xmlns:p16="http://schemas.microsoft.com/office/powerpoint/2015/main" val="1"/>
+                </p:ext>
+              </p:extLst>
+            </p:nvPr>
+          </p:nvCxnSpPr>
+          <p:spPr>
+            <a:xfrm flipH="1">
+              <a:off x="11276012" y="2963333"/>
+              <a:ext cx="912814" cy="912812"/>
+            </a:xfrm>
+            <a:prstGeom prst="line">
+              <a:avLst/>
+            </a:prstGeom>
+            <a:ln w="9525">
+              <a:solidFill>
+                <a:schemeClr val="tx2">
+                  <a:lumMod val="75000"/>
+                  <a:alpha val="80000"/>
+                </a:schemeClr>
+              </a:solidFill>
+            </a:ln>
+          </p:spPr>
+          <p:style>
+            <a:lnRef idx="2">
+              <a:schemeClr val="accent1"/>
+            </a:lnRef>
+            <a:fillRef idx="0">
+              <a:schemeClr val="accent1"/>
+            </a:fillRef>
+            <a:effectRef idx="1">
+              <a:schemeClr val="accent1"/>
+            </a:effectRef>
+            <a:fontRef idx="minor">
+              <a:schemeClr val="tx1"/>
+            </a:fontRef>
+          </p:style>
+        </p:cxnSp>
+        <p:cxnSp>
+          <p:nvCxnSpPr>
+            <p:cNvPr id="12" name="Straight Connector 11">
+              <a:extLst>
+                <a:ext uri="{FF2B5EF4-FFF2-40B4-BE49-F238E27FC236}">
+                  <a16:creationId xmlns:a16="http://schemas.microsoft.com/office/drawing/2014/main" id="{337B6032-0A70-4F26-A9A3-B4D60DF11818}"/>
+                </a:ext>
+                <a:ext uri="{C183D7F6-B498-43B3-948B-1728B52AA6E4}">
+                  <adec:decorative xmlns:adec="http://schemas.microsoft.com/office/drawing/2017/decorative" val="1"/>
+                </a:ext>
+              </a:extLst>
+            </p:cNvPr>
+            <p:cNvCxnSpPr/>
+            <p:nvPr>
+              <p:extLst>
+                <p:ext uri="{386F3935-93C4-4BCD-93E2-E3B085C9AB24}">
+                  <p16:designElem xmlns:p16="http://schemas.microsoft.com/office/powerpoint/2015/main" val="1"/>
+                </p:ext>
+              </p:extLst>
+            </p:nvPr>
+          </p:nvCxnSpPr>
+          <p:spPr>
+            <a:xfrm flipH="1">
+              <a:off x="9206969" y="3190344"/>
+              <a:ext cx="2981857" cy="2981856"/>
+            </a:xfrm>
+            <a:prstGeom prst="line">
+              <a:avLst/>
+            </a:prstGeom>
+            <a:ln w="9525">
+              <a:solidFill>
+                <a:schemeClr val="tx2">
+                  <a:lumMod val="75000"/>
+                  <a:alpha val="80000"/>
+                </a:schemeClr>
+              </a:solidFill>
+            </a:ln>
+          </p:spPr>
+          <p:style>
+            <a:lnRef idx="2">
+              <a:schemeClr val="accent1"/>
+            </a:lnRef>
+            <a:fillRef idx="0">
+              <a:schemeClr val="accent1"/>
+            </a:fillRef>
+            <a:effectRef idx="1">
+              <a:schemeClr val="accent1"/>
+            </a:effectRef>
+            <a:fontRef idx="minor">
+              <a:schemeClr val="tx1"/>
+            </a:fontRef>
+          </p:style>
+        </p:cxnSp>
+        <p:cxnSp>
+          <p:nvCxnSpPr>
+            <p:cNvPr id="13" name="Straight Connector 12">
+              <a:extLst>
+                <a:ext uri="{FF2B5EF4-FFF2-40B4-BE49-F238E27FC236}">
+                  <a16:creationId xmlns:a16="http://schemas.microsoft.com/office/drawing/2014/main" id="{DE192CE3-3DD1-448F-93BE-42983DA0D5A9}"/>
+                </a:ext>
+                <a:ext uri="{C183D7F6-B498-43B3-948B-1728B52AA6E4}">
+                  <adec:decorative xmlns:adec="http://schemas.microsoft.com/office/drawing/2017/decorative" val="1"/>
+                </a:ext>
+              </a:extLst>
+            </p:cNvPr>
+            <p:cNvCxnSpPr/>
+            <p:nvPr>
+              <p:extLst>
+                <p:ext uri="{386F3935-93C4-4BCD-93E2-E3B085C9AB24}">
+                  <p16:designElem xmlns:p16="http://schemas.microsoft.com/office/powerpoint/2015/main" val="1"/>
+                </p:ext>
+              </p:extLst>
+            </p:nvPr>
+          </p:nvCxnSpPr>
+          <p:spPr>
+            <a:xfrm flipH="1">
+              <a:off x="10292292" y="3285067"/>
+              <a:ext cx="1896534" cy="1896533"/>
+            </a:xfrm>
+            <a:prstGeom prst="line">
+              <a:avLst/>
+            </a:prstGeom>
+            <a:ln w="9525">
+              <a:solidFill>
+                <a:schemeClr val="tx2">
+                  <a:lumMod val="75000"/>
+                  <a:alpha val="80000"/>
+                </a:schemeClr>
+              </a:solidFill>
+            </a:ln>
+          </p:spPr>
+          <p:style>
+            <a:lnRef idx="2">
+              <a:schemeClr val="accent1"/>
+            </a:lnRef>
+            <a:fillRef idx="0">
+              <a:schemeClr val="accent1"/>
+            </a:fillRef>
+            <a:effectRef idx="1">
+              <a:schemeClr val="accent1"/>
+            </a:effectRef>
+            <a:fontRef idx="minor">
+              <a:schemeClr val="tx1"/>
+            </a:fontRef>
+          </p:style>
+        </p:cxnSp>
+        <p:cxnSp>
+          <p:nvCxnSpPr>
+            <p:cNvPr id="14" name="Straight Connector 13">
+              <a:extLst>
+                <a:ext uri="{FF2B5EF4-FFF2-40B4-BE49-F238E27FC236}">
+                  <a16:creationId xmlns:a16="http://schemas.microsoft.com/office/drawing/2014/main" id="{E6D3DA09-5C72-4562-BEDE-1937DF87E81D}"/>
+                </a:ext>
+                <a:ext uri="{C183D7F6-B498-43B3-948B-1728B52AA6E4}">
+                  <adec:decorative xmlns:adec="http://schemas.microsoft.com/office/drawing/2017/decorative" val="1"/>
+                </a:ext>
+              </a:extLst>
+            </p:cNvPr>
+            <p:cNvCxnSpPr/>
+            <p:nvPr>
+              <p:extLst>
+                <p:ext uri="{386F3935-93C4-4BCD-93E2-E3B085C9AB24}">
+                  <p16:designElem xmlns:p16="http://schemas.microsoft.com/office/powerpoint/2015/main" val="1"/>
+                </p:ext>
+              </p:extLst>
+            </p:nvPr>
+          </p:nvCxnSpPr>
+          <p:spPr>
+            <a:xfrm flipH="1">
+              <a:off x="10443103" y="3131080"/>
+              <a:ext cx="1745722" cy="1745720"/>
+            </a:xfrm>
+            <a:prstGeom prst="line">
+              <a:avLst/>
+            </a:prstGeom>
+            <a:ln w="28575">
+              <a:solidFill>
+                <a:schemeClr val="tx2">
+                  <a:lumMod val="75000"/>
+                  <a:alpha val="80000"/>
+                </a:schemeClr>
+              </a:solidFill>
+            </a:ln>
+          </p:spPr>
+          <p:style>
+            <a:lnRef idx="2">
+              <a:schemeClr val="accent1"/>
+            </a:lnRef>
+            <a:fillRef idx="0">
+              <a:schemeClr val="accent1"/>
+            </a:fillRef>
+            <a:effectRef idx="1">
+              <a:schemeClr val="accent1"/>
+            </a:effectRef>
+            <a:fontRef idx="minor">
+              <a:schemeClr val="tx1"/>
+            </a:fontRef>
+          </p:style>
+        </p:cxnSp>
+        <p:cxnSp>
+          <p:nvCxnSpPr>
+            <p:cNvPr id="15" name="Straight Connector 14">
+              <a:extLst>
+                <a:ext uri="{FF2B5EF4-FFF2-40B4-BE49-F238E27FC236}">
+                  <a16:creationId xmlns:a16="http://schemas.microsoft.com/office/drawing/2014/main" id="{D6ACA7CA-2A20-49D7-9053-E076463D79A3}"/>
+                </a:ext>
+                <a:ext uri="{C183D7F6-B498-43B3-948B-1728B52AA6E4}">
+                  <adec:decorative xmlns:adec="http://schemas.microsoft.com/office/drawing/2017/decorative" val="1"/>
+                </a:ext>
+              </a:extLst>
+            </p:cNvPr>
+            <p:cNvCxnSpPr/>
+            <p:nvPr>
+              <p:extLst>
+                <p:ext uri="{386F3935-93C4-4BCD-93E2-E3B085C9AB24}">
+                  <p16:designElem xmlns:p16="http://schemas.microsoft.com/office/powerpoint/2015/main" val="1"/>
+                </p:ext>
+              </p:extLst>
+            </p:nvPr>
+          </p:nvCxnSpPr>
+          <p:spPr>
+            <a:xfrm flipH="1">
+              <a:off x="10918826" y="3683001"/>
+              <a:ext cx="1270001" cy="1269999"/>
+            </a:xfrm>
+            <a:prstGeom prst="line">
+              <a:avLst/>
+            </a:prstGeom>
+            <a:ln w="28575">
+              <a:solidFill>
+                <a:schemeClr val="tx2">
+                  <a:lumMod val="75000"/>
+                  <a:alpha val="80000"/>
+                </a:schemeClr>
+              </a:solidFill>
+            </a:ln>
+          </p:spPr>
+          <p:style>
+            <a:lnRef idx="2">
+              <a:schemeClr val="accent1"/>
+            </a:lnRef>
+            <a:fillRef idx="0">
+              <a:schemeClr val="accent1"/>
+            </a:fillRef>
+            <a:effectRef idx="1">
+              <a:schemeClr val="accent1"/>
+            </a:effectRef>
+            <a:fontRef idx="minor">
+              <a:schemeClr val="tx1"/>
+            </a:fontRef>
+          </p:style>
+        </p:cxnSp>
+      </p:grpSp>
       <p:sp>
         <p:nvSpPr>
           <p:cNvPr id="3" name="Content Placeholder 2">
@@ -8475,7 +10351,7 @@
 </p:sld>
 </file>
 
-<file path=ppt/slides/slide11.xml><?xml version="1.0" encoding="utf-8"?>
+<file path=ppt/slides/slide13.xml><?xml version="1.0" encoding="utf-8"?>
 <p:sld xmlns:a="http://schemas.openxmlformats.org/drawingml/2006/main" xmlns:r="http://schemas.openxmlformats.org/officeDocument/2006/relationships" xmlns:p="http://schemas.openxmlformats.org/presentationml/2006/main">
   <p:cSld>
     <p:bg>
@@ -14809,42 +16685,6 @@
           </a:p>
         </p:txBody>
       </p:sp>
-      <p:sp>
-        <p:nvSpPr>
-          <p:cNvPr id="2" name="Title 1">
-            <a:extLst>
-              <a:ext uri="{FF2B5EF4-FFF2-40B4-BE49-F238E27FC236}">
-                <a16:creationId xmlns:a16="http://schemas.microsoft.com/office/drawing/2014/main" id="{A2AE66D6-9DA2-4151-8548-6CACA7CD1179}"/>
-              </a:ext>
-            </a:extLst>
-          </p:cNvPr>
-          <p:cNvSpPr>
-            <a:spLocks noGrp="1"/>
-          </p:cNvSpPr>
-          <p:nvPr>
-            <p:ph type="title"/>
-          </p:nvPr>
-        </p:nvSpPr>
-        <p:spPr>
-          <a:xfrm>
-            <a:off x="684212" y="485244"/>
-            <a:ext cx="8534400" cy="1507067"/>
-          </a:xfrm>
-        </p:spPr>
-        <p:txBody>
-          <a:bodyPr>
-            <a:normAutofit/>
-          </a:bodyPr>
-          <a:lstStyle/>
-          <a:p>
-            <a:r>
-              <a:rPr lang="sr-Latn-RS" dirty="0"/>
-              <a:t>Poređenje algoritama</a:t>
-            </a:r>
-            <a:endParaRPr lang="en-GB" dirty="0"/>
-          </a:p>
-        </p:txBody>
-      </p:sp>
       <p:grpSp>
         <p:nvGrpSpPr>
           <p:cNvPr id="10" name="Group 9">
@@ -15142,86 +16982,6 @@
           </p:style>
         </p:cxnSp>
       </p:grpSp>
-      <p:sp>
-        <p:nvSpPr>
-          <p:cNvPr id="3" name="TextBox 2">
-            <a:extLst>
-              <a:ext uri="{FF2B5EF4-FFF2-40B4-BE49-F238E27FC236}">
-                <a16:creationId xmlns:a16="http://schemas.microsoft.com/office/drawing/2014/main" id="{4CDB8421-EDCA-A745-937E-8BBD40A7DB50}"/>
-              </a:ext>
-            </a:extLst>
-          </p:cNvPr>
-          <p:cNvSpPr txBox="1"/>
-          <p:nvPr/>
-        </p:nvSpPr>
-        <p:spPr>
-          <a:xfrm>
-            <a:off x="684212" y="5525781"/>
-            <a:ext cx="7630615" cy="369332"/>
-          </a:xfrm>
-          <a:prstGeom prst="rect">
-            <a:avLst/>
-          </a:prstGeom>
-          <a:noFill/>
-        </p:spPr>
-        <p:txBody>
-          <a:bodyPr wrap="none" rtlCol="0">
-            <a:spAutoFit/>
-          </a:bodyPr>
-          <a:lstStyle/>
-          <a:p>
-            <a:r>
-              <a:rPr lang="en-US" dirty="0" err="1"/>
-              <a:t>Za</a:t>
-            </a:r>
-            <a:r>
-              <a:rPr lang="en-US" dirty="0"/>
-              <a:t> </a:t>
-            </a:r>
-            <a:r>
-              <a:rPr lang="en-US" dirty="0" err="1"/>
-              <a:t>pokazni</a:t>
-            </a:r>
-            <a:r>
-              <a:rPr lang="en-US" dirty="0"/>
-              <a:t> primer </a:t>
-            </a:r>
-            <a:r>
-              <a:rPr lang="en-US" dirty="0" err="1"/>
-              <a:t>je</a:t>
-            </a:r>
-            <a:r>
-              <a:rPr lang="en-US" dirty="0"/>
-              <a:t> </a:t>
-            </a:r>
-            <a:r>
-              <a:rPr lang="en-US" dirty="0" err="1"/>
-              <a:t>uzet</a:t>
-            </a:r>
-            <a:r>
-              <a:rPr lang="en-US" dirty="0"/>
-              <a:t> </a:t>
-            </a:r>
-            <a:r>
-              <a:rPr lang="en-US" dirty="0" err="1"/>
-              <a:t>genom</a:t>
-            </a:r>
-            <a:r>
-              <a:rPr lang="en-US" dirty="0"/>
-              <a:t> </a:t>
-            </a:r>
-            <a:r>
-              <a:rPr lang="en-GB" dirty="0" err="1"/>
-              <a:t>Coffea</a:t>
-            </a:r>
-            <a:r>
-              <a:rPr lang="en-GB" dirty="0"/>
-              <a:t> arabica, Chromosome 1c</a:t>
-            </a:r>
-            <a:endParaRPr lang="sr-Latn-RS" dirty="0"/>
-          </a:p>
-        </p:txBody>
-      </p:sp>
       <p:graphicFrame>
         <p:nvGraphicFramePr>
           <p:cNvPr id="16" name="Content Placeholder 4">
@@ -15237,20 +16997,20 @@
           <p:nvPr>
             <p:extLst>
               <p:ext uri="{D42A27DB-BD31-4B8C-83A1-F6EECF244321}">
-                <p14:modId xmlns:p14="http://schemas.microsoft.com/office/powerpoint/2010/main" val="1583995578"/>
+                <p14:modId xmlns:p14="http://schemas.microsoft.com/office/powerpoint/2010/main" val="345930035"/>
               </p:ext>
             </p:extLst>
           </p:nvPr>
         </p:nvGraphicFramePr>
         <p:xfrm>
-          <a:off x="684212" y="2477555"/>
+          <a:off x="684212" y="2621281"/>
           <a:ext cx="8534400" cy="2123440"/>
         </p:xfrm>
         <a:graphic>
           <a:graphicData uri="http://schemas.openxmlformats.org/drawingml/2006/table">
             <a:tbl>
-              <a:tblPr firstRow="1" bandRow="1">
-                <a:tableStyleId>{073A0DAA-6AF3-43AB-8588-CEC1D06C72B9}</a:tableStyleId>
+              <a:tblPr firstRow="1" firstCol="1" bandRow="1">
+                <a:tableStyleId>{8EC20E35-A176-4012-BC5E-935CFFF8708E}</a:tableStyleId>
               </a:tblPr>
               <a:tblGrid>
                 <a:gridCol w="2133600">
@@ -15633,6 +17393,122 @@
           </a:graphicData>
         </a:graphic>
       </p:graphicFrame>
+      <p:sp>
+        <p:nvSpPr>
+          <p:cNvPr id="17" name="Title 1">
+            <a:extLst>
+              <a:ext uri="{FF2B5EF4-FFF2-40B4-BE49-F238E27FC236}">
+                <a16:creationId xmlns:a16="http://schemas.microsoft.com/office/drawing/2014/main" id="{7B286EFF-E4DF-8948-86DE-B72759BC62FC}"/>
+              </a:ext>
+            </a:extLst>
+          </p:cNvPr>
+          <p:cNvSpPr txBox="1">
+            <a:spLocks/>
+          </p:cNvSpPr>
+          <p:nvPr/>
+        </p:nvSpPr>
+        <p:spPr>
+          <a:xfrm>
+            <a:off x="684212" y="485244"/>
+            <a:ext cx="8534400" cy="1507067"/>
+          </a:xfrm>
+          <a:prstGeom prst="rect">
+            <a:avLst/>
+          </a:prstGeom>
+          <a:effectLst/>
+        </p:spPr>
+        <p:txBody>
+          <a:bodyPr vert="horz" lIns="91440" tIns="45720" rIns="91440" bIns="45720" rtlCol="0" anchor="ctr">
+            <a:normAutofit/>
+          </a:bodyPr>
+          <a:lstStyle>
+            <a:lvl1pPr algn="l" defTabSz="457200" rtl="0" eaLnBrk="1" latinLnBrk="0" hangingPunct="1">
+              <a:spcBef>
+                <a:spcPct val="0"/>
+              </a:spcBef>
+              <a:buNone/>
+              <a:defRPr sz="3600" kern="1200" cap="all">
+                <a:ln w="3175" cmpd="sng">
+                  <a:noFill/>
+                </a:ln>
+                <a:solidFill>
+                  <a:schemeClr val="tx1"/>
+                </a:solidFill>
+                <a:effectLst/>
+                <a:latin typeface="+mj-lt"/>
+                <a:ea typeface="+mj-ea"/>
+                <a:cs typeface="+mj-cs"/>
+              </a:defRPr>
+            </a:lvl1pPr>
+            <a:lvl2pPr eaLnBrk="1" hangingPunct="1">
+              <a:defRPr>
+                <a:solidFill>
+                  <a:schemeClr val="tx2"/>
+                </a:solidFill>
+              </a:defRPr>
+            </a:lvl2pPr>
+            <a:lvl3pPr eaLnBrk="1" hangingPunct="1">
+              <a:defRPr>
+                <a:solidFill>
+                  <a:schemeClr val="tx2"/>
+                </a:solidFill>
+              </a:defRPr>
+            </a:lvl3pPr>
+            <a:lvl4pPr eaLnBrk="1" hangingPunct="1">
+              <a:defRPr>
+                <a:solidFill>
+                  <a:schemeClr val="tx2"/>
+                </a:solidFill>
+              </a:defRPr>
+            </a:lvl4pPr>
+            <a:lvl5pPr eaLnBrk="1" hangingPunct="1">
+              <a:defRPr>
+                <a:solidFill>
+                  <a:schemeClr val="tx2"/>
+                </a:solidFill>
+              </a:defRPr>
+            </a:lvl5pPr>
+            <a:lvl6pPr eaLnBrk="1" hangingPunct="1">
+              <a:defRPr>
+                <a:solidFill>
+                  <a:schemeClr val="tx2"/>
+                </a:solidFill>
+              </a:defRPr>
+            </a:lvl6pPr>
+            <a:lvl7pPr eaLnBrk="1" hangingPunct="1">
+              <a:defRPr>
+                <a:solidFill>
+                  <a:schemeClr val="tx2"/>
+                </a:solidFill>
+              </a:defRPr>
+            </a:lvl7pPr>
+            <a:lvl8pPr eaLnBrk="1" hangingPunct="1">
+              <a:defRPr>
+                <a:solidFill>
+                  <a:schemeClr val="tx2"/>
+                </a:solidFill>
+              </a:defRPr>
+            </a:lvl8pPr>
+            <a:lvl9pPr eaLnBrk="1" hangingPunct="1">
+              <a:defRPr>
+                <a:solidFill>
+                  <a:schemeClr val="tx2"/>
+                </a:solidFill>
+              </a:defRPr>
+            </a:lvl9pPr>
+          </a:lstStyle>
+          <a:p>
+            <a:r>
+              <a:rPr lang="en-GB" dirty="0" err="1"/>
+              <a:t>Coffea</a:t>
+            </a:r>
+            <a:r>
+              <a:rPr lang="en-GB" dirty="0"/>
+              <a:t> arabica, Chromosome 1c</a:t>
+            </a:r>
+          </a:p>
+        </p:txBody>
+      </p:sp>
     </p:spTree>
     <p:extLst>
       <p:ext uri="{BB962C8B-B14F-4D97-AF65-F5344CB8AC3E}">

</xml_diff>

<commit_message>
removed visualisation slide and added slides with benchmark results for all genomes
</commit_message>
<xml_diff>
--- a/Presentation/gi_presentation.pptx
+++ b/Presentation/gi_presentation.pptx
@@ -5,7 +5,7 @@
     <p:sldMasterId id="2147483660" r:id="rId1"/>
   </p:sldMasterIdLst>
   <p:notesMasterIdLst>
-    <p:notesMasterId r:id="rId15"/>
+    <p:notesMasterId r:id="rId14"/>
   </p:notesMasterIdLst>
   <p:sldIdLst>
     <p:sldId id="256" r:id="rId2"/>
@@ -19,8 +19,7 @@
     <p:sldId id="266" r:id="rId10"/>
     <p:sldId id="270" r:id="rId11"/>
     <p:sldId id="269" r:id="rId12"/>
-    <p:sldId id="263" r:id="rId13"/>
-    <p:sldId id="265" r:id="rId14"/>
+    <p:sldId id="265" r:id="rId13"/>
   </p:sldIdLst>
   <p:sldSz cx="12192000" cy="6858000"/>
   <p:notesSz cx="6858000" cy="9144000"/>
@@ -2169,7 +2168,7 @@
           <a:p>
             <a:fld id="{DBECFB56-5338-9E45-BBC8-5B80A293CA20}" type="slidenum">
               <a:rPr lang="en-US" smtClean="0"/>
-              <a:t>13</a:t>
+              <a:t>12</a:t>
             </a:fld>
             <a:endParaRPr lang="en-US"/>
           </a:p>
@@ -8407,7 +8406,7 @@
           <p:nvPr>
             <p:extLst>
               <p:ext uri="{D42A27DB-BD31-4B8C-83A1-F6EECF244321}">
-                <p14:modId xmlns:p14="http://schemas.microsoft.com/office/powerpoint/2010/main" val="2390759124"/>
+                <p14:modId xmlns:p14="http://schemas.microsoft.com/office/powerpoint/2010/main" val="3423247242"/>
               </p:ext>
             </p:extLst>
           </p:nvPr>
@@ -8576,7 +8575,7 @@
                     <a:p>
                       <a:r>
                         <a:rPr lang="en-US" dirty="0"/>
-                        <a:t> GB</a:t>
+                        <a:t>17.5 GB</a:t>
                       </a:r>
                     </a:p>
                   </a:txBody>
@@ -8589,7 +8588,7 @@
                     <a:p>
                       <a:r>
                         <a:rPr lang="en-US" dirty="0"/>
-                        <a:t> min</a:t>
+                        <a:t>17 min</a:t>
                       </a:r>
                     </a:p>
                   </a:txBody>
@@ -8602,7 +8601,7 @@
                     <a:p>
                       <a:r>
                         <a:rPr lang="en-US" dirty="0"/>
-                        <a:t> sec</a:t>
+                        <a:t>0.2 sec</a:t>
                       </a:r>
                     </a:p>
                   </a:txBody>
@@ -8635,7 +8634,7 @@
                     <a:p>
                       <a:r>
                         <a:rPr lang="en-US" dirty="0"/>
-                        <a:t>GB</a:t>
+                        <a:t>39.4 GB</a:t>
                       </a:r>
                     </a:p>
                   </a:txBody>
@@ -8648,7 +8647,7 @@
                     <a:p>
                       <a:r>
                         <a:rPr lang="en-US" dirty="0"/>
-                        <a:t> min</a:t>
+                        <a:t>15 min</a:t>
                       </a:r>
                     </a:p>
                   </a:txBody>
@@ -8661,7 +8660,7 @@
                     <a:p>
                       <a:r>
                         <a:rPr lang="en-US" dirty="0"/>
-                        <a:t> sec</a:t>
+                        <a:t>2.6 min</a:t>
                       </a:r>
                     </a:p>
                   </a:txBody>
@@ -8766,7 +8765,15 @@
                     <a:p>
                       <a:r>
                         <a:rPr lang="en-US" dirty="0"/>
-                        <a:t> min</a:t>
+                        <a:t>I </a:t>
+                      </a:r>
+                      <a:r>
+                        <a:rPr lang="en-US" dirty="0" err="1"/>
+                        <a:t>hr</a:t>
+                      </a:r>
+                      <a:r>
+                        <a:rPr lang="en-US" dirty="0"/>
+                        <a:t> 37 min</a:t>
                       </a:r>
                     </a:p>
                   </a:txBody>
@@ -8779,7 +8786,7 @@
                     <a:p>
                       <a:r>
                         <a:rPr lang="en-US" dirty="0"/>
-                        <a:t>sec</a:t>
+                        <a:t>0.4 sec</a:t>
                       </a:r>
                     </a:p>
                   </a:txBody>
@@ -9346,7 +9353,7 @@
           <p:nvPr>
             <p:extLst>
               <p:ext uri="{D42A27DB-BD31-4B8C-83A1-F6EECF244321}">
-                <p14:modId xmlns:p14="http://schemas.microsoft.com/office/powerpoint/2010/main" val="2788451705"/>
+                <p14:modId xmlns:p14="http://schemas.microsoft.com/office/powerpoint/2010/main" val="1623093981"/>
               </p:ext>
             </p:extLst>
           </p:nvPr>
@@ -9515,7 +9522,7 @@
                     <a:p>
                       <a:r>
                         <a:rPr lang="en-US" dirty="0"/>
-                        <a:t> GB</a:t>
+                        <a:t>26.6 GB</a:t>
                       </a:r>
                     </a:p>
                   </a:txBody>
@@ -9528,7 +9535,7 @@
                     <a:p>
                       <a:r>
                         <a:rPr lang="en-US" dirty="0"/>
-                        <a:t>min</a:t>
+                        <a:t>34 min</a:t>
                       </a:r>
                     </a:p>
                   </a:txBody>
@@ -9541,7 +9548,7 @@
                     <a:p>
                       <a:r>
                         <a:rPr lang="en-US" dirty="0"/>
-                        <a:t>sec</a:t>
+                        <a:t>0.06 sec</a:t>
                       </a:r>
                     </a:p>
                   </a:txBody>
@@ -9574,7 +9581,7 @@
                     <a:p>
                       <a:r>
                         <a:rPr lang="en-US" dirty="0"/>
-                        <a:t>GB</a:t>
+                        <a:t>60 GB</a:t>
                       </a:r>
                     </a:p>
                   </a:txBody>
@@ -9587,7 +9594,7 @@
                     <a:p>
                       <a:r>
                         <a:rPr lang="en-US" dirty="0"/>
-                        <a:t>min</a:t>
+                        <a:t>24 min</a:t>
                       </a:r>
                     </a:p>
                   </a:txBody>
@@ -9600,7 +9607,7 @@
                     <a:p>
                       <a:r>
                         <a:rPr lang="en-US" dirty="0"/>
-                        <a:t>sec</a:t>
+                        <a:t>5.7 min</a:t>
                       </a:r>
                     </a:p>
                   </a:txBody>
@@ -9868,490 +9875,6 @@
 </file>
 
 <file path=ppt/slides/slide12.xml><?xml version="1.0" encoding="utf-8"?>
-<p:sld xmlns:a="http://schemas.openxmlformats.org/drawingml/2006/main" xmlns:r="http://schemas.openxmlformats.org/officeDocument/2006/relationships" xmlns:p="http://schemas.openxmlformats.org/presentationml/2006/main">
-  <p:cSld>
-    <p:bg>
-      <p:bgPr>
-        <a:gradFill rotWithShape="1">
-          <a:gsLst>
-            <a:gs pos="10000">
-              <a:schemeClr val="bg1">
-                <a:tint val="97000"/>
-                <a:hueMod val="92000"/>
-                <a:satMod val="169000"/>
-                <a:lumMod val="164000"/>
-              </a:schemeClr>
-            </a:gs>
-            <a:gs pos="100000">
-              <a:schemeClr val="bg1">
-                <a:shade val="96000"/>
-                <a:satMod val="120000"/>
-                <a:lumMod val="90000"/>
-              </a:schemeClr>
-            </a:gs>
-          </a:gsLst>
-          <a:lin ang="6120000" scaled="1"/>
-        </a:gradFill>
-        <a:effectLst/>
-      </p:bgPr>
-    </p:bg>
-    <p:spTree>
-      <p:nvGrpSpPr>
-        <p:cNvPr id="1" name=""/>
-        <p:cNvGrpSpPr/>
-        <p:nvPr/>
-      </p:nvGrpSpPr>
-      <p:grpSpPr>
-        <a:xfrm>
-          <a:off x="0" y="0"/>
-          <a:ext cx="0" cy="0"/>
-          <a:chOff x="0" y="0"/>
-          <a:chExt cx="0" cy="0"/>
-        </a:xfrm>
-      </p:grpSpPr>
-      <p:sp useBgFill="1">
-        <p:nvSpPr>
-          <p:cNvPr id="8" name="Rectangle 7">
-            <a:extLst>
-              <a:ext uri="{FF2B5EF4-FFF2-40B4-BE49-F238E27FC236}">
-                <a16:creationId xmlns:a16="http://schemas.microsoft.com/office/drawing/2014/main" id="{CADF2543-1B6F-4FBC-A7AF-53A0430E05AB}"/>
-              </a:ext>
-              <a:ext uri="{C183D7F6-B498-43B3-948B-1728B52AA6E4}">
-                <adec:decorative xmlns:adec="http://schemas.microsoft.com/office/drawing/2017/decorative" val="1"/>
-              </a:ext>
-            </a:extLst>
-          </p:cNvPr>
-          <p:cNvSpPr>
-            <a:spLocks noGrp="1" noRot="1" noChangeAspect="1" noMove="1" noResize="1" noEditPoints="1" noAdjustHandles="1" noChangeArrowheads="1" noChangeShapeType="1" noTextEdit="1"/>
-          </p:cNvSpPr>
-          <p:nvPr>
-            <p:extLst>
-              <p:ext uri="{386F3935-93C4-4BCD-93E2-E3B085C9AB24}">
-                <p16:designElem xmlns:p16="http://schemas.microsoft.com/office/powerpoint/2015/main" val="1"/>
-              </p:ext>
-            </p:extLst>
-          </p:nvPr>
-        </p:nvSpPr>
-        <p:spPr>
-          <a:xfrm>
-            <a:off x="0" y="0"/>
-            <a:ext cx="12192000" cy="6858000"/>
-          </a:xfrm>
-          <a:prstGeom prst="rect">
-            <a:avLst/>
-          </a:prstGeom>
-          <a:ln>
-            <a:noFill/>
-          </a:ln>
-        </p:spPr>
-        <p:style>
-          <a:lnRef idx="2">
-            <a:schemeClr val="accent1">
-              <a:shade val="50000"/>
-            </a:schemeClr>
-          </a:lnRef>
-          <a:fillRef idx="1">
-            <a:schemeClr val="accent1"/>
-          </a:fillRef>
-          <a:effectRef idx="0">
-            <a:schemeClr val="accent1"/>
-          </a:effectRef>
-          <a:fontRef idx="minor">
-            <a:schemeClr val="lt1"/>
-          </a:fontRef>
-        </p:style>
-        <p:txBody>
-          <a:bodyPr rtlCol="0" anchor="ctr"/>
-          <a:lstStyle/>
-          <a:p>
-            <a:pPr algn="ctr"/>
-            <a:endParaRPr lang="en-US"/>
-          </a:p>
-        </p:txBody>
-      </p:sp>
-      <p:sp>
-        <p:nvSpPr>
-          <p:cNvPr id="2" name="Title 1">
-            <a:extLst>
-              <a:ext uri="{FF2B5EF4-FFF2-40B4-BE49-F238E27FC236}">
-                <a16:creationId xmlns:a16="http://schemas.microsoft.com/office/drawing/2014/main" id="{A2AE66D6-9DA2-4151-8548-6CACA7CD1179}"/>
-              </a:ext>
-            </a:extLst>
-          </p:cNvPr>
-          <p:cNvSpPr>
-            <a:spLocks noGrp="1"/>
-          </p:cNvSpPr>
-          <p:nvPr>
-            <p:ph type="title"/>
-          </p:nvPr>
-        </p:nvSpPr>
-        <p:spPr>
-          <a:xfrm>
-            <a:off x="684212" y="485244"/>
-            <a:ext cx="8534400" cy="1507067"/>
-          </a:xfrm>
-        </p:spPr>
-        <p:txBody>
-          <a:bodyPr>
-            <a:normAutofit/>
-          </a:bodyPr>
-          <a:lstStyle/>
-          <a:p>
-            <a:r>
-              <a:rPr lang="sr-Latn-RS" dirty="0"/>
-              <a:t>VIZUELIZACIJA REZULTATA</a:t>
-            </a:r>
-            <a:endParaRPr lang="en-GB" dirty="0"/>
-          </a:p>
-        </p:txBody>
-      </p:sp>
-      <p:grpSp>
-        <p:nvGrpSpPr>
-          <p:cNvPr id="10" name="Group 9">
-            <a:extLst>
-              <a:ext uri="{FF2B5EF4-FFF2-40B4-BE49-F238E27FC236}">
-                <a16:creationId xmlns:a16="http://schemas.microsoft.com/office/drawing/2014/main" id="{A80A6E81-6B71-43DF-877B-E964A9A4CB68}"/>
-              </a:ext>
-              <a:ext uri="{C183D7F6-B498-43B3-948B-1728B52AA6E4}">
-                <adec:decorative xmlns:adec="http://schemas.microsoft.com/office/drawing/2017/decorative" val="1"/>
-              </a:ext>
-            </a:extLst>
-          </p:cNvPr>
-          <p:cNvGrpSpPr>
-            <a:grpSpLocks noGrp="1" noUngrp="1" noRot="1" noChangeAspect="1" noMove="1" noResize="1"/>
-          </p:cNvGrpSpPr>
-          <p:nvPr>
-            <p:extLst>
-              <p:ext uri="{386F3935-93C4-4BCD-93E2-E3B085C9AB24}">
-                <p16:designElem xmlns:p16="http://schemas.microsoft.com/office/powerpoint/2015/main" val="1"/>
-              </p:ext>
-            </p:extLst>
-          </p:nvPr>
-        </p:nvGrpSpPr>
-        <p:grpSpPr>
-          <a:xfrm>
-            <a:off x="9206969" y="2963333"/>
-            <a:ext cx="2981858" cy="3208867"/>
-            <a:chOff x="9206969" y="2963333"/>
-            <a:chExt cx="2981858" cy="3208867"/>
-          </a:xfrm>
-        </p:grpSpPr>
-        <p:cxnSp>
-          <p:nvCxnSpPr>
-            <p:cNvPr id="11" name="Straight Connector 10">
-              <a:extLst>
-                <a:ext uri="{FF2B5EF4-FFF2-40B4-BE49-F238E27FC236}">
-                  <a16:creationId xmlns:a16="http://schemas.microsoft.com/office/drawing/2014/main" id="{4E35C3AD-357F-4004-A3F3-2D4EAF34A63D}"/>
-                </a:ext>
-                <a:ext uri="{C183D7F6-B498-43B3-948B-1728B52AA6E4}">
-                  <adec:decorative xmlns:adec="http://schemas.microsoft.com/office/drawing/2017/decorative" val="1"/>
-                </a:ext>
-              </a:extLst>
-            </p:cNvPr>
-            <p:cNvCxnSpPr/>
-            <p:nvPr>
-              <p:extLst>
-                <p:ext uri="{386F3935-93C4-4BCD-93E2-E3B085C9AB24}">
-                  <p16:designElem xmlns:p16="http://schemas.microsoft.com/office/powerpoint/2015/main" val="1"/>
-                </p:ext>
-              </p:extLst>
-            </p:nvPr>
-          </p:nvCxnSpPr>
-          <p:spPr>
-            <a:xfrm flipH="1">
-              <a:off x="11276012" y="2963333"/>
-              <a:ext cx="912814" cy="912812"/>
-            </a:xfrm>
-            <a:prstGeom prst="line">
-              <a:avLst/>
-            </a:prstGeom>
-            <a:ln w="9525">
-              <a:solidFill>
-                <a:schemeClr val="tx2">
-                  <a:lumMod val="75000"/>
-                  <a:alpha val="80000"/>
-                </a:schemeClr>
-              </a:solidFill>
-            </a:ln>
-          </p:spPr>
-          <p:style>
-            <a:lnRef idx="2">
-              <a:schemeClr val="accent1"/>
-            </a:lnRef>
-            <a:fillRef idx="0">
-              <a:schemeClr val="accent1"/>
-            </a:fillRef>
-            <a:effectRef idx="1">
-              <a:schemeClr val="accent1"/>
-            </a:effectRef>
-            <a:fontRef idx="minor">
-              <a:schemeClr val="tx1"/>
-            </a:fontRef>
-          </p:style>
-        </p:cxnSp>
-        <p:cxnSp>
-          <p:nvCxnSpPr>
-            <p:cNvPr id="12" name="Straight Connector 11">
-              <a:extLst>
-                <a:ext uri="{FF2B5EF4-FFF2-40B4-BE49-F238E27FC236}">
-                  <a16:creationId xmlns:a16="http://schemas.microsoft.com/office/drawing/2014/main" id="{337B6032-0A70-4F26-A9A3-B4D60DF11818}"/>
-                </a:ext>
-                <a:ext uri="{C183D7F6-B498-43B3-948B-1728B52AA6E4}">
-                  <adec:decorative xmlns:adec="http://schemas.microsoft.com/office/drawing/2017/decorative" val="1"/>
-                </a:ext>
-              </a:extLst>
-            </p:cNvPr>
-            <p:cNvCxnSpPr/>
-            <p:nvPr>
-              <p:extLst>
-                <p:ext uri="{386F3935-93C4-4BCD-93E2-E3B085C9AB24}">
-                  <p16:designElem xmlns:p16="http://schemas.microsoft.com/office/powerpoint/2015/main" val="1"/>
-                </p:ext>
-              </p:extLst>
-            </p:nvPr>
-          </p:nvCxnSpPr>
-          <p:spPr>
-            <a:xfrm flipH="1">
-              <a:off x="9206969" y="3190344"/>
-              <a:ext cx="2981857" cy="2981856"/>
-            </a:xfrm>
-            <a:prstGeom prst="line">
-              <a:avLst/>
-            </a:prstGeom>
-            <a:ln w="9525">
-              <a:solidFill>
-                <a:schemeClr val="tx2">
-                  <a:lumMod val="75000"/>
-                  <a:alpha val="80000"/>
-                </a:schemeClr>
-              </a:solidFill>
-            </a:ln>
-          </p:spPr>
-          <p:style>
-            <a:lnRef idx="2">
-              <a:schemeClr val="accent1"/>
-            </a:lnRef>
-            <a:fillRef idx="0">
-              <a:schemeClr val="accent1"/>
-            </a:fillRef>
-            <a:effectRef idx="1">
-              <a:schemeClr val="accent1"/>
-            </a:effectRef>
-            <a:fontRef idx="minor">
-              <a:schemeClr val="tx1"/>
-            </a:fontRef>
-          </p:style>
-        </p:cxnSp>
-        <p:cxnSp>
-          <p:nvCxnSpPr>
-            <p:cNvPr id="13" name="Straight Connector 12">
-              <a:extLst>
-                <a:ext uri="{FF2B5EF4-FFF2-40B4-BE49-F238E27FC236}">
-                  <a16:creationId xmlns:a16="http://schemas.microsoft.com/office/drawing/2014/main" id="{DE192CE3-3DD1-448F-93BE-42983DA0D5A9}"/>
-                </a:ext>
-                <a:ext uri="{C183D7F6-B498-43B3-948B-1728B52AA6E4}">
-                  <adec:decorative xmlns:adec="http://schemas.microsoft.com/office/drawing/2017/decorative" val="1"/>
-                </a:ext>
-              </a:extLst>
-            </p:cNvPr>
-            <p:cNvCxnSpPr/>
-            <p:nvPr>
-              <p:extLst>
-                <p:ext uri="{386F3935-93C4-4BCD-93E2-E3B085C9AB24}">
-                  <p16:designElem xmlns:p16="http://schemas.microsoft.com/office/powerpoint/2015/main" val="1"/>
-                </p:ext>
-              </p:extLst>
-            </p:nvPr>
-          </p:nvCxnSpPr>
-          <p:spPr>
-            <a:xfrm flipH="1">
-              <a:off x="10292292" y="3285067"/>
-              <a:ext cx="1896534" cy="1896533"/>
-            </a:xfrm>
-            <a:prstGeom prst="line">
-              <a:avLst/>
-            </a:prstGeom>
-            <a:ln w="9525">
-              <a:solidFill>
-                <a:schemeClr val="tx2">
-                  <a:lumMod val="75000"/>
-                  <a:alpha val="80000"/>
-                </a:schemeClr>
-              </a:solidFill>
-            </a:ln>
-          </p:spPr>
-          <p:style>
-            <a:lnRef idx="2">
-              <a:schemeClr val="accent1"/>
-            </a:lnRef>
-            <a:fillRef idx="0">
-              <a:schemeClr val="accent1"/>
-            </a:fillRef>
-            <a:effectRef idx="1">
-              <a:schemeClr val="accent1"/>
-            </a:effectRef>
-            <a:fontRef idx="minor">
-              <a:schemeClr val="tx1"/>
-            </a:fontRef>
-          </p:style>
-        </p:cxnSp>
-        <p:cxnSp>
-          <p:nvCxnSpPr>
-            <p:cNvPr id="14" name="Straight Connector 13">
-              <a:extLst>
-                <a:ext uri="{FF2B5EF4-FFF2-40B4-BE49-F238E27FC236}">
-                  <a16:creationId xmlns:a16="http://schemas.microsoft.com/office/drawing/2014/main" id="{E6D3DA09-5C72-4562-BEDE-1937DF87E81D}"/>
-                </a:ext>
-                <a:ext uri="{C183D7F6-B498-43B3-948B-1728B52AA6E4}">
-                  <adec:decorative xmlns:adec="http://schemas.microsoft.com/office/drawing/2017/decorative" val="1"/>
-                </a:ext>
-              </a:extLst>
-            </p:cNvPr>
-            <p:cNvCxnSpPr/>
-            <p:nvPr>
-              <p:extLst>
-                <p:ext uri="{386F3935-93C4-4BCD-93E2-E3B085C9AB24}">
-                  <p16:designElem xmlns:p16="http://schemas.microsoft.com/office/powerpoint/2015/main" val="1"/>
-                </p:ext>
-              </p:extLst>
-            </p:nvPr>
-          </p:nvCxnSpPr>
-          <p:spPr>
-            <a:xfrm flipH="1">
-              <a:off x="10443103" y="3131080"/>
-              <a:ext cx="1745722" cy="1745720"/>
-            </a:xfrm>
-            <a:prstGeom prst="line">
-              <a:avLst/>
-            </a:prstGeom>
-            <a:ln w="28575">
-              <a:solidFill>
-                <a:schemeClr val="tx2">
-                  <a:lumMod val="75000"/>
-                  <a:alpha val="80000"/>
-                </a:schemeClr>
-              </a:solidFill>
-            </a:ln>
-          </p:spPr>
-          <p:style>
-            <a:lnRef idx="2">
-              <a:schemeClr val="accent1"/>
-            </a:lnRef>
-            <a:fillRef idx="0">
-              <a:schemeClr val="accent1"/>
-            </a:fillRef>
-            <a:effectRef idx="1">
-              <a:schemeClr val="accent1"/>
-            </a:effectRef>
-            <a:fontRef idx="minor">
-              <a:schemeClr val="tx1"/>
-            </a:fontRef>
-          </p:style>
-        </p:cxnSp>
-        <p:cxnSp>
-          <p:nvCxnSpPr>
-            <p:cNvPr id="15" name="Straight Connector 14">
-              <a:extLst>
-                <a:ext uri="{FF2B5EF4-FFF2-40B4-BE49-F238E27FC236}">
-                  <a16:creationId xmlns:a16="http://schemas.microsoft.com/office/drawing/2014/main" id="{D6ACA7CA-2A20-49D7-9053-E076463D79A3}"/>
-                </a:ext>
-                <a:ext uri="{C183D7F6-B498-43B3-948B-1728B52AA6E4}">
-                  <adec:decorative xmlns:adec="http://schemas.microsoft.com/office/drawing/2017/decorative" val="1"/>
-                </a:ext>
-              </a:extLst>
-            </p:cNvPr>
-            <p:cNvCxnSpPr/>
-            <p:nvPr>
-              <p:extLst>
-                <p:ext uri="{386F3935-93C4-4BCD-93E2-E3B085C9AB24}">
-                  <p16:designElem xmlns:p16="http://schemas.microsoft.com/office/powerpoint/2015/main" val="1"/>
-                </p:ext>
-              </p:extLst>
-            </p:nvPr>
-          </p:nvCxnSpPr>
-          <p:spPr>
-            <a:xfrm flipH="1">
-              <a:off x="10918826" y="3683001"/>
-              <a:ext cx="1270001" cy="1269999"/>
-            </a:xfrm>
-            <a:prstGeom prst="line">
-              <a:avLst/>
-            </a:prstGeom>
-            <a:ln w="28575">
-              <a:solidFill>
-                <a:schemeClr val="tx2">
-                  <a:lumMod val="75000"/>
-                  <a:alpha val="80000"/>
-                </a:schemeClr>
-              </a:solidFill>
-            </a:ln>
-          </p:spPr>
-          <p:style>
-            <a:lnRef idx="2">
-              <a:schemeClr val="accent1"/>
-            </a:lnRef>
-            <a:fillRef idx="0">
-              <a:schemeClr val="accent1"/>
-            </a:fillRef>
-            <a:effectRef idx="1">
-              <a:schemeClr val="accent1"/>
-            </a:effectRef>
-            <a:fontRef idx="minor">
-              <a:schemeClr val="tx1"/>
-            </a:fontRef>
-          </p:style>
-        </p:cxnSp>
-      </p:grpSp>
-      <p:sp>
-        <p:nvSpPr>
-          <p:cNvPr id="3" name="Content Placeholder 2">
-            <a:extLst>
-              <a:ext uri="{FF2B5EF4-FFF2-40B4-BE49-F238E27FC236}">
-                <a16:creationId xmlns:a16="http://schemas.microsoft.com/office/drawing/2014/main" id="{EC2482C3-CFE8-4767-84A3-11931ABD1F34}"/>
-              </a:ext>
-            </a:extLst>
-          </p:cNvPr>
-          <p:cNvSpPr>
-            <a:spLocks noGrp="1"/>
-          </p:cNvSpPr>
-          <p:nvPr>
-            <p:ph idx="1"/>
-          </p:nvPr>
-        </p:nvSpPr>
-        <p:spPr>
-          <a:xfrm>
-            <a:off x="684212" y="2068511"/>
-            <a:ext cx="8534400" cy="3615267"/>
-          </a:xfrm>
-        </p:spPr>
-        <p:txBody>
-          <a:bodyPr>
-            <a:normAutofit/>
-          </a:bodyPr>
-          <a:lstStyle/>
-          <a:p>
-            <a:endParaRPr lang="en-GB" dirty="0">
-              <a:solidFill>
-                <a:schemeClr val="tx1"/>
-              </a:solidFill>
-            </a:endParaRPr>
-          </a:p>
-        </p:txBody>
-      </p:sp>
-    </p:spTree>
-    <p:extLst>
-      <p:ext uri="{BB962C8B-B14F-4D97-AF65-F5344CB8AC3E}">
-        <p14:creationId xmlns:p14="http://schemas.microsoft.com/office/powerpoint/2010/main" val="2867049167"/>
-      </p:ext>
-    </p:extLst>
-  </p:cSld>
-  <p:clrMapOvr>
-    <a:masterClrMapping/>
-  </p:clrMapOvr>
-</p:sld>
-</file>
-
-<file path=ppt/slides/slide13.xml><?xml version="1.0" encoding="utf-8"?>
 <p:sld xmlns:a="http://schemas.openxmlformats.org/drawingml/2006/main" xmlns:r="http://schemas.openxmlformats.org/officeDocument/2006/relationships" xmlns:p="http://schemas.openxmlformats.org/presentationml/2006/main">
   <p:cSld>
     <p:bg>
@@ -16997,7 +16520,7 @@
           <p:nvPr>
             <p:extLst>
               <p:ext uri="{D42A27DB-BD31-4B8C-83A1-F6EECF244321}">
-                <p14:modId xmlns:p14="http://schemas.microsoft.com/office/powerpoint/2010/main" val="345930035"/>
+                <p14:modId xmlns:p14="http://schemas.microsoft.com/office/powerpoint/2010/main" val="4024782762"/>
               </p:ext>
             </p:extLst>
           </p:nvPr>
@@ -17305,7 +16828,7 @@
                       </a:r>
                       <a:r>
                         <a:rPr lang="en-US" dirty="0"/>
-                        <a:t> 36 min</a:t>
+                        <a:t> 22 min</a:t>
                       </a:r>
                     </a:p>
                   </a:txBody>

</xml_diff>

<commit_message>
added suffix tree results for PAHARI (longest) genome
</commit_message>
<xml_diff>
--- a/Presentation/gi_presentation.pptx
+++ b/Presentation/gi_presentation.pptx
@@ -9353,7 +9353,7 @@
           <p:nvPr>
             <p:extLst>
               <p:ext uri="{D42A27DB-BD31-4B8C-83A1-F6EECF244321}">
-                <p14:modId xmlns:p14="http://schemas.microsoft.com/office/powerpoint/2010/main" val="1623093981"/>
+                <p14:modId xmlns:p14="http://schemas.microsoft.com/office/powerpoint/2010/main" val="2067733760"/>
               </p:ext>
             </p:extLst>
           </p:nvPr>
@@ -9699,7 +9699,7 @@
                     <a:p>
                       <a:r>
                         <a:rPr lang="en-US" dirty="0"/>
-                        <a:t>GB</a:t>
+                        <a:t>150 GB</a:t>
                       </a:r>
                     </a:p>
                   </a:txBody>
@@ -9712,8 +9712,17 @@
                     <a:p>
                       <a:r>
                         <a:rPr lang="en-US" dirty="0"/>
-                        <a:t>min</a:t>
+                        <a:t>2 </a:t>
                       </a:r>
+                      <a:r>
+                        <a:rPr lang="en-US" dirty="0" err="1"/>
+                        <a:t>hr</a:t>
+                      </a:r>
+                      <a:r>
+                        <a:rPr lang="en-US"/>
+                        <a:t> 34 min</a:t>
+                      </a:r>
+                      <a:endParaRPr lang="en-US" dirty="0"/>
                     </a:p>
                   </a:txBody>
                   <a:tcPr/>
@@ -9725,7 +9734,7 @@
                     <a:p>
                       <a:r>
                         <a:rPr lang="en-US" dirty="0"/>
-                        <a:t>sec</a:t>
+                        <a:t>0.3 sec</a:t>
                       </a:r>
                     </a:p>
                   </a:txBody>

</xml_diff>

<commit_message>
removed "the link is in the video description" sentence
</commit_message>
<xml_diff>
--- a/Presentation/gi_presentation.pptx
+++ b/Presentation/gi_presentation.pptx
@@ -10451,18 +10451,21 @@
                   <a:schemeClr val="tx1"/>
                 </a:solidFill>
               </a:rPr>
-              <a:t>Bez optimizacije ovi algoritmi nisu upotrebljivi</a:t>
-            </a:r>
-          </a:p>
-          <a:p>
-            <a:r>
-              <a:rPr lang="sr-Latn-RS" dirty="0">
-                <a:solidFill>
-                  <a:schemeClr val="tx1"/>
-                </a:solidFill>
-              </a:rPr>
-              <a:t>Link ka Izvornom kodu projekta se nalazi u opisu videa</a:t>
-            </a:r>
+              <a:t>Bez optimizacije ovi algoritmi </a:t>
+            </a:r>
+            <a:r>
+              <a:rPr lang="sr-Latn-RS">
+                <a:solidFill>
+                  <a:schemeClr val="tx1"/>
+                </a:solidFill>
+              </a:rPr>
+              <a:t>nisu upotrebljivi</a:t>
+            </a:r>
+            <a:endParaRPr lang="sr-Latn-RS" dirty="0">
+              <a:solidFill>
+                <a:schemeClr val="tx1"/>
+              </a:solidFill>
+            </a:endParaRPr>
           </a:p>
         </p:txBody>
       </p:sp>

</xml_diff>

<commit_message>
Added genome sizes and patterns that are matched
</commit_message>
<xml_diff>
--- a/Presentation/gi_presentation.pptx
+++ b/Presentation/gi_presentation.pptx
@@ -208,7 +208,7 @@
           <a:p>
             <a:fld id="{24031642-1FF4-6441-BCAF-6D8858459232}" type="datetimeFigureOut">
               <a:rPr lang="en-US" smtClean="0"/>
-              <a:t>4/14/19</a:t>
+              <a:t>4/15/19</a:t>
             </a:fld>
             <a:endParaRPr lang="en-US"/>
           </a:p>
@@ -2384,7 +2384,7 @@
           <a:p>
             <a:fld id="{BA17F56F-1B67-4B63-8A5F-6AF1457D6EED}" type="datetimeFigureOut">
               <a:rPr lang="en-GB" smtClean="0"/>
-              <a:t>14/04/2019</a:t>
+              <a:t>15/04/2019</a:t>
             </a:fld>
             <a:endParaRPr lang="en-GB"/>
           </a:p>
@@ -2820,7 +2820,7 @@
           <a:p>
             <a:fld id="{BA17F56F-1B67-4B63-8A5F-6AF1457D6EED}" type="datetimeFigureOut">
               <a:rPr lang="en-GB" smtClean="0"/>
-              <a:t>14/04/2019</a:t>
+              <a:t>15/04/2019</a:t>
             </a:fld>
             <a:endParaRPr lang="en-GB"/>
           </a:p>
@@ -3070,7 +3070,7 @@
           <a:p>
             <a:fld id="{BA17F56F-1B67-4B63-8A5F-6AF1457D6EED}" type="datetimeFigureOut">
               <a:rPr lang="en-GB" smtClean="0"/>
-              <a:t>14/04/2019</a:t>
+              <a:t>15/04/2019</a:t>
             </a:fld>
             <a:endParaRPr lang="en-GB"/>
           </a:p>
@@ -3378,7 +3378,7 @@
           <a:p>
             <a:fld id="{BA17F56F-1B67-4B63-8A5F-6AF1457D6EED}" type="datetimeFigureOut">
               <a:rPr lang="en-GB" smtClean="0"/>
-              <a:t>14/04/2019</a:t>
+              <a:t>15/04/2019</a:t>
             </a:fld>
             <a:endParaRPr lang="en-GB"/>
           </a:p>
@@ -3696,7 +3696,7 @@
           <a:p>
             <a:fld id="{BA17F56F-1B67-4B63-8A5F-6AF1457D6EED}" type="datetimeFigureOut">
               <a:rPr lang="en-GB" smtClean="0"/>
-              <a:t>14/04/2019</a:t>
+              <a:t>15/04/2019</a:t>
             </a:fld>
             <a:endParaRPr lang="en-GB"/>
           </a:p>
@@ -3998,7 +3998,7 @@
           <a:p>
             <a:fld id="{BA17F56F-1B67-4B63-8A5F-6AF1457D6EED}" type="datetimeFigureOut">
               <a:rPr lang="en-GB" smtClean="0"/>
-              <a:t>14/04/2019</a:t>
+              <a:t>15/04/2019</a:t>
             </a:fld>
             <a:endParaRPr lang="en-GB"/>
           </a:p>
@@ -4365,7 +4365,7 @@
           <a:p>
             <a:fld id="{BA17F56F-1B67-4B63-8A5F-6AF1457D6EED}" type="datetimeFigureOut">
               <a:rPr lang="en-GB" smtClean="0"/>
-              <a:t>14/04/2019</a:t>
+              <a:t>15/04/2019</a:t>
             </a:fld>
             <a:endParaRPr lang="en-GB"/>
           </a:p>
@@ -4539,7 +4539,7 @@
           <a:p>
             <a:fld id="{BA17F56F-1B67-4B63-8A5F-6AF1457D6EED}" type="datetimeFigureOut">
               <a:rPr lang="en-GB" smtClean="0"/>
-              <a:t>14/04/2019</a:t>
+              <a:t>15/04/2019</a:t>
             </a:fld>
             <a:endParaRPr lang="en-GB"/>
           </a:p>
@@ -4719,7 +4719,7 @@
           <a:p>
             <a:fld id="{BA17F56F-1B67-4B63-8A5F-6AF1457D6EED}" type="datetimeFigureOut">
               <a:rPr lang="en-GB" smtClean="0"/>
-              <a:t>14/04/2019</a:t>
+              <a:t>15/04/2019</a:t>
             </a:fld>
             <a:endParaRPr lang="en-GB"/>
           </a:p>
@@ -4889,7 +4889,7 @@
           <a:p>
             <a:fld id="{BA17F56F-1B67-4B63-8A5F-6AF1457D6EED}" type="datetimeFigureOut">
               <a:rPr lang="en-GB" smtClean="0"/>
-              <a:t>14/04/2019</a:t>
+              <a:t>15/04/2019</a:t>
             </a:fld>
             <a:endParaRPr lang="en-GB"/>
           </a:p>
@@ -5139,7 +5139,7 @@
           <a:p>
             <a:fld id="{BA17F56F-1B67-4B63-8A5F-6AF1457D6EED}" type="datetimeFigureOut">
               <a:rPr lang="en-GB" smtClean="0"/>
-              <a:t>14/04/2019</a:t>
+              <a:t>15/04/2019</a:t>
             </a:fld>
             <a:endParaRPr lang="en-GB"/>
           </a:p>
@@ -5375,7 +5375,7 @@
           <a:p>
             <a:fld id="{BA17F56F-1B67-4B63-8A5F-6AF1457D6EED}" type="datetimeFigureOut">
               <a:rPr lang="en-GB" smtClean="0"/>
-              <a:t>14/04/2019</a:t>
+              <a:t>15/04/2019</a:t>
             </a:fld>
             <a:endParaRPr lang="en-GB"/>
           </a:p>
@@ -5757,7 +5757,7 @@
           <a:p>
             <a:fld id="{BA17F56F-1B67-4B63-8A5F-6AF1457D6EED}" type="datetimeFigureOut">
               <a:rPr lang="en-GB" smtClean="0"/>
-              <a:t>14/04/2019</a:t>
+              <a:t>15/04/2019</a:t>
             </a:fld>
             <a:endParaRPr lang="en-GB"/>
           </a:p>
@@ -5875,7 +5875,7 @@
           <a:p>
             <a:fld id="{BA17F56F-1B67-4B63-8A5F-6AF1457D6EED}" type="datetimeFigureOut">
               <a:rPr lang="en-GB" smtClean="0"/>
-              <a:t>14/04/2019</a:t>
+              <a:t>15/04/2019</a:t>
             </a:fld>
             <a:endParaRPr lang="en-GB"/>
           </a:p>
@@ -5970,7 +5970,7 @@
           <a:p>
             <a:fld id="{BA17F56F-1B67-4B63-8A5F-6AF1457D6EED}" type="datetimeFigureOut">
               <a:rPr lang="en-GB" smtClean="0"/>
-              <a:t>14/04/2019</a:t>
+              <a:t>15/04/2019</a:t>
             </a:fld>
             <a:endParaRPr lang="en-GB"/>
           </a:p>
@@ -6225,7 +6225,7 @@
           <a:p>
             <a:fld id="{BA17F56F-1B67-4B63-8A5F-6AF1457D6EED}" type="datetimeFigureOut">
               <a:rPr lang="en-GB" smtClean="0"/>
-              <a:t>14/04/2019</a:t>
+              <a:t>15/04/2019</a:t>
             </a:fld>
             <a:endParaRPr lang="en-GB"/>
           </a:p>
@@ -6508,7 +6508,7 @@
           <a:p>
             <a:fld id="{BA17F56F-1B67-4B63-8A5F-6AF1457D6EED}" type="datetimeFigureOut">
               <a:rPr lang="en-GB" smtClean="0"/>
-              <a:t>14/04/2019</a:t>
+              <a:t>15/04/2019</a:t>
             </a:fld>
             <a:endParaRPr lang="en-GB"/>
           </a:p>
@@ -6914,7 +6914,7 @@
           <a:p>
             <a:fld id="{BA17F56F-1B67-4B63-8A5F-6AF1457D6EED}" type="datetimeFigureOut">
               <a:rPr lang="en-GB" smtClean="0"/>
-              <a:t>14/04/2019</a:t>
+              <a:t>15/04/2019</a:t>
             </a:fld>
             <a:endParaRPr lang="en-GB"/>
           </a:p>
@@ -8932,6 +8932,111 @@
           </a:p>
         </p:txBody>
       </p:sp>
+      <p:sp>
+        <p:nvSpPr>
+          <p:cNvPr id="18" name="TextBox 17">
+            <a:extLst>
+              <a:ext uri="{FF2B5EF4-FFF2-40B4-BE49-F238E27FC236}">
+                <a16:creationId xmlns:a16="http://schemas.microsoft.com/office/drawing/2014/main" id="{36D0E3D1-EEDC-BB40-B1F6-30B8A2633D53}"/>
+              </a:ext>
+            </a:extLst>
+          </p:cNvPr>
+          <p:cNvSpPr txBox="1"/>
+          <p:nvPr/>
+        </p:nvSpPr>
+        <p:spPr>
+          <a:xfrm>
+            <a:off x="659165" y="5373691"/>
+            <a:ext cx="8534400" cy="646331"/>
+          </a:xfrm>
+          <a:prstGeom prst="rect">
+            <a:avLst/>
+          </a:prstGeom>
+          <a:noFill/>
+        </p:spPr>
+        <p:txBody>
+          <a:bodyPr wrap="square" rtlCol="0">
+            <a:spAutoFit/>
+          </a:bodyPr>
+          <a:lstStyle/>
+          <a:p>
+            <a:r>
+              <a:rPr lang="en-US" dirty="0" err="1"/>
+              <a:t>Genom</a:t>
+            </a:r>
+            <a:r>
+              <a:rPr lang="en-US" dirty="0"/>
+              <a:t> </a:t>
+            </a:r>
+            <a:r>
+              <a:rPr lang="en-US" dirty="0" err="1"/>
+              <a:t>koji</a:t>
+            </a:r>
+            <a:r>
+              <a:rPr lang="en-US" dirty="0"/>
+              <a:t> se </a:t>
+            </a:r>
+            <a:r>
+              <a:rPr lang="en-US" dirty="0" err="1"/>
+              <a:t>pretražuje</a:t>
+            </a:r>
+            <a:r>
+              <a:rPr lang="en-US" dirty="0"/>
+              <a:t> </a:t>
+            </a:r>
+            <a:r>
+              <a:rPr lang="en-US" dirty="0" err="1"/>
+              <a:t>je</a:t>
+            </a:r>
+            <a:r>
+              <a:rPr lang="en-US" dirty="0"/>
+              <a:t> </a:t>
+            </a:r>
+            <a:r>
+              <a:rPr lang="en-US" dirty="0" err="1"/>
+              <a:t>veličine</a:t>
+            </a:r>
+            <a:r>
+              <a:rPr lang="en-US" dirty="0"/>
+              <a:t> 100MB </a:t>
+            </a:r>
+          </a:p>
+          <a:p>
+            <a:r>
+              <a:rPr lang="en-US" dirty="0" err="1"/>
+              <a:t>Paterni</a:t>
+            </a:r>
+            <a:r>
+              <a:rPr lang="en-US" dirty="0"/>
+              <a:t> </a:t>
+            </a:r>
+            <a:r>
+              <a:rPr lang="en-US" dirty="0" err="1"/>
+              <a:t>koji</a:t>
+            </a:r>
+            <a:r>
+              <a:rPr lang="en-US" dirty="0"/>
+              <a:t> se </a:t>
+            </a:r>
+            <a:r>
+              <a:rPr lang="en-US" dirty="0" err="1"/>
+              <a:t>traže</a:t>
+            </a:r>
+            <a:r>
+              <a:rPr lang="en-US" dirty="0"/>
+              <a:t> </a:t>
+            </a:r>
+            <a:r>
+              <a:rPr lang="en-US" dirty="0" err="1"/>
+              <a:t>su</a:t>
+            </a:r>
+            <a:r>
+              <a:rPr lang="en-US" dirty="0"/>
+              <a:t>: ATGATG, CTCTCTA I TCACTACTCTCA</a:t>
+            </a:r>
+          </a:p>
+        </p:txBody>
+      </p:sp>
     </p:spTree>
     <p:extLst>
       <p:ext uri="{BB962C8B-B14F-4D97-AF65-F5344CB8AC3E}">
@@ -9872,6 +9977,111 @@
             <a:r>
               <a:rPr lang="en-GB" dirty="0"/>
               <a:t> chromosome X</a:t>
+            </a:r>
+          </a:p>
+        </p:txBody>
+      </p:sp>
+      <p:sp>
+        <p:nvSpPr>
+          <p:cNvPr id="2" name="TextBox 1">
+            <a:extLst>
+              <a:ext uri="{FF2B5EF4-FFF2-40B4-BE49-F238E27FC236}">
+                <a16:creationId xmlns:a16="http://schemas.microsoft.com/office/drawing/2014/main" id="{97D274D8-DEE3-B74A-86BC-DFCA77D057C0}"/>
+              </a:ext>
+            </a:extLst>
+          </p:cNvPr>
+          <p:cNvSpPr txBox="1"/>
+          <p:nvPr/>
+        </p:nvSpPr>
+        <p:spPr>
+          <a:xfrm>
+            <a:off x="659165" y="5373691"/>
+            <a:ext cx="8534400" cy="646331"/>
+          </a:xfrm>
+          <a:prstGeom prst="rect">
+            <a:avLst/>
+          </a:prstGeom>
+          <a:noFill/>
+        </p:spPr>
+        <p:txBody>
+          <a:bodyPr wrap="square" rtlCol="0">
+            <a:spAutoFit/>
+          </a:bodyPr>
+          <a:lstStyle/>
+          <a:p>
+            <a:r>
+              <a:rPr lang="en-US" dirty="0" err="1"/>
+              <a:t>Genom</a:t>
+            </a:r>
+            <a:r>
+              <a:rPr lang="en-US" dirty="0"/>
+              <a:t> </a:t>
+            </a:r>
+            <a:r>
+              <a:rPr lang="en-US" dirty="0" err="1"/>
+              <a:t>koji</a:t>
+            </a:r>
+            <a:r>
+              <a:rPr lang="en-US" dirty="0"/>
+              <a:t> se </a:t>
+            </a:r>
+            <a:r>
+              <a:rPr lang="en-US" dirty="0" err="1"/>
+              <a:t>pretražuje</a:t>
+            </a:r>
+            <a:r>
+              <a:rPr lang="en-US" dirty="0"/>
+              <a:t> </a:t>
+            </a:r>
+            <a:r>
+              <a:rPr lang="en-US" dirty="0" err="1"/>
+              <a:t>je</a:t>
+            </a:r>
+            <a:r>
+              <a:rPr lang="en-US" dirty="0"/>
+              <a:t> </a:t>
+            </a:r>
+            <a:r>
+              <a:rPr lang="en-US" dirty="0" err="1"/>
+              <a:t>veličine</a:t>
+            </a:r>
+            <a:r>
+              <a:rPr lang="en-US" dirty="0"/>
+              <a:t> 150MB </a:t>
+            </a:r>
+          </a:p>
+          <a:p>
+            <a:r>
+              <a:rPr lang="en-US" dirty="0" err="1"/>
+              <a:t>Paterni</a:t>
+            </a:r>
+            <a:r>
+              <a:rPr lang="en-US" dirty="0"/>
+              <a:t> </a:t>
+            </a:r>
+            <a:r>
+              <a:rPr lang="en-US" dirty="0" err="1"/>
+              <a:t>koji</a:t>
+            </a:r>
+            <a:r>
+              <a:rPr lang="en-US" dirty="0"/>
+              <a:t> se </a:t>
+            </a:r>
+            <a:r>
+              <a:rPr lang="en-US" dirty="0" err="1"/>
+              <a:t>traže</a:t>
+            </a:r>
+            <a:r>
+              <a:rPr lang="en-US" dirty="0"/>
+              <a:t> </a:t>
+            </a:r>
+            <a:r>
+              <a:rPr lang="en-US" dirty="0" err="1"/>
+              <a:t>su</a:t>
+            </a:r>
+            <a:r>
+              <a:rPr lang="en-US" dirty="0"/>
+              <a:t>: ATGCATG, TCTCTCTA I TTCACTACTCTCA</a:t>
             </a:r>
           </a:p>
         </p:txBody>
@@ -17125,6 +17335,111 @@
             <a:r>
               <a:rPr lang="en-GB" dirty="0"/>
               <a:t> arabica, Chromosome 1c</a:t>
+            </a:r>
+          </a:p>
+        </p:txBody>
+      </p:sp>
+      <p:sp>
+        <p:nvSpPr>
+          <p:cNvPr id="18" name="TextBox 17">
+            <a:extLst>
+              <a:ext uri="{FF2B5EF4-FFF2-40B4-BE49-F238E27FC236}">
+                <a16:creationId xmlns:a16="http://schemas.microsoft.com/office/drawing/2014/main" id="{E651C8E4-720D-3E49-8809-66423F9A0332}"/>
+              </a:ext>
+            </a:extLst>
+          </p:cNvPr>
+          <p:cNvSpPr txBox="1"/>
+          <p:nvPr/>
+        </p:nvSpPr>
+        <p:spPr>
+          <a:xfrm>
+            <a:off x="659165" y="5373691"/>
+            <a:ext cx="8534400" cy="646331"/>
+          </a:xfrm>
+          <a:prstGeom prst="rect">
+            <a:avLst/>
+          </a:prstGeom>
+          <a:noFill/>
+        </p:spPr>
+        <p:txBody>
+          <a:bodyPr wrap="square" rtlCol="0">
+            <a:spAutoFit/>
+          </a:bodyPr>
+          <a:lstStyle/>
+          <a:p>
+            <a:r>
+              <a:rPr lang="en-US" dirty="0" err="1"/>
+              <a:t>Genom</a:t>
+            </a:r>
+            <a:r>
+              <a:rPr lang="en-US" dirty="0"/>
+              <a:t> </a:t>
+            </a:r>
+            <a:r>
+              <a:rPr lang="en-US" dirty="0" err="1"/>
+              <a:t>koji</a:t>
+            </a:r>
+            <a:r>
+              <a:rPr lang="en-US" dirty="0"/>
+              <a:t> se </a:t>
+            </a:r>
+            <a:r>
+              <a:rPr lang="en-US" dirty="0" err="1"/>
+              <a:t>pretražuje</a:t>
+            </a:r>
+            <a:r>
+              <a:rPr lang="en-US" dirty="0"/>
+              <a:t> </a:t>
+            </a:r>
+            <a:r>
+              <a:rPr lang="en-US" dirty="0" err="1"/>
+              <a:t>je</a:t>
+            </a:r>
+            <a:r>
+              <a:rPr lang="en-US" dirty="0"/>
+              <a:t> </a:t>
+            </a:r>
+            <a:r>
+              <a:rPr lang="en-US" dirty="0" err="1"/>
+              <a:t>veličine</a:t>
+            </a:r>
+            <a:r>
+              <a:rPr lang="en-US" dirty="0"/>
+              <a:t> 50MB </a:t>
+            </a:r>
+          </a:p>
+          <a:p>
+            <a:r>
+              <a:rPr lang="en-US" dirty="0" err="1"/>
+              <a:t>Paterni</a:t>
+            </a:r>
+            <a:r>
+              <a:rPr lang="en-US" dirty="0"/>
+              <a:t> </a:t>
+            </a:r>
+            <a:r>
+              <a:rPr lang="en-US" dirty="0" err="1"/>
+              <a:t>koji</a:t>
+            </a:r>
+            <a:r>
+              <a:rPr lang="en-US" dirty="0"/>
+              <a:t> se </a:t>
+            </a:r>
+            <a:r>
+              <a:rPr lang="en-US" dirty="0" err="1"/>
+              <a:t>traže</a:t>
+            </a:r>
+            <a:r>
+              <a:rPr lang="en-US" dirty="0"/>
+              <a:t> </a:t>
+            </a:r>
+            <a:r>
+              <a:rPr lang="en-US" dirty="0" err="1"/>
+              <a:t>su</a:t>
+            </a:r>
+            <a:r>
+              <a:rPr lang="en-US" dirty="0"/>
+              <a:t>: ATGATG, CTCTCTA I TCACTACTCTCA</a:t>
             </a:r>
           </a:p>
         </p:txBody>

</xml_diff>

<commit_message>
added visualisation to presentation
</commit_message>
<xml_diff>
--- a/Presentation/gi_presentation.pptx
+++ b/Presentation/gi_presentation.pptx
@@ -5,7 +5,7 @@
     <p:sldMasterId id="2147483660" r:id="rId1"/>
   </p:sldMasterIdLst>
   <p:notesMasterIdLst>
-    <p:notesMasterId r:id="rId14"/>
+    <p:notesMasterId r:id="rId17"/>
   </p:notesMasterIdLst>
   <p:sldIdLst>
     <p:sldId id="256" r:id="rId2"/>
@@ -17,9 +17,12 @@
     <p:sldId id="264" r:id="rId8"/>
     <p:sldId id="258" r:id="rId9"/>
     <p:sldId id="266" r:id="rId10"/>
-    <p:sldId id="270" r:id="rId11"/>
-    <p:sldId id="269" r:id="rId12"/>
-    <p:sldId id="265" r:id="rId13"/>
+    <p:sldId id="271" r:id="rId11"/>
+    <p:sldId id="270" r:id="rId12"/>
+    <p:sldId id="272" r:id="rId13"/>
+    <p:sldId id="269" r:id="rId14"/>
+    <p:sldId id="273" r:id="rId15"/>
+    <p:sldId id="265" r:id="rId16"/>
   </p:sldIdLst>
   <p:sldSz cx="12192000" cy="6858000"/>
   <p:notesSz cx="6858000" cy="9144000"/>
@@ -208,7 +211,7 @@
           <a:p>
             <a:fld id="{24031642-1FF4-6441-BCAF-6D8858459232}" type="datetimeFigureOut">
               <a:rPr lang="en-US" smtClean="0"/>
-              <a:t>4/15/19</a:t>
+              <a:t>4/16/19</a:t>
             </a:fld>
             <a:endParaRPr lang="en-US"/>
           </a:p>
@@ -2174,7 +2177,7 @@
           <a:p>
             <a:fld id="{DBECFB56-5338-9E45-BBC8-5B80A293CA20}" type="slidenum">
               <a:rPr lang="en-US" smtClean="0"/>
-              <a:t>12</a:t>
+              <a:t>15</a:t>
             </a:fld>
             <a:endParaRPr lang="en-US"/>
           </a:p>
@@ -2384,7 +2387,7 @@
           <a:p>
             <a:fld id="{BA17F56F-1B67-4B63-8A5F-6AF1457D6EED}" type="datetimeFigureOut">
               <a:rPr lang="en-GB" smtClean="0"/>
-              <a:t>15/04/2019</a:t>
+              <a:t>16/04/2019</a:t>
             </a:fld>
             <a:endParaRPr lang="en-GB"/>
           </a:p>
@@ -2820,7 +2823,7 @@
           <a:p>
             <a:fld id="{BA17F56F-1B67-4B63-8A5F-6AF1457D6EED}" type="datetimeFigureOut">
               <a:rPr lang="en-GB" smtClean="0"/>
-              <a:t>15/04/2019</a:t>
+              <a:t>16/04/2019</a:t>
             </a:fld>
             <a:endParaRPr lang="en-GB"/>
           </a:p>
@@ -3070,7 +3073,7 @@
           <a:p>
             <a:fld id="{BA17F56F-1B67-4B63-8A5F-6AF1457D6EED}" type="datetimeFigureOut">
               <a:rPr lang="en-GB" smtClean="0"/>
-              <a:t>15/04/2019</a:t>
+              <a:t>16/04/2019</a:t>
             </a:fld>
             <a:endParaRPr lang="en-GB"/>
           </a:p>
@@ -3378,7 +3381,7 @@
           <a:p>
             <a:fld id="{BA17F56F-1B67-4B63-8A5F-6AF1457D6EED}" type="datetimeFigureOut">
               <a:rPr lang="en-GB" smtClean="0"/>
-              <a:t>15/04/2019</a:t>
+              <a:t>16/04/2019</a:t>
             </a:fld>
             <a:endParaRPr lang="en-GB"/>
           </a:p>
@@ -3696,7 +3699,7 @@
           <a:p>
             <a:fld id="{BA17F56F-1B67-4B63-8A5F-6AF1457D6EED}" type="datetimeFigureOut">
               <a:rPr lang="en-GB" smtClean="0"/>
-              <a:t>15/04/2019</a:t>
+              <a:t>16/04/2019</a:t>
             </a:fld>
             <a:endParaRPr lang="en-GB"/>
           </a:p>
@@ -3998,7 +4001,7 @@
           <a:p>
             <a:fld id="{BA17F56F-1B67-4B63-8A5F-6AF1457D6EED}" type="datetimeFigureOut">
               <a:rPr lang="en-GB" smtClean="0"/>
-              <a:t>15/04/2019</a:t>
+              <a:t>16/04/2019</a:t>
             </a:fld>
             <a:endParaRPr lang="en-GB"/>
           </a:p>
@@ -4365,7 +4368,7 @@
           <a:p>
             <a:fld id="{BA17F56F-1B67-4B63-8A5F-6AF1457D6EED}" type="datetimeFigureOut">
               <a:rPr lang="en-GB" smtClean="0"/>
-              <a:t>15/04/2019</a:t>
+              <a:t>16/04/2019</a:t>
             </a:fld>
             <a:endParaRPr lang="en-GB"/>
           </a:p>
@@ -4539,7 +4542,7 @@
           <a:p>
             <a:fld id="{BA17F56F-1B67-4B63-8A5F-6AF1457D6EED}" type="datetimeFigureOut">
               <a:rPr lang="en-GB" smtClean="0"/>
-              <a:t>15/04/2019</a:t>
+              <a:t>16/04/2019</a:t>
             </a:fld>
             <a:endParaRPr lang="en-GB"/>
           </a:p>
@@ -4719,7 +4722,7 @@
           <a:p>
             <a:fld id="{BA17F56F-1B67-4B63-8A5F-6AF1457D6EED}" type="datetimeFigureOut">
               <a:rPr lang="en-GB" smtClean="0"/>
-              <a:t>15/04/2019</a:t>
+              <a:t>16/04/2019</a:t>
             </a:fld>
             <a:endParaRPr lang="en-GB"/>
           </a:p>
@@ -4889,7 +4892,7 @@
           <a:p>
             <a:fld id="{BA17F56F-1B67-4B63-8A5F-6AF1457D6EED}" type="datetimeFigureOut">
               <a:rPr lang="en-GB" smtClean="0"/>
-              <a:t>15/04/2019</a:t>
+              <a:t>16/04/2019</a:t>
             </a:fld>
             <a:endParaRPr lang="en-GB"/>
           </a:p>
@@ -5139,7 +5142,7 @@
           <a:p>
             <a:fld id="{BA17F56F-1B67-4B63-8A5F-6AF1457D6EED}" type="datetimeFigureOut">
               <a:rPr lang="en-GB" smtClean="0"/>
-              <a:t>15/04/2019</a:t>
+              <a:t>16/04/2019</a:t>
             </a:fld>
             <a:endParaRPr lang="en-GB"/>
           </a:p>
@@ -5375,7 +5378,7 @@
           <a:p>
             <a:fld id="{BA17F56F-1B67-4B63-8A5F-6AF1457D6EED}" type="datetimeFigureOut">
               <a:rPr lang="en-GB" smtClean="0"/>
-              <a:t>15/04/2019</a:t>
+              <a:t>16/04/2019</a:t>
             </a:fld>
             <a:endParaRPr lang="en-GB"/>
           </a:p>
@@ -5757,7 +5760,7 @@
           <a:p>
             <a:fld id="{BA17F56F-1B67-4B63-8A5F-6AF1457D6EED}" type="datetimeFigureOut">
               <a:rPr lang="en-GB" smtClean="0"/>
-              <a:t>15/04/2019</a:t>
+              <a:t>16/04/2019</a:t>
             </a:fld>
             <a:endParaRPr lang="en-GB"/>
           </a:p>
@@ -5875,7 +5878,7 @@
           <a:p>
             <a:fld id="{BA17F56F-1B67-4B63-8A5F-6AF1457D6EED}" type="datetimeFigureOut">
               <a:rPr lang="en-GB" smtClean="0"/>
-              <a:t>15/04/2019</a:t>
+              <a:t>16/04/2019</a:t>
             </a:fld>
             <a:endParaRPr lang="en-GB"/>
           </a:p>
@@ -5970,7 +5973,7 @@
           <a:p>
             <a:fld id="{BA17F56F-1B67-4B63-8A5F-6AF1457D6EED}" type="datetimeFigureOut">
               <a:rPr lang="en-GB" smtClean="0"/>
-              <a:t>15/04/2019</a:t>
+              <a:t>16/04/2019</a:t>
             </a:fld>
             <a:endParaRPr lang="en-GB"/>
           </a:p>
@@ -6225,7 +6228,7 @@
           <a:p>
             <a:fld id="{BA17F56F-1B67-4B63-8A5F-6AF1457D6EED}" type="datetimeFigureOut">
               <a:rPr lang="en-GB" smtClean="0"/>
-              <a:t>15/04/2019</a:t>
+              <a:t>16/04/2019</a:t>
             </a:fld>
             <a:endParaRPr lang="en-GB"/>
           </a:p>
@@ -6508,7 +6511,7 @@
           <a:p>
             <a:fld id="{BA17F56F-1B67-4B63-8A5F-6AF1457D6EED}" type="datetimeFigureOut">
               <a:rPr lang="en-GB" smtClean="0"/>
-              <a:t>15/04/2019</a:t>
+              <a:t>16/04/2019</a:t>
             </a:fld>
             <a:endParaRPr lang="en-GB"/>
           </a:p>
@@ -6914,7 +6917,7 @@
           <a:p>
             <a:fld id="{BA17F56F-1B67-4B63-8A5F-6AF1457D6EED}" type="datetimeFigureOut">
               <a:rPr lang="en-GB" smtClean="0"/>
-              <a:t>15/04/2019</a:t>
+              <a:t>16/04/2019</a:t>
             </a:fld>
             <a:endParaRPr lang="en-GB"/>
           </a:p>
@@ -8397,6 +8400,454 @@
           </p:style>
         </p:cxnSp>
       </p:grpSp>
+      <p:pic>
+        <p:nvPicPr>
+          <p:cNvPr id="7" name="Picture 6">
+            <a:extLst>
+              <a:ext uri="{FF2B5EF4-FFF2-40B4-BE49-F238E27FC236}">
+                <a16:creationId xmlns:a16="http://schemas.microsoft.com/office/drawing/2014/main" id="{01DD4598-4BC7-1F48-B446-2B4B2AF496D6}"/>
+              </a:ext>
+            </a:extLst>
+          </p:cNvPr>
+          <p:cNvPicPr>
+            <a:picLocks noChangeAspect="1"/>
+          </p:cNvPicPr>
+          <p:nvPr/>
+        </p:nvPicPr>
+        <p:blipFill>
+          <a:blip r:embed="rId2">
+            <a:extLst>
+              <a:ext uri="{28A0092B-C50C-407E-A947-70E740481C1C}">
+                <a14:useLocalDpi xmlns:a14="http://schemas.microsoft.com/office/drawing/2010/main" val="0"/>
+              </a:ext>
+            </a:extLst>
+          </a:blip>
+          <a:stretch>
+            <a:fillRect/>
+          </a:stretch>
+        </p:blipFill>
+        <p:spPr>
+          <a:xfrm>
+            <a:off x="0" y="0"/>
+            <a:ext cx="12192000" cy="6858000"/>
+          </a:xfrm>
+          <a:prstGeom prst="rect">
+            <a:avLst/>
+          </a:prstGeom>
+        </p:spPr>
+      </p:pic>
+    </p:spTree>
+    <p:extLst>
+      <p:ext uri="{BB962C8B-B14F-4D97-AF65-F5344CB8AC3E}">
+        <p14:creationId xmlns:p14="http://schemas.microsoft.com/office/powerpoint/2010/main" val="668088646"/>
+      </p:ext>
+    </p:extLst>
+  </p:cSld>
+  <p:clrMapOvr>
+    <a:masterClrMapping/>
+  </p:clrMapOvr>
+</p:sld>
+</file>
+
+<file path=ppt/slides/slide11.xml><?xml version="1.0" encoding="utf-8"?>
+<p:sld xmlns:a="http://schemas.openxmlformats.org/drawingml/2006/main" xmlns:r="http://schemas.openxmlformats.org/officeDocument/2006/relationships" xmlns:p="http://schemas.openxmlformats.org/presentationml/2006/main">
+  <p:cSld>
+    <p:bg>
+      <p:bgPr>
+        <a:gradFill rotWithShape="1">
+          <a:gsLst>
+            <a:gs pos="10000">
+              <a:schemeClr val="bg1">
+                <a:tint val="97000"/>
+                <a:hueMod val="92000"/>
+                <a:satMod val="169000"/>
+                <a:lumMod val="164000"/>
+              </a:schemeClr>
+            </a:gs>
+            <a:gs pos="100000">
+              <a:schemeClr val="bg1">
+                <a:shade val="96000"/>
+                <a:satMod val="120000"/>
+                <a:lumMod val="90000"/>
+              </a:schemeClr>
+            </a:gs>
+          </a:gsLst>
+          <a:lin ang="6120000" scaled="1"/>
+        </a:gradFill>
+        <a:effectLst/>
+      </p:bgPr>
+    </p:bg>
+    <p:spTree>
+      <p:nvGrpSpPr>
+        <p:cNvPr id="1" name=""/>
+        <p:cNvGrpSpPr/>
+        <p:nvPr/>
+      </p:nvGrpSpPr>
+      <p:grpSpPr>
+        <a:xfrm>
+          <a:off x="0" y="0"/>
+          <a:ext cx="0" cy="0"/>
+          <a:chOff x="0" y="0"/>
+          <a:chExt cx="0" cy="0"/>
+        </a:xfrm>
+      </p:grpSpPr>
+      <p:sp useBgFill="1">
+        <p:nvSpPr>
+          <p:cNvPr id="8" name="Rectangle 7">
+            <a:extLst>
+              <a:ext uri="{FF2B5EF4-FFF2-40B4-BE49-F238E27FC236}">
+                <a16:creationId xmlns:a16="http://schemas.microsoft.com/office/drawing/2014/main" id="{CADF2543-1B6F-4FBC-A7AF-53A0430E05AB}"/>
+              </a:ext>
+              <a:ext uri="{C183D7F6-B498-43B3-948B-1728B52AA6E4}">
+                <adec:decorative xmlns:adec="http://schemas.microsoft.com/office/drawing/2017/decorative" val="1"/>
+              </a:ext>
+            </a:extLst>
+          </p:cNvPr>
+          <p:cNvSpPr>
+            <a:spLocks noGrp="1" noRot="1" noChangeAspect="1" noMove="1" noResize="1" noEditPoints="1" noAdjustHandles="1" noChangeArrowheads="1" noChangeShapeType="1" noTextEdit="1"/>
+          </p:cNvSpPr>
+          <p:nvPr>
+            <p:extLst>
+              <p:ext uri="{386F3935-93C4-4BCD-93E2-E3B085C9AB24}">
+                <p16:designElem xmlns:p16="http://schemas.microsoft.com/office/powerpoint/2015/main" val="1"/>
+              </p:ext>
+            </p:extLst>
+          </p:nvPr>
+        </p:nvSpPr>
+        <p:spPr>
+          <a:xfrm>
+            <a:off x="0" y="0"/>
+            <a:ext cx="12192000" cy="6858000"/>
+          </a:xfrm>
+          <a:prstGeom prst="rect">
+            <a:avLst/>
+          </a:prstGeom>
+          <a:ln>
+            <a:noFill/>
+          </a:ln>
+        </p:spPr>
+        <p:style>
+          <a:lnRef idx="2">
+            <a:schemeClr val="accent1">
+              <a:shade val="50000"/>
+            </a:schemeClr>
+          </a:lnRef>
+          <a:fillRef idx="1">
+            <a:schemeClr val="accent1"/>
+          </a:fillRef>
+          <a:effectRef idx="0">
+            <a:schemeClr val="accent1"/>
+          </a:effectRef>
+          <a:fontRef idx="minor">
+            <a:schemeClr val="lt1"/>
+          </a:fontRef>
+        </p:style>
+        <p:txBody>
+          <a:bodyPr rtlCol="0" anchor="ctr"/>
+          <a:lstStyle/>
+          <a:p>
+            <a:pPr algn="ctr"/>
+            <a:endParaRPr lang="en-US"/>
+          </a:p>
+        </p:txBody>
+      </p:sp>
+      <p:grpSp>
+        <p:nvGrpSpPr>
+          <p:cNvPr id="10" name="Group 9">
+            <a:extLst>
+              <a:ext uri="{FF2B5EF4-FFF2-40B4-BE49-F238E27FC236}">
+                <a16:creationId xmlns:a16="http://schemas.microsoft.com/office/drawing/2014/main" id="{A80A6E81-6B71-43DF-877B-E964A9A4CB68}"/>
+              </a:ext>
+              <a:ext uri="{C183D7F6-B498-43B3-948B-1728B52AA6E4}">
+                <adec:decorative xmlns:adec="http://schemas.microsoft.com/office/drawing/2017/decorative" val="1"/>
+              </a:ext>
+            </a:extLst>
+          </p:cNvPr>
+          <p:cNvGrpSpPr>
+            <a:grpSpLocks noGrp="1" noUngrp="1" noRot="1" noChangeAspect="1" noMove="1" noResize="1"/>
+          </p:cNvGrpSpPr>
+          <p:nvPr>
+            <p:extLst>
+              <p:ext uri="{386F3935-93C4-4BCD-93E2-E3B085C9AB24}">
+                <p16:designElem xmlns:p16="http://schemas.microsoft.com/office/powerpoint/2015/main" val="1"/>
+              </p:ext>
+            </p:extLst>
+          </p:nvPr>
+        </p:nvGrpSpPr>
+        <p:grpSpPr>
+          <a:xfrm>
+            <a:off x="9206969" y="2963333"/>
+            <a:ext cx="2981858" cy="3208867"/>
+            <a:chOff x="9206969" y="2963333"/>
+            <a:chExt cx="2981858" cy="3208867"/>
+          </a:xfrm>
+        </p:grpSpPr>
+        <p:cxnSp>
+          <p:nvCxnSpPr>
+            <p:cNvPr id="11" name="Straight Connector 10">
+              <a:extLst>
+                <a:ext uri="{FF2B5EF4-FFF2-40B4-BE49-F238E27FC236}">
+                  <a16:creationId xmlns:a16="http://schemas.microsoft.com/office/drawing/2014/main" id="{4E35C3AD-357F-4004-A3F3-2D4EAF34A63D}"/>
+                </a:ext>
+                <a:ext uri="{C183D7F6-B498-43B3-948B-1728B52AA6E4}">
+                  <adec:decorative xmlns:adec="http://schemas.microsoft.com/office/drawing/2017/decorative" val="1"/>
+                </a:ext>
+              </a:extLst>
+            </p:cNvPr>
+            <p:cNvCxnSpPr/>
+            <p:nvPr>
+              <p:extLst>
+                <p:ext uri="{386F3935-93C4-4BCD-93E2-E3B085C9AB24}">
+                  <p16:designElem xmlns:p16="http://schemas.microsoft.com/office/powerpoint/2015/main" val="1"/>
+                </p:ext>
+              </p:extLst>
+            </p:nvPr>
+          </p:nvCxnSpPr>
+          <p:spPr>
+            <a:xfrm flipH="1">
+              <a:off x="11276012" y="2963333"/>
+              <a:ext cx="912814" cy="912812"/>
+            </a:xfrm>
+            <a:prstGeom prst="line">
+              <a:avLst/>
+            </a:prstGeom>
+            <a:ln w="9525">
+              <a:solidFill>
+                <a:schemeClr val="tx2">
+                  <a:lumMod val="75000"/>
+                  <a:alpha val="80000"/>
+                </a:schemeClr>
+              </a:solidFill>
+            </a:ln>
+          </p:spPr>
+          <p:style>
+            <a:lnRef idx="2">
+              <a:schemeClr val="accent1"/>
+            </a:lnRef>
+            <a:fillRef idx="0">
+              <a:schemeClr val="accent1"/>
+            </a:fillRef>
+            <a:effectRef idx="1">
+              <a:schemeClr val="accent1"/>
+            </a:effectRef>
+            <a:fontRef idx="minor">
+              <a:schemeClr val="tx1"/>
+            </a:fontRef>
+          </p:style>
+        </p:cxnSp>
+        <p:cxnSp>
+          <p:nvCxnSpPr>
+            <p:cNvPr id="12" name="Straight Connector 11">
+              <a:extLst>
+                <a:ext uri="{FF2B5EF4-FFF2-40B4-BE49-F238E27FC236}">
+                  <a16:creationId xmlns:a16="http://schemas.microsoft.com/office/drawing/2014/main" id="{337B6032-0A70-4F26-A9A3-B4D60DF11818}"/>
+                </a:ext>
+                <a:ext uri="{C183D7F6-B498-43B3-948B-1728B52AA6E4}">
+                  <adec:decorative xmlns:adec="http://schemas.microsoft.com/office/drawing/2017/decorative" val="1"/>
+                </a:ext>
+              </a:extLst>
+            </p:cNvPr>
+            <p:cNvCxnSpPr/>
+            <p:nvPr>
+              <p:extLst>
+                <p:ext uri="{386F3935-93C4-4BCD-93E2-E3B085C9AB24}">
+                  <p16:designElem xmlns:p16="http://schemas.microsoft.com/office/powerpoint/2015/main" val="1"/>
+                </p:ext>
+              </p:extLst>
+            </p:nvPr>
+          </p:nvCxnSpPr>
+          <p:spPr>
+            <a:xfrm flipH="1">
+              <a:off x="9206969" y="3190344"/>
+              <a:ext cx="2981857" cy="2981856"/>
+            </a:xfrm>
+            <a:prstGeom prst="line">
+              <a:avLst/>
+            </a:prstGeom>
+            <a:ln w="9525">
+              <a:solidFill>
+                <a:schemeClr val="tx2">
+                  <a:lumMod val="75000"/>
+                  <a:alpha val="80000"/>
+                </a:schemeClr>
+              </a:solidFill>
+            </a:ln>
+          </p:spPr>
+          <p:style>
+            <a:lnRef idx="2">
+              <a:schemeClr val="accent1"/>
+            </a:lnRef>
+            <a:fillRef idx="0">
+              <a:schemeClr val="accent1"/>
+            </a:fillRef>
+            <a:effectRef idx="1">
+              <a:schemeClr val="accent1"/>
+            </a:effectRef>
+            <a:fontRef idx="minor">
+              <a:schemeClr val="tx1"/>
+            </a:fontRef>
+          </p:style>
+        </p:cxnSp>
+        <p:cxnSp>
+          <p:nvCxnSpPr>
+            <p:cNvPr id="13" name="Straight Connector 12">
+              <a:extLst>
+                <a:ext uri="{FF2B5EF4-FFF2-40B4-BE49-F238E27FC236}">
+                  <a16:creationId xmlns:a16="http://schemas.microsoft.com/office/drawing/2014/main" id="{DE192CE3-3DD1-448F-93BE-42983DA0D5A9}"/>
+                </a:ext>
+                <a:ext uri="{C183D7F6-B498-43B3-948B-1728B52AA6E4}">
+                  <adec:decorative xmlns:adec="http://schemas.microsoft.com/office/drawing/2017/decorative" val="1"/>
+                </a:ext>
+              </a:extLst>
+            </p:cNvPr>
+            <p:cNvCxnSpPr/>
+            <p:nvPr>
+              <p:extLst>
+                <p:ext uri="{386F3935-93C4-4BCD-93E2-E3B085C9AB24}">
+                  <p16:designElem xmlns:p16="http://schemas.microsoft.com/office/powerpoint/2015/main" val="1"/>
+                </p:ext>
+              </p:extLst>
+            </p:nvPr>
+          </p:nvCxnSpPr>
+          <p:spPr>
+            <a:xfrm flipH="1">
+              <a:off x="10292292" y="3285067"/>
+              <a:ext cx="1896534" cy="1896533"/>
+            </a:xfrm>
+            <a:prstGeom prst="line">
+              <a:avLst/>
+            </a:prstGeom>
+            <a:ln w="9525">
+              <a:solidFill>
+                <a:schemeClr val="tx2">
+                  <a:lumMod val="75000"/>
+                  <a:alpha val="80000"/>
+                </a:schemeClr>
+              </a:solidFill>
+            </a:ln>
+          </p:spPr>
+          <p:style>
+            <a:lnRef idx="2">
+              <a:schemeClr val="accent1"/>
+            </a:lnRef>
+            <a:fillRef idx="0">
+              <a:schemeClr val="accent1"/>
+            </a:fillRef>
+            <a:effectRef idx="1">
+              <a:schemeClr val="accent1"/>
+            </a:effectRef>
+            <a:fontRef idx="minor">
+              <a:schemeClr val="tx1"/>
+            </a:fontRef>
+          </p:style>
+        </p:cxnSp>
+        <p:cxnSp>
+          <p:nvCxnSpPr>
+            <p:cNvPr id="14" name="Straight Connector 13">
+              <a:extLst>
+                <a:ext uri="{FF2B5EF4-FFF2-40B4-BE49-F238E27FC236}">
+                  <a16:creationId xmlns:a16="http://schemas.microsoft.com/office/drawing/2014/main" id="{E6D3DA09-5C72-4562-BEDE-1937DF87E81D}"/>
+                </a:ext>
+                <a:ext uri="{C183D7F6-B498-43B3-948B-1728B52AA6E4}">
+                  <adec:decorative xmlns:adec="http://schemas.microsoft.com/office/drawing/2017/decorative" val="1"/>
+                </a:ext>
+              </a:extLst>
+            </p:cNvPr>
+            <p:cNvCxnSpPr/>
+            <p:nvPr>
+              <p:extLst>
+                <p:ext uri="{386F3935-93C4-4BCD-93E2-E3B085C9AB24}">
+                  <p16:designElem xmlns:p16="http://schemas.microsoft.com/office/powerpoint/2015/main" val="1"/>
+                </p:ext>
+              </p:extLst>
+            </p:nvPr>
+          </p:nvCxnSpPr>
+          <p:spPr>
+            <a:xfrm flipH="1">
+              <a:off x="10443103" y="3131080"/>
+              <a:ext cx="1745722" cy="1745720"/>
+            </a:xfrm>
+            <a:prstGeom prst="line">
+              <a:avLst/>
+            </a:prstGeom>
+            <a:ln w="28575">
+              <a:solidFill>
+                <a:schemeClr val="tx2">
+                  <a:lumMod val="75000"/>
+                  <a:alpha val="80000"/>
+                </a:schemeClr>
+              </a:solidFill>
+            </a:ln>
+          </p:spPr>
+          <p:style>
+            <a:lnRef idx="2">
+              <a:schemeClr val="accent1"/>
+            </a:lnRef>
+            <a:fillRef idx="0">
+              <a:schemeClr val="accent1"/>
+            </a:fillRef>
+            <a:effectRef idx="1">
+              <a:schemeClr val="accent1"/>
+            </a:effectRef>
+            <a:fontRef idx="minor">
+              <a:schemeClr val="tx1"/>
+            </a:fontRef>
+          </p:style>
+        </p:cxnSp>
+        <p:cxnSp>
+          <p:nvCxnSpPr>
+            <p:cNvPr id="15" name="Straight Connector 14">
+              <a:extLst>
+                <a:ext uri="{FF2B5EF4-FFF2-40B4-BE49-F238E27FC236}">
+                  <a16:creationId xmlns:a16="http://schemas.microsoft.com/office/drawing/2014/main" id="{D6ACA7CA-2A20-49D7-9053-E076463D79A3}"/>
+                </a:ext>
+                <a:ext uri="{C183D7F6-B498-43B3-948B-1728B52AA6E4}">
+                  <adec:decorative xmlns:adec="http://schemas.microsoft.com/office/drawing/2017/decorative" val="1"/>
+                </a:ext>
+              </a:extLst>
+            </p:cNvPr>
+            <p:cNvCxnSpPr/>
+            <p:nvPr>
+              <p:extLst>
+                <p:ext uri="{386F3935-93C4-4BCD-93E2-E3B085C9AB24}">
+                  <p16:designElem xmlns:p16="http://schemas.microsoft.com/office/powerpoint/2015/main" val="1"/>
+                </p:ext>
+              </p:extLst>
+            </p:nvPr>
+          </p:nvCxnSpPr>
+          <p:spPr>
+            <a:xfrm flipH="1">
+              <a:off x="10918826" y="3683001"/>
+              <a:ext cx="1270001" cy="1269999"/>
+            </a:xfrm>
+            <a:prstGeom prst="line">
+              <a:avLst/>
+            </a:prstGeom>
+            <a:ln w="28575">
+              <a:solidFill>
+                <a:schemeClr val="tx2">
+                  <a:lumMod val="75000"/>
+                  <a:alpha val="80000"/>
+                </a:schemeClr>
+              </a:solidFill>
+            </a:ln>
+          </p:spPr>
+          <p:style>
+            <a:lnRef idx="2">
+              <a:schemeClr val="accent1"/>
+            </a:lnRef>
+            <a:fillRef idx="0">
+              <a:schemeClr val="accent1"/>
+            </a:fillRef>
+            <a:effectRef idx="1">
+              <a:schemeClr val="accent1"/>
+            </a:effectRef>
+            <a:fontRef idx="minor">
+              <a:schemeClr val="tx1"/>
+            </a:fontRef>
+          </p:style>
+        </p:cxnSp>
+      </p:grpSp>
       <p:graphicFrame>
         <p:nvGraphicFramePr>
           <p:cNvPr id="16" name="Content Placeholder 4">
@@ -9050,7 +9501,455 @@
 </p:sld>
 </file>
 
-<file path=ppt/slides/slide11.xml><?xml version="1.0" encoding="utf-8"?>
+<file path=ppt/slides/slide12.xml><?xml version="1.0" encoding="utf-8"?>
+<p:sld xmlns:a="http://schemas.openxmlformats.org/drawingml/2006/main" xmlns:r="http://schemas.openxmlformats.org/officeDocument/2006/relationships" xmlns:p="http://schemas.openxmlformats.org/presentationml/2006/main">
+  <p:cSld>
+    <p:bg>
+      <p:bgPr>
+        <a:gradFill rotWithShape="1">
+          <a:gsLst>
+            <a:gs pos="10000">
+              <a:schemeClr val="bg1">
+                <a:tint val="97000"/>
+                <a:hueMod val="92000"/>
+                <a:satMod val="169000"/>
+                <a:lumMod val="164000"/>
+              </a:schemeClr>
+            </a:gs>
+            <a:gs pos="100000">
+              <a:schemeClr val="bg1">
+                <a:shade val="96000"/>
+                <a:satMod val="120000"/>
+                <a:lumMod val="90000"/>
+              </a:schemeClr>
+            </a:gs>
+          </a:gsLst>
+          <a:lin ang="6120000" scaled="1"/>
+        </a:gradFill>
+        <a:effectLst/>
+      </p:bgPr>
+    </p:bg>
+    <p:spTree>
+      <p:nvGrpSpPr>
+        <p:cNvPr id="1" name=""/>
+        <p:cNvGrpSpPr/>
+        <p:nvPr/>
+      </p:nvGrpSpPr>
+      <p:grpSpPr>
+        <a:xfrm>
+          <a:off x="0" y="0"/>
+          <a:ext cx="0" cy="0"/>
+          <a:chOff x="0" y="0"/>
+          <a:chExt cx="0" cy="0"/>
+        </a:xfrm>
+      </p:grpSpPr>
+      <p:sp useBgFill="1">
+        <p:nvSpPr>
+          <p:cNvPr id="8" name="Rectangle 7">
+            <a:extLst>
+              <a:ext uri="{FF2B5EF4-FFF2-40B4-BE49-F238E27FC236}">
+                <a16:creationId xmlns:a16="http://schemas.microsoft.com/office/drawing/2014/main" id="{CADF2543-1B6F-4FBC-A7AF-53A0430E05AB}"/>
+              </a:ext>
+              <a:ext uri="{C183D7F6-B498-43B3-948B-1728B52AA6E4}">
+                <adec:decorative xmlns:adec="http://schemas.microsoft.com/office/drawing/2017/decorative" val="1"/>
+              </a:ext>
+            </a:extLst>
+          </p:cNvPr>
+          <p:cNvSpPr>
+            <a:spLocks noGrp="1" noRot="1" noChangeAspect="1" noMove="1" noResize="1" noEditPoints="1" noAdjustHandles="1" noChangeArrowheads="1" noChangeShapeType="1" noTextEdit="1"/>
+          </p:cNvSpPr>
+          <p:nvPr>
+            <p:extLst>
+              <p:ext uri="{386F3935-93C4-4BCD-93E2-E3B085C9AB24}">
+                <p16:designElem xmlns:p16="http://schemas.microsoft.com/office/powerpoint/2015/main" val="1"/>
+              </p:ext>
+            </p:extLst>
+          </p:nvPr>
+        </p:nvSpPr>
+        <p:spPr>
+          <a:xfrm>
+            <a:off x="0" y="0"/>
+            <a:ext cx="12192000" cy="6858000"/>
+          </a:xfrm>
+          <a:prstGeom prst="rect">
+            <a:avLst/>
+          </a:prstGeom>
+          <a:ln>
+            <a:noFill/>
+          </a:ln>
+        </p:spPr>
+        <p:style>
+          <a:lnRef idx="2">
+            <a:schemeClr val="accent1">
+              <a:shade val="50000"/>
+            </a:schemeClr>
+          </a:lnRef>
+          <a:fillRef idx="1">
+            <a:schemeClr val="accent1"/>
+          </a:fillRef>
+          <a:effectRef idx="0">
+            <a:schemeClr val="accent1"/>
+          </a:effectRef>
+          <a:fontRef idx="minor">
+            <a:schemeClr val="lt1"/>
+          </a:fontRef>
+        </p:style>
+        <p:txBody>
+          <a:bodyPr rtlCol="0" anchor="ctr"/>
+          <a:lstStyle/>
+          <a:p>
+            <a:pPr algn="ctr"/>
+            <a:endParaRPr lang="en-US"/>
+          </a:p>
+        </p:txBody>
+      </p:sp>
+      <p:grpSp>
+        <p:nvGrpSpPr>
+          <p:cNvPr id="10" name="Group 9">
+            <a:extLst>
+              <a:ext uri="{FF2B5EF4-FFF2-40B4-BE49-F238E27FC236}">
+                <a16:creationId xmlns:a16="http://schemas.microsoft.com/office/drawing/2014/main" id="{A80A6E81-6B71-43DF-877B-E964A9A4CB68}"/>
+              </a:ext>
+              <a:ext uri="{C183D7F6-B498-43B3-948B-1728B52AA6E4}">
+                <adec:decorative xmlns:adec="http://schemas.microsoft.com/office/drawing/2017/decorative" val="1"/>
+              </a:ext>
+            </a:extLst>
+          </p:cNvPr>
+          <p:cNvGrpSpPr>
+            <a:grpSpLocks noGrp="1" noUngrp="1" noRot="1" noChangeAspect="1" noMove="1" noResize="1"/>
+          </p:cNvGrpSpPr>
+          <p:nvPr>
+            <p:extLst>
+              <p:ext uri="{386F3935-93C4-4BCD-93E2-E3B085C9AB24}">
+                <p16:designElem xmlns:p16="http://schemas.microsoft.com/office/powerpoint/2015/main" val="1"/>
+              </p:ext>
+            </p:extLst>
+          </p:nvPr>
+        </p:nvGrpSpPr>
+        <p:grpSpPr>
+          <a:xfrm>
+            <a:off x="9206969" y="2963333"/>
+            <a:ext cx="2981858" cy="3208867"/>
+            <a:chOff x="9206969" y="2963333"/>
+            <a:chExt cx="2981858" cy="3208867"/>
+          </a:xfrm>
+        </p:grpSpPr>
+        <p:cxnSp>
+          <p:nvCxnSpPr>
+            <p:cNvPr id="11" name="Straight Connector 10">
+              <a:extLst>
+                <a:ext uri="{FF2B5EF4-FFF2-40B4-BE49-F238E27FC236}">
+                  <a16:creationId xmlns:a16="http://schemas.microsoft.com/office/drawing/2014/main" id="{4E35C3AD-357F-4004-A3F3-2D4EAF34A63D}"/>
+                </a:ext>
+                <a:ext uri="{C183D7F6-B498-43B3-948B-1728B52AA6E4}">
+                  <adec:decorative xmlns:adec="http://schemas.microsoft.com/office/drawing/2017/decorative" val="1"/>
+                </a:ext>
+              </a:extLst>
+            </p:cNvPr>
+            <p:cNvCxnSpPr/>
+            <p:nvPr>
+              <p:extLst>
+                <p:ext uri="{386F3935-93C4-4BCD-93E2-E3B085C9AB24}">
+                  <p16:designElem xmlns:p16="http://schemas.microsoft.com/office/powerpoint/2015/main" val="1"/>
+                </p:ext>
+              </p:extLst>
+            </p:nvPr>
+          </p:nvCxnSpPr>
+          <p:spPr>
+            <a:xfrm flipH="1">
+              <a:off x="11276012" y="2963333"/>
+              <a:ext cx="912814" cy="912812"/>
+            </a:xfrm>
+            <a:prstGeom prst="line">
+              <a:avLst/>
+            </a:prstGeom>
+            <a:ln w="9525">
+              <a:solidFill>
+                <a:schemeClr val="tx2">
+                  <a:lumMod val="75000"/>
+                  <a:alpha val="80000"/>
+                </a:schemeClr>
+              </a:solidFill>
+            </a:ln>
+          </p:spPr>
+          <p:style>
+            <a:lnRef idx="2">
+              <a:schemeClr val="accent1"/>
+            </a:lnRef>
+            <a:fillRef idx="0">
+              <a:schemeClr val="accent1"/>
+            </a:fillRef>
+            <a:effectRef idx="1">
+              <a:schemeClr val="accent1"/>
+            </a:effectRef>
+            <a:fontRef idx="minor">
+              <a:schemeClr val="tx1"/>
+            </a:fontRef>
+          </p:style>
+        </p:cxnSp>
+        <p:cxnSp>
+          <p:nvCxnSpPr>
+            <p:cNvPr id="12" name="Straight Connector 11">
+              <a:extLst>
+                <a:ext uri="{FF2B5EF4-FFF2-40B4-BE49-F238E27FC236}">
+                  <a16:creationId xmlns:a16="http://schemas.microsoft.com/office/drawing/2014/main" id="{337B6032-0A70-4F26-A9A3-B4D60DF11818}"/>
+                </a:ext>
+                <a:ext uri="{C183D7F6-B498-43B3-948B-1728B52AA6E4}">
+                  <adec:decorative xmlns:adec="http://schemas.microsoft.com/office/drawing/2017/decorative" val="1"/>
+                </a:ext>
+              </a:extLst>
+            </p:cNvPr>
+            <p:cNvCxnSpPr/>
+            <p:nvPr>
+              <p:extLst>
+                <p:ext uri="{386F3935-93C4-4BCD-93E2-E3B085C9AB24}">
+                  <p16:designElem xmlns:p16="http://schemas.microsoft.com/office/powerpoint/2015/main" val="1"/>
+                </p:ext>
+              </p:extLst>
+            </p:nvPr>
+          </p:nvCxnSpPr>
+          <p:spPr>
+            <a:xfrm flipH="1">
+              <a:off x="9206969" y="3190344"/>
+              <a:ext cx="2981857" cy="2981856"/>
+            </a:xfrm>
+            <a:prstGeom prst="line">
+              <a:avLst/>
+            </a:prstGeom>
+            <a:ln w="9525">
+              <a:solidFill>
+                <a:schemeClr val="tx2">
+                  <a:lumMod val="75000"/>
+                  <a:alpha val="80000"/>
+                </a:schemeClr>
+              </a:solidFill>
+            </a:ln>
+          </p:spPr>
+          <p:style>
+            <a:lnRef idx="2">
+              <a:schemeClr val="accent1"/>
+            </a:lnRef>
+            <a:fillRef idx="0">
+              <a:schemeClr val="accent1"/>
+            </a:fillRef>
+            <a:effectRef idx="1">
+              <a:schemeClr val="accent1"/>
+            </a:effectRef>
+            <a:fontRef idx="minor">
+              <a:schemeClr val="tx1"/>
+            </a:fontRef>
+          </p:style>
+        </p:cxnSp>
+        <p:cxnSp>
+          <p:nvCxnSpPr>
+            <p:cNvPr id="13" name="Straight Connector 12">
+              <a:extLst>
+                <a:ext uri="{FF2B5EF4-FFF2-40B4-BE49-F238E27FC236}">
+                  <a16:creationId xmlns:a16="http://schemas.microsoft.com/office/drawing/2014/main" id="{DE192CE3-3DD1-448F-93BE-42983DA0D5A9}"/>
+                </a:ext>
+                <a:ext uri="{C183D7F6-B498-43B3-948B-1728B52AA6E4}">
+                  <adec:decorative xmlns:adec="http://schemas.microsoft.com/office/drawing/2017/decorative" val="1"/>
+                </a:ext>
+              </a:extLst>
+            </p:cNvPr>
+            <p:cNvCxnSpPr/>
+            <p:nvPr>
+              <p:extLst>
+                <p:ext uri="{386F3935-93C4-4BCD-93E2-E3B085C9AB24}">
+                  <p16:designElem xmlns:p16="http://schemas.microsoft.com/office/powerpoint/2015/main" val="1"/>
+                </p:ext>
+              </p:extLst>
+            </p:nvPr>
+          </p:nvCxnSpPr>
+          <p:spPr>
+            <a:xfrm flipH="1">
+              <a:off x="10292292" y="3285067"/>
+              <a:ext cx="1896534" cy="1896533"/>
+            </a:xfrm>
+            <a:prstGeom prst="line">
+              <a:avLst/>
+            </a:prstGeom>
+            <a:ln w="9525">
+              <a:solidFill>
+                <a:schemeClr val="tx2">
+                  <a:lumMod val="75000"/>
+                  <a:alpha val="80000"/>
+                </a:schemeClr>
+              </a:solidFill>
+            </a:ln>
+          </p:spPr>
+          <p:style>
+            <a:lnRef idx="2">
+              <a:schemeClr val="accent1"/>
+            </a:lnRef>
+            <a:fillRef idx="0">
+              <a:schemeClr val="accent1"/>
+            </a:fillRef>
+            <a:effectRef idx="1">
+              <a:schemeClr val="accent1"/>
+            </a:effectRef>
+            <a:fontRef idx="minor">
+              <a:schemeClr val="tx1"/>
+            </a:fontRef>
+          </p:style>
+        </p:cxnSp>
+        <p:cxnSp>
+          <p:nvCxnSpPr>
+            <p:cNvPr id="14" name="Straight Connector 13">
+              <a:extLst>
+                <a:ext uri="{FF2B5EF4-FFF2-40B4-BE49-F238E27FC236}">
+                  <a16:creationId xmlns:a16="http://schemas.microsoft.com/office/drawing/2014/main" id="{E6D3DA09-5C72-4562-BEDE-1937DF87E81D}"/>
+                </a:ext>
+                <a:ext uri="{C183D7F6-B498-43B3-948B-1728B52AA6E4}">
+                  <adec:decorative xmlns:adec="http://schemas.microsoft.com/office/drawing/2017/decorative" val="1"/>
+                </a:ext>
+              </a:extLst>
+            </p:cNvPr>
+            <p:cNvCxnSpPr/>
+            <p:nvPr>
+              <p:extLst>
+                <p:ext uri="{386F3935-93C4-4BCD-93E2-E3B085C9AB24}">
+                  <p16:designElem xmlns:p16="http://schemas.microsoft.com/office/powerpoint/2015/main" val="1"/>
+                </p:ext>
+              </p:extLst>
+            </p:nvPr>
+          </p:nvCxnSpPr>
+          <p:spPr>
+            <a:xfrm flipH="1">
+              <a:off x="10443103" y="3131080"/>
+              <a:ext cx="1745722" cy="1745720"/>
+            </a:xfrm>
+            <a:prstGeom prst="line">
+              <a:avLst/>
+            </a:prstGeom>
+            <a:ln w="28575">
+              <a:solidFill>
+                <a:schemeClr val="tx2">
+                  <a:lumMod val="75000"/>
+                  <a:alpha val="80000"/>
+                </a:schemeClr>
+              </a:solidFill>
+            </a:ln>
+          </p:spPr>
+          <p:style>
+            <a:lnRef idx="2">
+              <a:schemeClr val="accent1"/>
+            </a:lnRef>
+            <a:fillRef idx="0">
+              <a:schemeClr val="accent1"/>
+            </a:fillRef>
+            <a:effectRef idx="1">
+              <a:schemeClr val="accent1"/>
+            </a:effectRef>
+            <a:fontRef idx="minor">
+              <a:schemeClr val="tx1"/>
+            </a:fontRef>
+          </p:style>
+        </p:cxnSp>
+        <p:cxnSp>
+          <p:nvCxnSpPr>
+            <p:cNvPr id="15" name="Straight Connector 14">
+              <a:extLst>
+                <a:ext uri="{FF2B5EF4-FFF2-40B4-BE49-F238E27FC236}">
+                  <a16:creationId xmlns:a16="http://schemas.microsoft.com/office/drawing/2014/main" id="{D6ACA7CA-2A20-49D7-9053-E076463D79A3}"/>
+                </a:ext>
+                <a:ext uri="{C183D7F6-B498-43B3-948B-1728B52AA6E4}">
+                  <adec:decorative xmlns:adec="http://schemas.microsoft.com/office/drawing/2017/decorative" val="1"/>
+                </a:ext>
+              </a:extLst>
+            </p:cNvPr>
+            <p:cNvCxnSpPr/>
+            <p:nvPr>
+              <p:extLst>
+                <p:ext uri="{386F3935-93C4-4BCD-93E2-E3B085C9AB24}">
+                  <p16:designElem xmlns:p16="http://schemas.microsoft.com/office/powerpoint/2015/main" val="1"/>
+                </p:ext>
+              </p:extLst>
+            </p:nvPr>
+          </p:nvCxnSpPr>
+          <p:spPr>
+            <a:xfrm flipH="1">
+              <a:off x="10918826" y="3683001"/>
+              <a:ext cx="1270001" cy="1269999"/>
+            </a:xfrm>
+            <a:prstGeom prst="line">
+              <a:avLst/>
+            </a:prstGeom>
+            <a:ln w="28575">
+              <a:solidFill>
+                <a:schemeClr val="tx2">
+                  <a:lumMod val="75000"/>
+                  <a:alpha val="80000"/>
+                </a:schemeClr>
+              </a:solidFill>
+            </a:ln>
+          </p:spPr>
+          <p:style>
+            <a:lnRef idx="2">
+              <a:schemeClr val="accent1"/>
+            </a:lnRef>
+            <a:fillRef idx="0">
+              <a:schemeClr val="accent1"/>
+            </a:fillRef>
+            <a:effectRef idx="1">
+              <a:schemeClr val="accent1"/>
+            </a:effectRef>
+            <a:fontRef idx="minor">
+              <a:schemeClr val="tx1"/>
+            </a:fontRef>
+          </p:style>
+        </p:cxnSp>
+      </p:grpSp>
+      <p:pic>
+        <p:nvPicPr>
+          <p:cNvPr id="3" name="Picture 2">
+            <a:extLst>
+              <a:ext uri="{FF2B5EF4-FFF2-40B4-BE49-F238E27FC236}">
+                <a16:creationId xmlns:a16="http://schemas.microsoft.com/office/drawing/2014/main" id="{7F4CAB2D-EA83-024C-9959-A63490BD7300}"/>
+              </a:ext>
+            </a:extLst>
+          </p:cNvPr>
+          <p:cNvPicPr>
+            <a:picLocks noChangeAspect="1"/>
+          </p:cNvPicPr>
+          <p:nvPr/>
+        </p:nvPicPr>
+        <p:blipFill>
+          <a:blip r:embed="rId2">
+            <a:extLst>
+              <a:ext uri="{28A0092B-C50C-407E-A947-70E740481C1C}">
+                <a14:useLocalDpi xmlns:a14="http://schemas.microsoft.com/office/drawing/2010/main" val="0"/>
+              </a:ext>
+            </a:extLst>
+          </a:blip>
+          <a:stretch>
+            <a:fillRect/>
+          </a:stretch>
+        </p:blipFill>
+        <p:spPr>
+          <a:xfrm>
+            <a:off x="0" y="-1"/>
+            <a:ext cx="12192000" cy="6858001"/>
+          </a:xfrm>
+          <a:prstGeom prst="rect">
+            <a:avLst/>
+          </a:prstGeom>
+        </p:spPr>
+      </p:pic>
+    </p:spTree>
+    <p:extLst>
+      <p:ext uri="{BB962C8B-B14F-4D97-AF65-F5344CB8AC3E}">
+        <p14:creationId xmlns:p14="http://schemas.microsoft.com/office/powerpoint/2010/main" val="3252124788"/>
+      </p:ext>
+    </p:extLst>
+  </p:cSld>
+  <p:clrMapOvr>
+    <a:masterClrMapping/>
+  </p:clrMapOvr>
+</p:sld>
+</file>
+
+<file path=ppt/slides/slide13.xml><?xml version="1.0" encoding="utf-8"?>
 <p:sld xmlns:a="http://schemas.openxmlformats.org/drawingml/2006/main" xmlns:r="http://schemas.openxmlformats.org/officeDocument/2006/relationships" xmlns:p="http://schemas.openxmlformats.org/presentationml/2006/main">
   <p:cSld>
     <p:bg>
@@ -10099,7 +10998,455 @@
 </p:sld>
 </file>
 
-<file path=ppt/slides/slide12.xml><?xml version="1.0" encoding="utf-8"?>
+<file path=ppt/slides/slide14.xml><?xml version="1.0" encoding="utf-8"?>
+<p:sld xmlns:a="http://schemas.openxmlformats.org/drawingml/2006/main" xmlns:r="http://schemas.openxmlformats.org/officeDocument/2006/relationships" xmlns:p="http://schemas.openxmlformats.org/presentationml/2006/main">
+  <p:cSld>
+    <p:bg>
+      <p:bgPr>
+        <a:gradFill rotWithShape="1">
+          <a:gsLst>
+            <a:gs pos="10000">
+              <a:schemeClr val="bg1">
+                <a:tint val="97000"/>
+                <a:hueMod val="92000"/>
+                <a:satMod val="169000"/>
+                <a:lumMod val="164000"/>
+              </a:schemeClr>
+            </a:gs>
+            <a:gs pos="100000">
+              <a:schemeClr val="bg1">
+                <a:shade val="96000"/>
+                <a:satMod val="120000"/>
+                <a:lumMod val="90000"/>
+              </a:schemeClr>
+            </a:gs>
+          </a:gsLst>
+          <a:lin ang="6120000" scaled="1"/>
+        </a:gradFill>
+        <a:effectLst/>
+      </p:bgPr>
+    </p:bg>
+    <p:spTree>
+      <p:nvGrpSpPr>
+        <p:cNvPr id="1" name=""/>
+        <p:cNvGrpSpPr/>
+        <p:nvPr/>
+      </p:nvGrpSpPr>
+      <p:grpSpPr>
+        <a:xfrm>
+          <a:off x="0" y="0"/>
+          <a:ext cx="0" cy="0"/>
+          <a:chOff x="0" y="0"/>
+          <a:chExt cx="0" cy="0"/>
+        </a:xfrm>
+      </p:grpSpPr>
+      <p:sp useBgFill="1">
+        <p:nvSpPr>
+          <p:cNvPr id="8" name="Rectangle 7">
+            <a:extLst>
+              <a:ext uri="{FF2B5EF4-FFF2-40B4-BE49-F238E27FC236}">
+                <a16:creationId xmlns:a16="http://schemas.microsoft.com/office/drawing/2014/main" id="{CADF2543-1B6F-4FBC-A7AF-53A0430E05AB}"/>
+              </a:ext>
+              <a:ext uri="{C183D7F6-B498-43B3-948B-1728B52AA6E4}">
+                <adec:decorative xmlns:adec="http://schemas.microsoft.com/office/drawing/2017/decorative" val="1"/>
+              </a:ext>
+            </a:extLst>
+          </p:cNvPr>
+          <p:cNvSpPr>
+            <a:spLocks noGrp="1" noRot="1" noChangeAspect="1" noMove="1" noResize="1" noEditPoints="1" noAdjustHandles="1" noChangeArrowheads="1" noChangeShapeType="1" noTextEdit="1"/>
+          </p:cNvSpPr>
+          <p:nvPr>
+            <p:extLst>
+              <p:ext uri="{386F3935-93C4-4BCD-93E2-E3B085C9AB24}">
+                <p16:designElem xmlns:p16="http://schemas.microsoft.com/office/powerpoint/2015/main" val="1"/>
+              </p:ext>
+            </p:extLst>
+          </p:nvPr>
+        </p:nvSpPr>
+        <p:spPr>
+          <a:xfrm>
+            <a:off x="0" y="0"/>
+            <a:ext cx="12192000" cy="6858000"/>
+          </a:xfrm>
+          <a:prstGeom prst="rect">
+            <a:avLst/>
+          </a:prstGeom>
+          <a:ln>
+            <a:noFill/>
+          </a:ln>
+        </p:spPr>
+        <p:style>
+          <a:lnRef idx="2">
+            <a:schemeClr val="accent1">
+              <a:shade val="50000"/>
+            </a:schemeClr>
+          </a:lnRef>
+          <a:fillRef idx="1">
+            <a:schemeClr val="accent1"/>
+          </a:fillRef>
+          <a:effectRef idx="0">
+            <a:schemeClr val="accent1"/>
+          </a:effectRef>
+          <a:fontRef idx="minor">
+            <a:schemeClr val="lt1"/>
+          </a:fontRef>
+        </p:style>
+        <p:txBody>
+          <a:bodyPr rtlCol="0" anchor="ctr"/>
+          <a:lstStyle/>
+          <a:p>
+            <a:pPr algn="ctr"/>
+            <a:endParaRPr lang="en-US"/>
+          </a:p>
+        </p:txBody>
+      </p:sp>
+      <p:grpSp>
+        <p:nvGrpSpPr>
+          <p:cNvPr id="10" name="Group 9">
+            <a:extLst>
+              <a:ext uri="{FF2B5EF4-FFF2-40B4-BE49-F238E27FC236}">
+                <a16:creationId xmlns:a16="http://schemas.microsoft.com/office/drawing/2014/main" id="{A80A6E81-6B71-43DF-877B-E964A9A4CB68}"/>
+              </a:ext>
+              <a:ext uri="{C183D7F6-B498-43B3-948B-1728B52AA6E4}">
+                <adec:decorative xmlns:adec="http://schemas.microsoft.com/office/drawing/2017/decorative" val="1"/>
+              </a:ext>
+            </a:extLst>
+          </p:cNvPr>
+          <p:cNvGrpSpPr>
+            <a:grpSpLocks noGrp="1" noUngrp="1" noRot="1" noChangeAspect="1" noMove="1" noResize="1"/>
+          </p:cNvGrpSpPr>
+          <p:nvPr>
+            <p:extLst>
+              <p:ext uri="{386F3935-93C4-4BCD-93E2-E3B085C9AB24}">
+                <p16:designElem xmlns:p16="http://schemas.microsoft.com/office/powerpoint/2015/main" val="1"/>
+              </p:ext>
+            </p:extLst>
+          </p:nvPr>
+        </p:nvGrpSpPr>
+        <p:grpSpPr>
+          <a:xfrm>
+            <a:off x="9206969" y="2963333"/>
+            <a:ext cx="2981858" cy="3208867"/>
+            <a:chOff x="9206969" y="2963333"/>
+            <a:chExt cx="2981858" cy="3208867"/>
+          </a:xfrm>
+        </p:grpSpPr>
+        <p:cxnSp>
+          <p:nvCxnSpPr>
+            <p:cNvPr id="11" name="Straight Connector 10">
+              <a:extLst>
+                <a:ext uri="{FF2B5EF4-FFF2-40B4-BE49-F238E27FC236}">
+                  <a16:creationId xmlns:a16="http://schemas.microsoft.com/office/drawing/2014/main" id="{4E35C3AD-357F-4004-A3F3-2D4EAF34A63D}"/>
+                </a:ext>
+                <a:ext uri="{C183D7F6-B498-43B3-948B-1728B52AA6E4}">
+                  <adec:decorative xmlns:adec="http://schemas.microsoft.com/office/drawing/2017/decorative" val="1"/>
+                </a:ext>
+              </a:extLst>
+            </p:cNvPr>
+            <p:cNvCxnSpPr/>
+            <p:nvPr>
+              <p:extLst>
+                <p:ext uri="{386F3935-93C4-4BCD-93E2-E3B085C9AB24}">
+                  <p16:designElem xmlns:p16="http://schemas.microsoft.com/office/powerpoint/2015/main" val="1"/>
+                </p:ext>
+              </p:extLst>
+            </p:nvPr>
+          </p:nvCxnSpPr>
+          <p:spPr>
+            <a:xfrm flipH="1">
+              <a:off x="11276012" y="2963333"/>
+              <a:ext cx="912814" cy="912812"/>
+            </a:xfrm>
+            <a:prstGeom prst="line">
+              <a:avLst/>
+            </a:prstGeom>
+            <a:ln w="9525">
+              <a:solidFill>
+                <a:schemeClr val="tx2">
+                  <a:lumMod val="75000"/>
+                  <a:alpha val="80000"/>
+                </a:schemeClr>
+              </a:solidFill>
+            </a:ln>
+          </p:spPr>
+          <p:style>
+            <a:lnRef idx="2">
+              <a:schemeClr val="accent1"/>
+            </a:lnRef>
+            <a:fillRef idx="0">
+              <a:schemeClr val="accent1"/>
+            </a:fillRef>
+            <a:effectRef idx="1">
+              <a:schemeClr val="accent1"/>
+            </a:effectRef>
+            <a:fontRef idx="minor">
+              <a:schemeClr val="tx1"/>
+            </a:fontRef>
+          </p:style>
+        </p:cxnSp>
+        <p:cxnSp>
+          <p:nvCxnSpPr>
+            <p:cNvPr id="12" name="Straight Connector 11">
+              <a:extLst>
+                <a:ext uri="{FF2B5EF4-FFF2-40B4-BE49-F238E27FC236}">
+                  <a16:creationId xmlns:a16="http://schemas.microsoft.com/office/drawing/2014/main" id="{337B6032-0A70-4F26-A9A3-B4D60DF11818}"/>
+                </a:ext>
+                <a:ext uri="{C183D7F6-B498-43B3-948B-1728B52AA6E4}">
+                  <adec:decorative xmlns:adec="http://schemas.microsoft.com/office/drawing/2017/decorative" val="1"/>
+                </a:ext>
+              </a:extLst>
+            </p:cNvPr>
+            <p:cNvCxnSpPr/>
+            <p:nvPr>
+              <p:extLst>
+                <p:ext uri="{386F3935-93C4-4BCD-93E2-E3B085C9AB24}">
+                  <p16:designElem xmlns:p16="http://schemas.microsoft.com/office/powerpoint/2015/main" val="1"/>
+                </p:ext>
+              </p:extLst>
+            </p:nvPr>
+          </p:nvCxnSpPr>
+          <p:spPr>
+            <a:xfrm flipH="1">
+              <a:off x="9206969" y="3190344"/>
+              <a:ext cx="2981857" cy="2981856"/>
+            </a:xfrm>
+            <a:prstGeom prst="line">
+              <a:avLst/>
+            </a:prstGeom>
+            <a:ln w="9525">
+              <a:solidFill>
+                <a:schemeClr val="tx2">
+                  <a:lumMod val="75000"/>
+                  <a:alpha val="80000"/>
+                </a:schemeClr>
+              </a:solidFill>
+            </a:ln>
+          </p:spPr>
+          <p:style>
+            <a:lnRef idx="2">
+              <a:schemeClr val="accent1"/>
+            </a:lnRef>
+            <a:fillRef idx="0">
+              <a:schemeClr val="accent1"/>
+            </a:fillRef>
+            <a:effectRef idx="1">
+              <a:schemeClr val="accent1"/>
+            </a:effectRef>
+            <a:fontRef idx="minor">
+              <a:schemeClr val="tx1"/>
+            </a:fontRef>
+          </p:style>
+        </p:cxnSp>
+        <p:cxnSp>
+          <p:nvCxnSpPr>
+            <p:cNvPr id="13" name="Straight Connector 12">
+              <a:extLst>
+                <a:ext uri="{FF2B5EF4-FFF2-40B4-BE49-F238E27FC236}">
+                  <a16:creationId xmlns:a16="http://schemas.microsoft.com/office/drawing/2014/main" id="{DE192CE3-3DD1-448F-93BE-42983DA0D5A9}"/>
+                </a:ext>
+                <a:ext uri="{C183D7F6-B498-43B3-948B-1728B52AA6E4}">
+                  <adec:decorative xmlns:adec="http://schemas.microsoft.com/office/drawing/2017/decorative" val="1"/>
+                </a:ext>
+              </a:extLst>
+            </p:cNvPr>
+            <p:cNvCxnSpPr/>
+            <p:nvPr>
+              <p:extLst>
+                <p:ext uri="{386F3935-93C4-4BCD-93E2-E3B085C9AB24}">
+                  <p16:designElem xmlns:p16="http://schemas.microsoft.com/office/powerpoint/2015/main" val="1"/>
+                </p:ext>
+              </p:extLst>
+            </p:nvPr>
+          </p:nvCxnSpPr>
+          <p:spPr>
+            <a:xfrm flipH="1">
+              <a:off x="10292292" y="3285067"/>
+              <a:ext cx="1896534" cy="1896533"/>
+            </a:xfrm>
+            <a:prstGeom prst="line">
+              <a:avLst/>
+            </a:prstGeom>
+            <a:ln w="9525">
+              <a:solidFill>
+                <a:schemeClr val="tx2">
+                  <a:lumMod val="75000"/>
+                  <a:alpha val="80000"/>
+                </a:schemeClr>
+              </a:solidFill>
+            </a:ln>
+          </p:spPr>
+          <p:style>
+            <a:lnRef idx="2">
+              <a:schemeClr val="accent1"/>
+            </a:lnRef>
+            <a:fillRef idx="0">
+              <a:schemeClr val="accent1"/>
+            </a:fillRef>
+            <a:effectRef idx="1">
+              <a:schemeClr val="accent1"/>
+            </a:effectRef>
+            <a:fontRef idx="minor">
+              <a:schemeClr val="tx1"/>
+            </a:fontRef>
+          </p:style>
+        </p:cxnSp>
+        <p:cxnSp>
+          <p:nvCxnSpPr>
+            <p:cNvPr id="14" name="Straight Connector 13">
+              <a:extLst>
+                <a:ext uri="{FF2B5EF4-FFF2-40B4-BE49-F238E27FC236}">
+                  <a16:creationId xmlns:a16="http://schemas.microsoft.com/office/drawing/2014/main" id="{E6D3DA09-5C72-4562-BEDE-1937DF87E81D}"/>
+                </a:ext>
+                <a:ext uri="{C183D7F6-B498-43B3-948B-1728B52AA6E4}">
+                  <adec:decorative xmlns:adec="http://schemas.microsoft.com/office/drawing/2017/decorative" val="1"/>
+                </a:ext>
+              </a:extLst>
+            </p:cNvPr>
+            <p:cNvCxnSpPr/>
+            <p:nvPr>
+              <p:extLst>
+                <p:ext uri="{386F3935-93C4-4BCD-93E2-E3B085C9AB24}">
+                  <p16:designElem xmlns:p16="http://schemas.microsoft.com/office/powerpoint/2015/main" val="1"/>
+                </p:ext>
+              </p:extLst>
+            </p:nvPr>
+          </p:nvCxnSpPr>
+          <p:spPr>
+            <a:xfrm flipH="1">
+              <a:off x="10443103" y="3131080"/>
+              <a:ext cx="1745722" cy="1745720"/>
+            </a:xfrm>
+            <a:prstGeom prst="line">
+              <a:avLst/>
+            </a:prstGeom>
+            <a:ln w="28575">
+              <a:solidFill>
+                <a:schemeClr val="tx2">
+                  <a:lumMod val="75000"/>
+                  <a:alpha val="80000"/>
+                </a:schemeClr>
+              </a:solidFill>
+            </a:ln>
+          </p:spPr>
+          <p:style>
+            <a:lnRef idx="2">
+              <a:schemeClr val="accent1"/>
+            </a:lnRef>
+            <a:fillRef idx="0">
+              <a:schemeClr val="accent1"/>
+            </a:fillRef>
+            <a:effectRef idx="1">
+              <a:schemeClr val="accent1"/>
+            </a:effectRef>
+            <a:fontRef idx="minor">
+              <a:schemeClr val="tx1"/>
+            </a:fontRef>
+          </p:style>
+        </p:cxnSp>
+        <p:cxnSp>
+          <p:nvCxnSpPr>
+            <p:cNvPr id="15" name="Straight Connector 14">
+              <a:extLst>
+                <a:ext uri="{FF2B5EF4-FFF2-40B4-BE49-F238E27FC236}">
+                  <a16:creationId xmlns:a16="http://schemas.microsoft.com/office/drawing/2014/main" id="{D6ACA7CA-2A20-49D7-9053-E076463D79A3}"/>
+                </a:ext>
+                <a:ext uri="{C183D7F6-B498-43B3-948B-1728B52AA6E4}">
+                  <adec:decorative xmlns:adec="http://schemas.microsoft.com/office/drawing/2017/decorative" val="1"/>
+                </a:ext>
+              </a:extLst>
+            </p:cNvPr>
+            <p:cNvCxnSpPr/>
+            <p:nvPr>
+              <p:extLst>
+                <p:ext uri="{386F3935-93C4-4BCD-93E2-E3B085C9AB24}">
+                  <p16:designElem xmlns:p16="http://schemas.microsoft.com/office/powerpoint/2015/main" val="1"/>
+                </p:ext>
+              </p:extLst>
+            </p:nvPr>
+          </p:nvCxnSpPr>
+          <p:spPr>
+            <a:xfrm flipH="1">
+              <a:off x="10918826" y="3683001"/>
+              <a:ext cx="1270001" cy="1269999"/>
+            </a:xfrm>
+            <a:prstGeom prst="line">
+              <a:avLst/>
+            </a:prstGeom>
+            <a:ln w="28575">
+              <a:solidFill>
+                <a:schemeClr val="tx2">
+                  <a:lumMod val="75000"/>
+                  <a:alpha val="80000"/>
+                </a:schemeClr>
+              </a:solidFill>
+            </a:ln>
+          </p:spPr>
+          <p:style>
+            <a:lnRef idx="2">
+              <a:schemeClr val="accent1"/>
+            </a:lnRef>
+            <a:fillRef idx="0">
+              <a:schemeClr val="accent1"/>
+            </a:fillRef>
+            <a:effectRef idx="1">
+              <a:schemeClr val="accent1"/>
+            </a:effectRef>
+            <a:fontRef idx="minor">
+              <a:schemeClr val="tx1"/>
+            </a:fontRef>
+          </p:style>
+        </p:cxnSp>
+      </p:grpSp>
+      <p:pic>
+        <p:nvPicPr>
+          <p:cNvPr id="4" name="Picture 3">
+            <a:extLst>
+              <a:ext uri="{FF2B5EF4-FFF2-40B4-BE49-F238E27FC236}">
+                <a16:creationId xmlns:a16="http://schemas.microsoft.com/office/drawing/2014/main" id="{88D34F46-39AA-9043-8076-ED8B9689A970}"/>
+              </a:ext>
+            </a:extLst>
+          </p:cNvPr>
+          <p:cNvPicPr>
+            <a:picLocks noChangeAspect="1"/>
+          </p:cNvPicPr>
+          <p:nvPr/>
+        </p:nvPicPr>
+        <p:blipFill>
+          <a:blip r:embed="rId2">
+            <a:extLst>
+              <a:ext uri="{28A0092B-C50C-407E-A947-70E740481C1C}">
+                <a14:useLocalDpi xmlns:a14="http://schemas.microsoft.com/office/drawing/2010/main" val="0"/>
+              </a:ext>
+            </a:extLst>
+          </a:blip>
+          <a:stretch>
+            <a:fillRect/>
+          </a:stretch>
+        </p:blipFill>
+        <p:spPr>
+          <a:xfrm>
+            <a:off x="-1" y="0"/>
+            <a:ext cx="12144745" cy="6858000"/>
+          </a:xfrm>
+          <a:prstGeom prst="rect">
+            <a:avLst/>
+          </a:prstGeom>
+        </p:spPr>
+      </p:pic>
+    </p:spTree>
+    <p:extLst>
+      <p:ext uri="{BB962C8B-B14F-4D97-AF65-F5344CB8AC3E}">
+        <p14:creationId xmlns:p14="http://schemas.microsoft.com/office/powerpoint/2010/main" val="3097639563"/>
+      </p:ext>
+    </p:extLst>
+  </p:cSld>
+  <p:clrMapOvr>
+    <a:masterClrMapping/>
+  </p:clrMapOvr>
+</p:sld>
+</file>
+
+<file path=ppt/slides/slide15.xml><?xml version="1.0" encoding="utf-8"?>
 <p:sld xmlns:a="http://schemas.openxmlformats.org/drawingml/2006/main" xmlns:r="http://schemas.openxmlformats.org/officeDocument/2006/relationships" xmlns:p="http://schemas.openxmlformats.org/presentationml/2006/main">
   <p:cSld>
     <p:bg>

</xml_diff>